<commit_message>
updates in manuscript with figures
</commit_message>
<xml_diff>
--- a/docs/figs/fig1.pptx
+++ b/docs/figs/fig1.pptx
@@ -197,7 +197,7 @@
           <a:p>
             <a:fld id="{D39C1AE3-E0D3-419F-B410-9FEFA2C17F52}" type="datetimeFigureOut">
               <a:rPr lang="en-GB" smtClean="0"/>
-              <a:t>29/11/2019</a:t>
+              <a:t>09/05/2020</a:t>
             </a:fld>
             <a:endParaRPr lang="en-GB"/>
           </a:p>
@@ -356,7 +356,7 @@
           <a:p>
             <a:fld id="{0F7EAF13-06B7-4474-86E9-EFBE586B029A}" type="slidenum">
               <a:rPr lang="en-GB" smtClean="0"/>
-              <a:t>‹#›</a:t>
+              <a:t>‹nr.›</a:t>
             </a:fld>
             <a:endParaRPr lang="en-GB"/>
           </a:p>
@@ -685,7 +685,7 @@
           <a:p>
             <a:fld id="{A77454BF-4A59-44AE-B66D-7E6B93D39995}" type="datetimeFigureOut">
               <a:rPr lang="en-GB" smtClean="0"/>
-              <a:t>29/11/2019</a:t>
+              <a:t>09/05/2020</a:t>
             </a:fld>
             <a:endParaRPr lang="en-GB"/>
           </a:p>
@@ -727,7 +727,7 @@
           <a:p>
             <a:fld id="{74346DBF-FFCB-4F84-B77C-E27F79A8AB4F}" type="slidenum">
               <a:rPr lang="en-GB" smtClean="0"/>
-              <a:t>‹#›</a:t>
+              <a:t>‹nr.›</a:t>
             </a:fld>
             <a:endParaRPr lang="en-GB"/>
           </a:p>
@@ -855,7 +855,7 @@
           <a:p>
             <a:fld id="{A77454BF-4A59-44AE-B66D-7E6B93D39995}" type="datetimeFigureOut">
               <a:rPr lang="en-GB" smtClean="0"/>
-              <a:t>29/11/2019</a:t>
+              <a:t>09/05/2020</a:t>
             </a:fld>
             <a:endParaRPr lang="en-GB"/>
           </a:p>
@@ -897,7 +897,7 @@
           <a:p>
             <a:fld id="{74346DBF-FFCB-4F84-B77C-E27F79A8AB4F}" type="slidenum">
               <a:rPr lang="en-GB" smtClean="0"/>
-              <a:t>‹#›</a:t>
+              <a:t>‹nr.›</a:t>
             </a:fld>
             <a:endParaRPr lang="en-GB"/>
           </a:p>
@@ -1035,7 +1035,7 @@
           <a:p>
             <a:fld id="{A77454BF-4A59-44AE-B66D-7E6B93D39995}" type="datetimeFigureOut">
               <a:rPr lang="en-GB" smtClean="0"/>
-              <a:t>29/11/2019</a:t>
+              <a:t>09/05/2020</a:t>
             </a:fld>
             <a:endParaRPr lang="en-GB"/>
           </a:p>
@@ -1077,7 +1077,7 @@
           <a:p>
             <a:fld id="{74346DBF-FFCB-4F84-B77C-E27F79A8AB4F}" type="slidenum">
               <a:rPr lang="en-GB" smtClean="0"/>
-              <a:t>‹#›</a:t>
+              <a:t>‹nr.›</a:t>
             </a:fld>
             <a:endParaRPr lang="en-GB"/>
           </a:p>
@@ -1205,7 +1205,7 @@
           <a:p>
             <a:fld id="{A77454BF-4A59-44AE-B66D-7E6B93D39995}" type="datetimeFigureOut">
               <a:rPr lang="en-GB" smtClean="0"/>
-              <a:t>29/11/2019</a:t>
+              <a:t>09/05/2020</a:t>
             </a:fld>
             <a:endParaRPr lang="en-GB"/>
           </a:p>
@@ -1247,7 +1247,7 @@
           <a:p>
             <a:fld id="{74346DBF-FFCB-4F84-B77C-E27F79A8AB4F}" type="slidenum">
               <a:rPr lang="en-GB" smtClean="0"/>
-              <a:t>‹#›</a:t>
+              <a:t>‹nr.›</a:t>
             </a:fld>
             <a:endParaRPr lang="en-GB"/>
           </a:p>
@@ -1449,7 +1449,7 @@
           <a:p>
             <a:fld id="{A77454BF-4A59-44AE-B66D-7E6B93D39995}" type="datetimeFigureOut">
               <a:rPr lang="en-GB" smtClean="0"/>
-              <a:t>29/11/2019</a:t>
+              <a:t>09/05/2020</a:t>
             </a:fld>
             <a:endParaRPr lang="en-GB"/>
           </a:p>
@@ -1491,7 +1491,7 @@
           <a:p>
             <a:fld id="{74346DBF-FFCB-4F84-B77C-E27F79A8AB4F}" type="slidenum">
               <a:rPr lang="en-GB" smtClean="0"/>
-              <a:t>‹#›</a:t>
+              <a:t>‹nr.›</a:t>
             </a:fld>
             <a:endParaRPr lang="en-GB"/>
           </a:p>
@@ -1681,7 +1681,7 @@
           <a:p>
             <a:fld id="{A77454BF-4A59-44AE-B66D-7E6B93D39995}" type="datetimeFigureOut">
               <a:rPr lang="en-GB" smtClean="0"/>
-              <a:t>29/11/2019</a:t>
+              <a:t>09/05/2020</a:t>
             </a:fld>
             <a:endParaRPr lang="en-GB"/>
           </a:p>
@@ -1723,7 +1723,7 @@
           <a:p>
             <a:fld id="{74346DBF-FFCB-4F84-B77C-E27F79A8AB4F}" type="slidenum">
               <a:rPr lang="en-GB" smtClean="0"/>
-              <a:t>‹#›</a:t>
+              <a:t>‹nr.›</a:t>
             </a:fld>
             <a:endParaRPr lang="en-GB"/>
           </a:p>
@@ -2048,7 +2048,7 @@
           <a:p>
             <a:fld id="{A77454BF-4A59-44AE-B66D-7E6B93D39995}" type="datetimeFigureOut">
               <a:rPr lang="en-GB" smtClean="0"/>
-              <a:t>29/11/2019</a:t>
+              <a:t>09/05/2020</a:t>
             </a:fld>
             <a:endParaRPr lang="en-GB"/>
           </a:p>
@@ -2090,7 +2090,7 @@
           <a:p>
             <a:fld id="{74346DBF-FFCB-4F84-B77C-E27F79A8AB4F}" type="slidenum">
               <a:rPr lang="en-GB" smtClean="0"/>
-              <a:t>‹#›</a:t>
+              <a:t>‹nr.›</a:t>
             </a:fld>
             <a:endParaRPr lang="en-GB"/>
           </a:p>
@@ -2166,7 +2166,7 @@
           <a:p>
             <a:fld id="{A77454BF-4A59-44AE-B66D-7E6B93D39995}" type="datetimeFigureOut">
               <a:rPr lang="en-GB" smtClean="0"/>
-              <a:t>29/11/2019</a:t>
+              <a:t>09/05/2020</a:t>
             </a:fld>
             <a:endParaRPr lang="en-GB"/>
           </a:p>
@@ -2208,7 +2208,7 @@
           <a:p>
             <a:fld id="{74346DBF-FFCB-4F84-B77C-E27F79A8AB4F}" type="slidenum">
               <a:rPr lang="en-GB" smtClean="0"/>
-              <a:t>‹#›</a:t>
+              <a:t>‹nr.›</a:t>
             </a:fld>
             <a:endParaRPr lang="en-GB"/>
           </a:p>
@@ -2261,7 +2261,7 @@
           <a:p>
             <a:fld id="{A77454BF-4A59-44AE-B66D-7E6B93D39995}" type="datetimeFigureOut">
               <a:rPr lang="en-GB" smtClean="0"/>
-              <a:t>29/11/2019</a:t>
+              <a:t>09/05/2020</a:t>
             </a:fld>
             <a:endParaRPr lang="en-GB"/>
           </a:p>
@@ -2303,7 +2303,7 @@
           <a:p>
             <a:fld id="{74346DBF-FFCB-4F84-B77C-E27F79A8AB4F}" type="slidenum">
               <a:rPr lang="en-GB" smtClean="0"/>
-              <a:t>‹#›</a:t>
+              <a:t>‹nr.›</a:t>
             </a:fld>
             <a:endParaRPr lang="en-GB"/>
           </a:p>
@@ -2538,7 +2538,7 @@
           <a:p>
             <a:fld id="{A77454BF-4A59-44AE-B66D-7E6B93D39995}" type="datetimeFigureOut">
               <a:rPr lang="en-GB" smtClean="0"/>
-              <a:t>29/11/2019</a:t>
+              <a:t>09/05/2020</a:t>
             </a:fld>
             <a:endParaRPr lang="en-GB"/>
           </a:p>
@@ -2580,7 +2580,7 @@
           <a:p>
             <a:fld id="{74346DBF-FFCB-4F84-B77C-E27F79A8AB4F}" type="slidenum">
               <a:rPr lang="en-GB" smtClean="0"/>
-              <a:t>‹#›</a:t>
+              <a:t>‹nr.›</a:t>
             </a:fld>
             <a:endParaRPr lang="en-GB"/>
           </a:p>
@@ -2795,7 +2795,7 @@
           <a:p>
             <a:fld id="{A77454BF-4A59-44AE-B66D-7E6B93D39995}" type="datetimeFigureOut">
               <a:rPr lang="en-GB" smtClean="0"/>
-              <a:t>29/11/2019</a:t>
+              <a:t>09/05/2020</a:t>
             </a:fld>
             <a:endParaRPr lang="en-GB"/>
           </a:p>
@@ -2837,7 +2837,7 @@
           <a:p>
             <a:fld id="{74346DBF-FFCB-4F84-B77C-E27F79A8AB4F}" type="slidenum">
               <a:rPr lang="en-GB" smtClean="0"/>
-              <a:t>‹#›</a:t>
+              <a:t>‹nr.›</a:t>
             </a:fld>
             <a:endParaRPr lang="en-GB"/>
           </a:p>
@@ -3008,7 +3008,7 @@
           <a:p>
             <a:fld id="{A77454BF-4A59-44AE-B66D-7E6B93D39995}" type="datetimeFigureOut">
               <a:rPr lang="en-GB" smtClean="0"/>
-              <a:t>29/11/2019</a:t>
+              <a:t>09/05/2020</a:t>
             </a:fld>
             <a:endParaRPr lang="en-GB"/>
           </a:p>
@@ -3086,7 +3086,7 @@
           <a:p>
             <a:fld id="{74346DBF-FFCB-4F84-B77C-E27F79A8AB4F}" type="slidenum">
               <a:rPr lang="en-GB" smtClean="0"/>
-              <a:t>‹#›</a:t>
+              <a:t>‹nr.›</a:t>
             </a:fld>
             <a:endParaRPr lang="en-GB"/>
           </a:p>
@@ -3791,8 +3791,8 @@
         </p:nvSpPr>
         <p:spPr>
           <a:xfrm rot="5400000">
-            <a:off x="4852629" y="4898838"/>
-            <a:ext cx="1111010" cy="338554"/>
+            <a:off x="4914056" y="4898838"/>
+            <a:ext cx="988156" cy="338554"/>
           </a:xfrm>
           <a:prstGeom prst="rect">
             <a:avLst/>
@@ -3809,7 +3809,7 @@
               <a:rPr lang="en-GB" sz="1600" dirty="0">
                 <a:latin typeface="+mj-lt"/>
               </a:rPr>
-              <a:t>Categoric 1</a:t>
+              <a:t>discrete 1</a:t>
             </a:r>
             <a:endParaRPr lang="en-NL" sz="1600" dirty="0">
               <a:latin typeface="+mj-lt"/>
@@ -3831,8 +3831,8 @@
         </p:nvSpPr>
         <p:spPr>
           <a:xfrm rot="5400000">
-            <a:off x="5219408" y="4898838"/>
-            <a:ext cx="1111010" cy="338554"/>
+            <a:off x="5280835" y="4898838"/>
+            <a:ext cx="988156" cy="338554"/>
           </a:xfrm>
           <a:prstGeom prst="rect">
             <a:avLst/>
@@ -3849,7 +3849,7 @@
               <a:rPr lang="en-GB" sz="1600" dirty="0">
                 <a:latin typeface="+mj-lt"/>
               </a:rPr>
-              <a:t>Categoric 2</a:t>
+              <a:t>discrete 2</a:t>
             </a:r>
             <a:endParaRPr lang="en-NL" sz="1600" dirty="0">
               <a:latin typeface="+mj-lt"/>
@@ -3871,8 +3871,8 @@
         </p:nvSpPr>
         <p:spPr>
           <a:xfrm rot="5400000">
-            <a:off x="5655490" y="4862867"/>
-            <a:ext cx="1039067" cy="338554"/>
+            <a:off x="5667513" y="4926659"/>
+            <a:ext cx="1015021" cy="338554"/>
           </a:xfrm>
           <a:prstGeom prst="rect">
             <a:avLst/>
@@ -3889,7 +3889,7 @@
               <a:rPr lang="en-GB" sz="1600" dirty="0">
                 <a:latin typeface="+mj-lt"/>
               </a:rPr>
-              <a:t>Numeric 1</a:t>
+              <a:t>numeric 1</a:t>
             </a:r>
             <a:endParaRPr lang="en-NL" sz="1600" dirty="0">
               <a:latin typeface="+mj-lt"/>
@@ -4370,8 +4370,8 @@
           </a:p>
         </p:txBody>
       </p:sp>
-      <mc:AlternateContent xmlns:mc="http://schemas.openxmlformats.org/markup-compatibility/2006">
-        <mc:Choice xmlns:a14="http://schemas.microsoft.com/office/drawing/2010/main" Requires="a14">
+      <mc:AlternateContent xmlns:mc="http://schemas.openxmlformats.org/markup-compatibility/2006" xmlns:a14="http://schemas.microsoft.com/office/drawing/2010/main">
+        <mc:Choice Requires="a14">
           <p:sp>
             <p:nvSpPr>
               <p:cNvPr id="617" name="TextBox 616">
@@ -4858,7 +4858,7 @@
             </p:txBody>
           </p:sp>
         </mc:Choice>
-        <mc:Fallback>
+        <mc:Fallback xmlns="">
           <p:sp>
             <p:nvSpPr>
               <p:cNvPr id="617" name="TextBox 616">
@@ -4903,8 +4903,8 @@
           </p:sp>
         </mc:Fallback>
       </mc:AlternateContent>
-      <mc:AlternateContent xmlns:mc="http://schemas.openxmlformats.org/markup-compatibility/2006">
-        <mc:Choice xmlns:a14="http://schemas.microsoft.com/office/drawing/2010/main" Requires="a14">
+      <mc:AlternateContent xmlns:mc="http://schemas.openxmlformats.org/markup-compatibility/2006" xmlns:a14="http://schemas.microsoft.com/office/drawing/2010/main">
+        <mc:Choice Requires="a14">
           <p:sp>
             <p:nvSpPr>
               <p:cNvPr id="618" name="TextBox 617">
@@ -5092,7 +5092,7 @@
             </p:txBody>
           </p:sp>
         </mc:Choice>
-        <mc:Fallback>
+        <mc:Fallback xmlns="">
           <p:sp>
             <p:nvSpPr>
               <p:cNvPr id="618" name="TextBox 617">
@@ -5612,8 +5612,8 @@
           </a:p>
         </p:txBody>
       </p:sp>
-      <mc:AlternateContent xmlns:mc="http://schemas.openxmlformats.org/markup-compatibility/2006">
-        <mc:Choice xmlns:a14="http://schemas.microsoft.com/office/drawing/2010/main" Requires="a14">
+      <mc:AlternateContent xmlns:mc="http://schemas.openxmlformats.org/markup-compatibility/2006" xmlns:a14="http://schemas.microsoft.com/office/drawing/2010/main">
+        <mc:Choice Requires="a14">
           <p:sp>
             <p:nvSpPr>
               <p:cNvPr id="629" name="TextBox 628">
@@ -5831,7 +5831,7 @@
             </p:txBody>
           </p:sp>
         </mc:Choice>
-        <mc:Fallback>
+        <mc:Fallback xmlns="">
           <p:sp>
             <p:nvSpPr>
               <p:cNvPr id="629" name="TextBox 628">
@@ -5955,7 +5955,7 @@
             </a:r>
             <a:r>
               <a:rPr lang="en-GB" baseline="-25000" dirty="0" err="1"/>
-              <a:t>categoric</a:t>
+              <a:t>discrete</a:t>
             </a:r>
             <a:endParaRPr lang="en-NL" baseline="-25000" dirty="0"/>
           </a:p>
@@ -6242,8 +6242,8 @@
           </a:p>
         </p:txBody>
       </p:sp>
-      <mc:AlternateContent xmlns:mc="http://schemas.openxmlformats.org/markup-compatibility/2006">
-        <mc:Choice xmlns:a14="http://schemas.microsoft.com/office/drawing/2010/main" Requires="a14">
+      <mc:AlternateContent xmlns:mc="http://schemas.openxmlformats.org/markup-compatibility/2006" xmlns:a14="http://schemas.microsoft.com/office/drawing/2010/main">
+        <mc:Choice Requires="a14">
           <p:sp>
             <p:nvSpPr>
               <p:cNvPr id="638" name="TextBox 637">
@@ -6530,7 +6530,7 @@
             </p:txBody>
           </p:sp>
         </mc:Choice>
-        <mc:Fallback>
+        <mc:Fallback xmlns="">
           <p:sp>
             <p:nvSpPr>
               <p:cNvPr id="638" name="TextBox 637">
@@ -8388,7 +8388,7 @@
             </a:r>
             <a:r>
               <a:rPr lang="en-GB" baseline="-25000" dirty="0" err="1"/>
-              <a:t>combinations</a:t>
+              <a:t>combinatory</a:t>
             </a:r>
             <a:endParaRPr lang="en-NL" baseline="-25000" dirty="0"/>
           </a:p>
@@ -8608,8 +8608,8 @@
           </a:p>
         </p:txBody>
       </p:sp>
-      <mc:AlternateContent xmlns:mc="http://schemas.openxmlformats.org/markup-compatibility/2006">
-        <mc:Choice xmlns:a14="http://schemas.microsoft.com/office/drawing/2010/main" Requires="a14">
+      <mc:AlternateContent xmlns:mc="http://schemas.openxmlformats.org/markup-compatibility/2006" xmlns:a14="http://schemas.microsoft.com/office/drawing/2010/main">
+        <mc:Choice Requires="a14">
           <p:sp>
             <p:nvSpPr>
               <p:cNvPr id="668" name="TextBox 667">
@@ -8724,7 +8724,7 @@
             </p:txBody>
           </p:sp>
         </mc:Choice>
-        <mc:Fallback>
+        <mc:Fallback xmlns="">
           <p:sp>
             <p:nvSpPr>
               <p:cNvPr id="668" name="TextBox 667">
@@ -8769,8 +8769,8 @@
           </p:sp>
         </mc:Fallback>
       </mc:AlternateContent>
-      <mc:AlternateContent xmlns:mc="http://schemas.openxmlformats.org/markup-compatibility/2006">
-        <mc:Choice xmlns:a14="http://schemas.microsoft.com/office/drawing/2010/main" Requires="a14">
+      <mc:AlternateContent xmlns:mc="http://schemas.openxmlformats.org/markup-compatibility/2006" xmlns:a14="http://schemas.microsoft.com/office/drawing/2010/main">
+        <mc:Choice Requires="a14">
           <p:sp>
             <p:nvSpPr>
               <p:cNvPr id="669" name="TextBox 668">
@@ -8885,7 +8885,7 @@
             </p:txBody>
           </p:sp>
         </mc:Choice>
-        <mc:Fallback>
+        <mc:Fallback xmlns="">
           <p:sp>
             <p:nvSpPr>
               <p:cNvPr id="669" name="TextBox 668">
@@ -13953,8 +13953,8 @@
           </p:txBody>
         </p:sp>
       </p:grpSp>
-      <mc:AlternateContent xmlns:mc="http://schemas.openxmlformats.org/markup-compatibility/2006">
-        <mc:Choice xmlns:a14="http://schemas.microsoft.com/office/drawing/2010/main" Requires="a14">
+      <mc:AlternateContent xmlns:mc="http://schemas.openxmlformats.org/markup-compatibility/2006" xmlns:a14="http://schemas.microsoft.com/office/drawing/2010/main">
+        <mc:Choice Requires="a14">
           <p:sp>
             <p:nvSpPr>
               <p:cNvPr id="740" name="TextBox 739">
@@ -14163,7 +14163,7 @@
             </p:txBody>
           </p:sp>
         </mc:Choice>
-        <mc:Fallback>
+        <mc:Fallback xmlns="">
           <p:sp>
             <p:nvSpPr>
               <p:cNvPr id="740" name="TextBox 739">
@@ -14338,8 +14338,8 @@
           </a:fontRef>
         </p:style>
       </p:cxnSp>
-      <mc:AlternateContent xmlns:mc="http://schemas.openxmlformats.org/markup-compatibility/2006">
-        <mc:Choice xmlns:a14="http://schemas.microsoft.com/office/drawing/2010/main" Requires="a14">
+      <mc:AlternateContent xmlns:mc="http://schemas.openxmlformats.org/markup-compatibility/2006" xmlns:a14="http://schemas.microsoft.com/office/drawing/2010/main">
+        <mc:Choice Requires="a14">
           <p:sp>
             <p:nvSpPr>
               <p:cNvPr id="744" name="TextBox 743">
@@ -14458,7 +14458,7 @@
             </p:txBody>
           </p:sp>
         </mc:Choice>
-        <mc:Fallback>
+        <mc:Fallback xmlns="">
           <p:sp>
             <p:nvSpPr>
               <p:cNvPr id="744" name="TextBox 743">
@@ -14503,8 +14503,8 @@
           </p:sp>
         </mc:Fallback>
       </mc:AlternateContent>
-      <mc:AlternateContent xmlns:mc="http://schemas.openxmlformats.org/markup-compatibility/2006">
-        <mc:Choice xmlns:a14="http://schemas.microsoft.com/office/drawing/2010/main" Requires="a14">
+      <mc:AlternateContent xmlns:mc="http://schemas.openxmlformats.org/markup-compatibility/2006" xmlns:a14="http://schemas.microsoft.com/office/drawing/2010/main">
+        <mc:Choice Requires="a14">
           <p:sp>
             <p:nvSpPr>
               <p:cNvPr id="745" name="TextBox 744">
@@ -14623,7 +14623,7 @@
             </p:txBody>
           </p:sp>
         </mc:Choice>
-        <mc:Fallback>
+        <mc:Fallback xmlns="">
           <p:sp>
             <p:nvSpPr>
               <p:cNvPr id="745" name="TextBox 744">
@@ -14723,8 +14723,8 @@
           </a:p>
         </p:txBody>
       </p:sp>
-      <mc:AlternateContent xmlns:mc="http://schemas.openxmlformats.org/markup-compatibility/2006">
-        <mc:Choice xmlns:a14="http://schemas.microsoft.com/office/drawing/2010/main" Requires="a14">
+      <mc:AlternateContent xmlns:mc="http://schemas.openxmlformats.org/markup-compatibility/2006" xmlns:a14="http://schemas.microsoft.com/office/drawing/2010/main">
+        <mc:Choice Requires="a14">
           <p:sp>
             <p:nvSpPr>
               <p:cNvPr id="747" name="TextBox 746">
@@ -14806,7 +14806,7 @@
             </p:txBody>
           </p:sp>
         </mc:Choice>
-        <mc:Fallback>
+        <mc:Fallback xmlns="">
           <p:sp>
             <p:nvSpPr>
               <p:cNvPr id="747" name="TextBox 746">
@@ -14851,8 +14851,8 @@
           </p:sp>
         </mc:Fallback>
       </mc:AlternateContent>
-      <mc:AlternateContent xmlns:mc="http://schemas.openxmlformats.org/markup-compatibility/2006">
-        <mc:Choice xmlns:a14="http://schemas.microsoft.com/office/drawing/2010/main" Requires="a14">
+      <mc:AlternateContent xmlns:mc="http://schemas.openxmlformats.org/markup-compatibility/2006" xmlns:a14="http://schemas.microsoft.com/office/drawing/2010/main">
+        <mc:Choice Requires="a14">
           <p:sp>
             <p:nvSpPr>
               <p:cNvPr id="748" name="TextBox 747">
@@ -15008,7 +15008,7 @@
             </p:txBody>
           </p:sp>
         </mc:Choice>
-        <mc:Fallback>
+        <mc:Fallback xmlns="">
           <p:sp>
             <p:nvSpPr>
               <p:cNvPr id="748" name="TextBox 747">
@@ -16035,8 +16035,8 @@
           </a:fontRef>
         </p:style>
       </p:cxnSp>
-      <mc:AlternateContent xmlns:mc="http://schemas.openxmlformats.org/markup-compatibility/2006">
-        <mc:Choice xmlns:a14="http://schemas.microsoft.com/office/drawing/2010/main" Requires="a14">
+      <mc:AlternateContent xmlns:mc="http://schemas.openxmlformats.org/markup-compatibility/2006" xmlns:a14="http://schemas.microsoft.com/office/drawing/2010/main">
+        <mc:Choice Requires="a14">
           <p:sp>
             <p:nvSpPr>
               <p:cNvPr id="770" name="TextBox 769">
@@ -16220,7 +16220,7 @@
             </p:txBody>
           </p:sp>
         </mc:Choice>
-        <mc:Fallback>
+        <mc:Fallback xmlns="">
           <p:sp>
             <p:nvSpPr>
               <p:cNvPr id="770" name="TextBox 769">
@@ -16893,8 +16893,8 @@
           </a:p>
         </p:txBody>
       </p:sp>
-      <mc:AlternateContent xmlns:mc="http://schemas.openxmlformats.org/markup-compatibility/2006">
-        <mc:Choice xmlns:a14="http://schemas.microsoft.com/office/drawing/2010/main" Requires="a14">
+      <mc:AlternateContent xmlns:mc="http://schemas.openxmlformats.org/markup-compatibility/2006" xmlns:a14="http://schemas.microsoft.com/office/drawing/2010/main">
+        <mc:Choice Requires="a14">
           <p:sp>
             <p:nvSpPr>
               <p:cNvPr id="785" name="TextBox 784">
@@ -17031,7 +17031,7 @@
             </p:txBody>
           </p:sp>
         </mc:Choice>
-        <mc:Fallback>
+        <mc:Fallback xmlns="">
           <p:sp>
             <p:nvSpPr>
               <p:cNvPr id="785" name="TextBox 784">
@@ -17130,8 +17130,8 @@
         </p:nvSpPr>
         <p:spPr>
           <a:xfrm>
-            <a:off x="1025919" y="7338948"/>
-            <a:ext cx="874983" cy="369332"/>
+            <a:off x="1065641" y="7338948"/>
+            <a:ext cx="795539" cy="369332"/>
           </a:xfrm>
           <a:prstGeom prst="rect">
             <a:avLst/>
@@ -17150,7 +17150,7 @@
             </a:r>
             <a:r>
               <a:rPr lang="en-GB" baseline="-25000" dirty="0" err="1"/>
-              <a:t>categoric</a:t>
+              <a:t>discrete</a:t>
             </a:r>
             <a:endParaRPr lang="en-NL" baseline="-25000" dirty="0"/>
           </a:p>
@@ -17170,8 +17170,8 @@
         </p:nvSpPr>
         <p:spPr>
           <a:xfrm>
-            <a:off x="3983597" y="7338948"/>
-            <a:ext cx="1151789" cy="369332"/>
+            <a:off x="4011200" y="7338948"/>
+            <a:ext cx="1096582" cy="369332"/>
           </a:xfrm>
           <a:prstGeom prst="rect">
             <a:avLst/>
@@ -17190,7 +17190,7 @@
             </a:r>
             <a:r>
               <a:rPr lang="en-GB" baseline="-25000" dirty="0" err="1"/>
-              <a:t>combinations</a:t>
+              <a:t>combinatory</a:t>
             </a:r>
             <a:endParaRPr lang="en-NL" baseline="-25000" dirty="0"/>
           </a:p>

</xml_diff>

<commit_message>
update figures and manuscript text
</commit_message>
<xml_diff>
--- a/docs/figs/fig1.pptx
+++ b/docs/figs/fig1.pptx
@@ -3413,6 +3413,92 @@
           <a:chExt cx="0" cy="0"/>
         </a:xfrm>
       </p:grpSpPr>
+      <p:cxnSp>
+        <p:nvCxnSpPr>
+          <p:cNvPr id="227" name="Straight Arrow Connector 768">
+            <a:extLst>
+              <a:ext uri="{FF2B5EF4-FFF2-40B4-BE49-F238E27FC236}">
+                <a16:creationId xmlns:a16="http://schemas.microsoft.com/office/drawing/2014/main" id="{E2990575-BBC1-4B26-A461-462894CE3B77}"/>
+              </a:ext>
+            </a:extLst>
+          </p:cNvPr>
+          <p:cNvCxnSpPr/>
+          <p:nvPr/>
+        </p:nvCxnSpPr>
+        <p:spPr>
+          <a:xfrm flipV="1">
+            <a:off x="11091400" y="5822231"/>
+            <a:ext cx="1005840" cy="0"/>
+          </a:xfrm>
+          <a:prstGeom prst="straightConnector1">
+            <a:avLst/>
+          </a:prstGeom>
+          <a:ln>
+            <a:solidFill>
+              <a:schemeClr val="tx1"/>
+            </a:solidFill>
+            <a:prstDash val="dash"/>
+            <a:tailEnd type="triangle" w="lg" len="med"/>
+          </a:ln>
+        </p:spPr>
+        <p:style>
+          <a:lnRef idx="1">
+            <a:schemeClr val="accent1"/>
+          </a:lnRef>
+          <a:fillRef idx="0">
+            <a:schemeClr val="accent1"/>
+          </a:fillRef>
+          <a:effectRef idx="0">
+            <a:schemeClr val="accent1"/>
+          </a:effectRef>
+          <a:fontRef idx="minor">
+            <a:schemeClr val="tx1"/>
+          </a:fontRef>
+        </p:style>
+      </p:cxnSp>
+      <p:cxnSp>
+        <p:nvCxnSpPr>
+          <p:cNvPr id="228" name="Straight Arrow Connector 768">
+            <a:extLst>
+              <a:ext uri="{FF2B5EF4-FFF2-40B4-BE49-F238E27FC236}">
+                <a16:creationId xmlns:a16="http://schemas.microsoft.com/office/drawing/2014/main" id="{F97F6034-C451-4902-9017-8F4D19DA2C49}"/>
+              </a:ext>
+            </a:extLst>
+          </p:cNvPr>
+          <p:cNvCxnSpPr/>
+          <p:nvPr/>
+        </p:nvCxnSpPr>
+        <p:spPr>
+          <a:xfrm flipV="1">
+            <a:off x="11203768" y="5655382"/>
+            <a:ext cx="1005840" cy="0"/>
+          </a:xfrm>
+          <a:prstGeom prst="straightConnector1">
+            <a:avLst/>
+          </a:prstGeom>
+          <a:ln>
+            <a:solidFill>
+              <a:schemeClr val="tx1"/>
+            </a:solidFill>
+            <a:prstDash val="dash"/>
+            <a:tailEnd type="triangle" w="lg" len="med"/>
+          </a:ln>
+        </p:spPr>
+        <p:style>
+          <a:lnRef idx="1">
+            <a:schemeClr val="accent1"/>
+          </a:lnRef>
+          <a:fillRef idx="0">
+            <a:schemeClr val="accent1"/>
+          </a:fillRef>
+          <a:effectRef idx="0">
+            <a:schemeClr val="accent1"/>
+          </a:effectRef>
+          <a:fontRef idx="minor">
+            <a:schemeClr val="tx1"/>
+          </a:fontRef>
+        </p:style>
+      </p:cxnSp>
       <p:sp>
         <p:nvSpPr>
           <p:cNvPr id="598" name="Freeform: Shape 597">
@@ -3604,7 +3690,7 @@
           <a:p>
             <a:pPr algn="ctr"/>
             <a:r>
-              <a:rPr lang="en-GB" dirty="0"/>
+              <a:rPr lang="en-GB" b="1" i="1" dirty="0"/>
               <a:t>X</a:t>
             </a:r>
             <a:r>
@@ -4104,7 +4190,7 @@
           <a:p>
             <a:pPr algn="ctr"/>
             <a:r>
-              <a:rPr lang="en-GB" dirty="0"/>
+              <a:rPr lang="en-GB" b="1" i="1" dirty="0"/>
               <a:t>X</a:t>
             </a:r>
             <a:r>
@@ -4370,539 +4456,6 @@
           </a:p>
         </p:txBody>
       </p:sp>
-      <mc:AlternateContent xmlns:mc="http://schemas.openxmlformats.org/markup-compatibility/2006" xmlns:a14="http://schemas.microsoft.com/office/drawing/2010/main">
-        <mc:Choice Requires="a14">
-          <p:sp>
-            <p:nvSpPr>
-              <p:cNvPr id="617" name="TextBox 616">
-                <a:extLst>
-                  <a:ext uri="{FF2B5EF4-FFF2-40B4-BE49-F238E27FC236}">
-                    <a16:creationId xmlns:a16="http://schemas.microsoft.com/office/drawing/2014/main" id="{E7AAD1A9-6163-4F97-BBC3-272063C3F6A0}"/>
-                  </a:ext>
-                </a:extLst>
-              </p:cNvPr>
-              <p:cNvSpPr txBox="1"/>
-              <p:nvPr/>
-            </p:nvSpPr>
-            <p:spPr>
-              <a:xfrm>
-                <a:off x="664264" y="9584511"/>
-                <a:ext cx="4274061" cy="579389"/>
-              </a:xfrm>
-              <a:prstGeom prst="rect">
-                <a:avLst/>
-              </a:prstGeom>
-              <a:noFill/>
-            </p:spPr>
-            <p:txBody>
-              <a:bodyPr wrap="square" lIns="0" tIns="0" rIns="0" bIns="0" rtlCol="0">
-                <a:spAutoFit/>
-              </a:bodyPr>
-              <a:lstStyle/>
-              <a:p>
-                <a:pPr defTabSz="457200" eaLnBrk="1" fontAlgn="auto" hangingPunct="1">
-                  <a:spcBef>
-                    <a:spcPts val="0"/>
-                  </a:spcBef>
-                  <a:spcAft>
-                    <a:spcPts val="0"/>
-                  </a:spcAft>
-                </a:pPr>
-                <a14:m>
-                  <m:oMathPara xmlns:m="http://schemas.openxmlformats.org/officeDocument/2006/math">
-                    <m:oMathParaPr>
-                      <m:jc m:val="centerGroup"/>
-                    </m:oMathParaPr>
-                    <m:oMath xmlns:m="http://schemas.openxmlformats.org/officeDocument/2006/math">
-                      <m:r>
-                        <a:rPr lang="en-GB" sz="1200" b="0" i="1" smtClean="0">
-                          <a:solidFill>
-                            <a:prstClr val="black"/>
-                          </a:solidFill>
-                          <a:latin typeface="Cambria Math" panose="02040503050406030204" pitchFamily="18" charset="0"/>
-                        </a:rPr>
-                        <m:t>𝑃</m:t>
-                      </m:r>
-                      <m:r>
-                        <a:rPr lang="en-GB" sz="1200" b="0" i="1" baseline="-25000" smtClean="0">
-                          <a:solidFill>
-                            <a:prstClr val="black"/>
-                          </a:solidFill>
-                          <a:latin typeface="Cambria Math" panose="02040503050406030204" pitchFamily="18" charset="0"/>
-                        </a:rPr>
-                        <m:t>𝑐</m:t>
-                      </m:r>
-                      <m:r>
-                        <a:rPr lang="en-GB" sz="1200" b="0" i="1" smtClean="0">
-                          <a:solidFill>
-                            <a:prstClr val="black"/>
-                          </a:solidFill>
-                          <a:latin typeface="Cambria Math" panose="02040503050406030204" pitchFamily="18" charset="0"/>
-                        </a:rPr>
-                        <m:t>(</m:t>
-                      </m:r>
-                      <m:r>
-                        <a:rPr lang="en-GB" sz="1200" b="0" i="1" smtClean="0">
-                          <a:solidFill>
-                            <a:prstClr val="black"/>
-                          </a:solidFill>
-                          <a:latin typeface="Cambria Math" panose="02040503050406030204" pitchFamily="18" charset="0"/>
-                        </a:rPr>
-                        <m:t>𝑖</m:t>
-                      </m:r>
-                      <m:r>
-                        <a:rPr lang="en-GB" sz="1200" b="0" i="1" smtClean="0">
-                          <a:solidFill>
-                            <a:prstClr val="black"/>
-                          </a:solidFill>
-                          <a:latin typeface="Cambria Math" panose="02040503050406030204" pitchFamily="18" charset="0"/>
-                        </a:rPr>
-                        <m:t>,</m:t>
-                      </m:r>
-                      <m:r>
-                        <a:rPr lang="en-GB" sz="1200" b="0" i="1" smtClean="0">
-                          <a:solidFill>
-                            <a:prstClr val="black"/>
-                          </a:solidFill>
-                          <a:latin typeface="Cambria Math" panose="02040503050406030204" pitchFamily="18" charset="0"/>
-                        </a:rPr>
-                        <m:t>𝑗</m:t>
-                      </m:r>
-                      <m:r>
-                        <a:rPr lang="en-GB" sz="1200" b="0" i="1" smtClean="0">
-                          <a:solidFill>
-                            <a:prstClr val="black"/>
-                          </a:solidFill>
-                          <a:latin typeface="Cambria Math" panose="02040503050406030204" pitchFamily="18" charset="0"/>
-                        </a:rPr>
-                        <m:t>)= </m:t>
-                      </m:r>
-                      <m:r>
-                        <a:rPr lang="en-US" sz="1200" i="1" smtClean="0">
-                          <a:solidFill>
-                            <a:prstClr val="black"/>
-                          </a:solidFill>
-                          <a:latin typeface="Cambria Math" panose="02040503050406030204" pitchFamily="18" charset="0"/>
-                        </a:rPr>
-                        <m:t>𝐹</m:t>
-                      </m:r>
-                      <m:d>
-                        <m:dPr>
-                          <m:ctrlPr>
-                            <a:rPr lang="pt-BR" sz="1200" i="1" smtClean="0">
-                              <a:solidFill>
-                                <a:prstClr val="black"/>
-                              </a:solidFill>
-                              <a:latin typeface="Cambria Math" panose="02040503050406030204" pitchFamily="18" charset="0"/>
-                            </a:rPr>
-                          </m:ctrlPr>
-                        </m:dPr>
-                        <m:e>
-                          <m:r>
-                            <a:rPr lang="en-US" sz="1200" i="1" smtClean="0">
-                              <a:solidFill>
-                                <a:prstClr val="black"/>
-                              </a:solidFill>
-                              <a:latin typeface="Cambria Math" panose="02040503050406030204" pitchFamily="18" charset="0"/>
-                            </a:rPr>
-                            <m:t>𝑋</m:t>
-                          </m:r>
-                          <m:r>
-                            <a:rPr lang="en-US" sz="1200" i="1" smtClean="0">
-                              <a:solidFill>
-                                <a:prstClr val="black"/>
-                              </a:solidFill>
-                              <a:latin typeface="Cambria Math" panose="02040503050406030204" pitchFamily="18" charset="0"/>
-                              <a:ea typeface="Cambria Math" panose="02040503050406030204" pitchFamily="18" charset="0"/>
-                            </a:rPr>
-                            <m:t>≥</m:t>
-                          </m:r>
-                          <m:r>
-                            <a:rPr lang="pt-BR" sz="1200" i="1" smtClean="0">
-                              <a:solidFill>
-                                <a:prstClr val="black"/>
-                              </a:solidFill>
-                              <a:latin typeface="Cambria Math" panose="02040503050406030204" pitchFamily="18" charset="0"/>
-                            </a:rPr>
-                            <m:t>𝑥</m:t>
-                          </m:r>
-                          <m:r>
-                            <a:rPr lang="en-US" sz="1200" i="1" smtClean="0">
-                              <a:solidFill>
-                                <a:prstClr val="black"/>
-                              </a:solidFill>
-                              <a:latin typeface="Cambria Math" panose="02040503050406030204" pitchFamily="18" charset="0"/>
-                            </a:rPr>
-                            <m:t>|</m:t>
-                          </m:r>
-                          <m:r>
-                            <a:rPr lang="en-US" sz="1200" i="1" smtClean="0">
-                              <a:solidFill>
-                                <a:prstClr val="black"/>
-                              </a:solidFill>
-                              <a:latin typeface="Cambria Math" panose="02040503050406030204" pitchFamily="18" charset="0"/>
-                            </a:rPr>
-                            <m:t>𝑀</m:t>
-                          </m:r>
-                          <m:r>
-                            <a:rPr lang="en-US" sz="1200" i="1" smtClean="0">
-                              <a:solidFill>
-                                <a:prstClr val="black"/>
-                              </a:solidFill>
-                              <a:latin typeface="Cambria Math" panose="02040503050406030204" pitchFamily="18" charset="0"/>
-                            </a:rPr>
-                            <m:t>,</m:t>
-                          </m:r>
-                          <m:r>
-                            <a:rPr lang="en-US" sz="1200" i="1" smtClean="0">
-                              <a:solidFill>
-                                <a:prstClr val="black"/>
-                              </a:solidFill>
-                              <a:latin typeface="Cambria Math" panose="02040503050406030204" pitchFamily="18" charset="0"/>
-                            </a:rPr>
-                            <m:t>𝐾</m:t>
-                          </m:r>
-                          <m:r>
-                            <a:rPr lang="en-US" sz="1200" i="1" smtClean="0">
-                              <a:solidFill>
-                                <a:prstClr val="black"/>
-                              </a:solidFill>
-                              <a:latin typeface="Cambria Math" panose="02040503050406030204" pitchFamily="18" charset="0"/>
-                            </a:rPr>
-                            <m:t>,</m:t>
-                          </m:r>
-                          <m:r>
-                            <a:rPr lang="en-GB" sz="1200" b="0" i="1" smtClean="0">
-                              <a:solidFill>
-                                <a:prstClr val="black"/>
-                              </a:solidFill>
-                              <a:latin typeface="Cambria Math" panose="02040503050406030204" pitchFamily="18" charset="0"/>
-                            </a:rPr>
-                            <m:t>𝑛</m:t>
-                          </m:r>
-                        </m:e>
-                      </m:d>
-                      <m:r>
-                        <a:rPr lang="pt-BR" sz="1200" i="1" smtClean="0">
-                          <a:solidFill>
-                            <a:prstClr val="black"/>
-                          </a:solidFill>
-                          <a:latin typeface="Cambria Math" panose="02040503050406030204" pitchFamily="18" charset="0"/>
-                        </a:rPr>
-                        <m:t>=</m:t>
-                      </m:r>
-                      <m:r>
-                        <a:rPr lang="en-US" sz="1200" i="1" smtClean="0">
-                          <a:solidFill>
-                            <a:prstClr val="black"/>
-                          </a:solidFill>
-                          <a:latin typeface="Cambria Math" panose="02040503050406030204" pitchFamily="18" charset="0"/>
-                        </a:rPr>
-                        <m:t>1−</m:t>
-                      </m:r>
-                      <m:nary>
-                        <m:naryPr>
-                          <m:chr m:val="∑"/>
-                          <m:ctrlPr>
-                            <a:rPr lang="pt-BR" sz="1200" i="1" smtClean="0">
-                              <a:solidFill>
-                                <a:prstClr val="black"/>
-                              </a:solidFill>
-                              <a:latin typeface="Cambria Math" panose="02040503050406030204" pitchFamily="18" charset="0"/>
-                            </a:rPr>
-                          </m:ctrlPr>
-                        </m:naryPr>
-                        <m:sub>
-                          <m:r>
-                            <a:rPr lang="pt-BR" sz="1200" i="1" smtClean="0">
-                              <a:solidFill>
-                                <a:prstClr val="black"/>
-                              </a:solidFill>
-                              <a:latin typeface="Cambria Math" panose="02040503050406030204" pitchFamily="18" charset="0"/>
-                            </a:rPr>
-                            <m:t>0</m:t>
-                          </m:r>
-                        </m:sub>
-                        <m:sup>
-                          <m:r>
-                            <a:rPr lang="en-US" sz="1200" i="1" smtClean="0">
-                              <a:solidFill>
-                                <a:prstClr val="black"/>
-                              </a:solidFill>
-                              <a:latin typeface="Cambria Math" panose="02040503050406030204" pitchFamily="18" charset="0"/>
-                            </a:rPr>
-                            <m:t>𝑥</m:t>
-                          </m:r>
-                          <m:r>
-                            <a:rPr lang="en-US" sz="1200" i="1" smtClean="0">
-                              <a:solidFill>
-                                <a:prstClr val="black"/>
-                              </a:solidFill>
-                              <a:latin typeface="Cambria Math" panose="02040503050406030204" pitchFamily="18" charset="0"/>
-                            </a:rPr>
-                            <m:t>−1</m:t>
-                          </m:r>
-                        </m:sup>
-                        <m:e>
-                          <m:f>
-                            <m:fPr>
-                              <m:ctrlPr>
-                                <a:rPr lang="pt-BR" sz="1200" i="1" smtClean="0">
-                                  <a:solidFill>
-                                    <a:prstClr val="black"/>
-                                  </a:solidFill>
-                                  <a:latin typeface="Cambria Math" panose="02040503050406030204" pitchFamily="18" charset="0"/>
-                                </a:rPr>
-                              </m:ctrlPr>
-                            </m:fPr>
-                            <m:num>
-                              <m:d>
-                                <m:dPr>
-                                  <m:ctrlPr>
-                                    <a:rPr lang="pt-BR" sz="1200" i="1" smtClean="0">
-                                      <a:solidFill>
-                                        <a:prstClr val="black"/>
-                                      </a:solidFill>
-                                      <a:latin typeface="Cambria Math" panose="02040503050406030204" pitchFamily="18" charset="0"/>
-                                    </a:rPr>
-                                  </m:ctrlPr>
-                                </m:dPr>
-                                <m:e>
-                                  <m:f>
-                                    <m:fPr>
-                                      <m:type m:val="noBar"/>
-                                      <m:ctrlPr>
-                                        <a:rPr lang="pt-BR" sz="1200" i="1" smtClean="0">
-                                          <a:solidFill>
-                                            <a:prstClr val="black"/>
-                                          </a:solidFill>
-                                          <a:latin typeface="Cambria Math" panose="02040503050406030204" pitchFamily="18" charset="0"/>
-                                        </a:rPr>
-                                      </m:ctrlPr>
-                                    </m:fPr>
-                                    <m:num>
-                                      <m:r>
-                                        <a:rPr lang="en-US" sz="1200" i="1" smtClean="0">
-                                          <a:solidFill>
-                                            <a:prstClr val="black"/>
-                                          </a:solidFill>
-                                          <a:latin typeface="Cambria Math" panose="02040503050406030204" pitchFamily="18" charset="0"/>
-                                        </a:rPr>
-                                        <m:t>𝐾</m:t>
-                                      </m:r>
-                                    </m:num>
-                                    <m:den>
-                                      <m:r>
-                                        <a:rPr lang="en-US" sz="1200" i="1" smtClean="0">
-                                          <a:solidFill>
-                                            <a:prstClr val="black"/>
-                                          </a:solidFill>
-                                          <a:latin typeface="Cambria Math" panose="02040503050406030204" pitchFamily="18" charset="0"/>
-                                        </a:rPr>
-                                        <m:t>𝑥</m:t>
-                                      </m:r>
-                                    </m:den>
-                                  </m:f>
-                                </m:e>
-                              </m:d>
-                              <m:d>
-                                <m:dPr>
-                                  <m:ctrlPr>
-                                    <a:rPr lang="pt-BR" sz="1200" i="1">
-                                      <a:solidFill>
-                                        <a:prstClr val="black"/>
-                                      </a:solidFill>
-                                      <a:latin typeface="Cambria Math" panose="02040503050406030204" pitchFamily="18" charset="0"/>
-                                    </a:rPr>
-                                  </m:ctrlPr>
-                                </m:dPr>
-                                <m:e>
-                                  <m:f>
-                                    <m:fPr>
-                                      <m:type m:val="noBar"/>
-                                      <m:ctrlPr>
-                                        <a:rPr lang="pt-BR" sz="1200" i="1">
-                                          <a:solidFill>
-                                            <a:prstClr val="black"/>
-                                          </a:solidFill>
-                                          <a:latin typeface="Cambria Math" panose="02040503050406030204" pitchFamily="18" charset="0"/>
-                                        </a:rPr>
-                                      </m:ctrlPr>
-                                    </m:fPr>
-                                    <m:num>
-                                      <m:r>
-                                        <a:rPr lang="en-GB" sz="1200" b="0" i="1" smtClean="0">
-                                          <a:solidFill>
-                                            <a:prstClr val="black"/>
-                                          </a:solidFill>
-                                          <a:latin typeface="Cambria Math" panose="02040503050406030204" pitchFamily="18" charset="0"/>
-                                        </a:rPr>
-                                        <m:t>𝑁</m:t>
-                                      </m:r>
-                                      <m:r>
-                                        <a:rPr lang="en-US" sz="1200" i="1" smtClean="0">
-                                          <a:solidFill>
-                                            <a:prstClr val="black"/>
-                                          </a:solidFill>
-                                          <a:latin typeface="Cambria Math" panose="02040503050406030204" pitchFamily="18" charset="0"/>
-                                        </a:rPr>
-                                        <m:t>−</m:t>
-                                      </m:r>
-                                      <m:r>
-                                        <a:rPr lang="en-US" sz="1200" i="1" smtClean="0">
-                                          <a:solidFill>
-                                            <a:prstClr val="black"/>
-                                          </a:solidFill>
-                                          <a:latin typeface="Cambria Math" panose="02040503050406030204" pitchFamily="18" charset="0"/>
-                                        </a:rPr>
-                                        <m:t>𝐾</m:t>
-                                      </m:r>
-                                    </m:num>
-                                    <m:den>
-                                      <m:r>
-                                        <a:rPr lang="en-GB" sz="1200" b="0" i="1" smtClean="0">
-                                          <a:solidFill>
-                                            <a:prstClr val="black"/>
-                                          </a:solidFill>
-                                          <a:latin typeface="Cambria Math" panose="02040503050406030204" pitchFamily="18" charset="0"/>
-                                        </a:rPr>
-                                        <m:t>𝑛</m:t>
-                                      </m:r>
-                                      <m:r>
-                                        <a:rPr lang="en-US" sz="1200" i="1" smtClean="0">
-                                          <a:solidFill>
-                                            <a:prstClr val="black"/>
-                                          </a:solidFill>
-                                          <a:latin typeface="Cambria Math" panose="02040503050406030204" pitchFamily="18" charset="0"/>
-                                        </a:rPr>
-                                        <m:t>−</m:t>
-                                      </m:r>
-                                      <m:r>
-                                        <a:rPr lang="en-US" sz="1200" i="1" smtClean="0">
-                                          <a:solidFill>
-                                            <a:prstClr val="black"/>
-                                          </a:solidFill>
-                                          <a:latin typeface="Cambria Math" panose="02040503050406030204" pitchFamily="18" charset="0"/>
-                                        </a:rPr>
-                                        <m:t>𝑥</m:t>
-                                      </m:r>
-                                    </m:den>
-                                  </m:f>
-                                </m:e>
-                              </m:d>
-                            </m:num>
-                            <m:den>
-                              <m:d>
-                                <m:dPr>
-                                  <m:ctrlPr>
-                                    <a:rPr lang="pt-BR" sz="1200" i="1">
-                                      <a:solidFill>
-                                        <a:prstClr val="black"/>
-                                      </a:solidFill>
-                                      <a:latin typeface="Cambria Math" panose="02040503050406030204" pitchFamily="18" charset="0"/>
-                                    </a:rPr>
-                                  </m:ctrlPr>
-                                </m:dPr>
-                                <m:e>
-                                  <m:f>
-                                    <m:fPr>
-                                      <m:type m:val="noBar"/>
-                                      <m:ctrlPr>
-                                        <a:rPr lang="pt-BR" sz="1200" i="1">
-                                          <a:solidFill>
-                                            <a:prstClr val="black"/>
-                                          </a:solidFill>
-                                          <a:latin typeface="Cambria Math" panose="02040503050406030204" pitchFamily="18" charset="0"/>
-                                        </a:rPr>
-                                      </m:ctrlPr>
-                                    </m:fPr>
-                                    <m:num>
-                                      <m:r>
-                                        <a:rPr lang="en-GB" sz="1200" b="0" i="1" smtClean="0">
-                                          <a:solidFill>
-                                            <a:prstClr val="black"/>
-                                          </a:solidFill>
-                                          <a:latin typeface="Cambria Math" panose="02040503050406030204" pitchFamily="18" charset="0"/>
-                                        </a:rPr>
-                                        <m:t>𝑁</m:t>
-                                      </m:r>
-                                    </m:num>
-                                    <m:den>
-                                      <m:r>
-                                        <a:rPr lang="en-GB" sz="1200" b="0" i="1" smtClean="0">
-                                          <a:solidFill>
-                                            <a:prstClr val="black"/>
-                                          </a:solidFill>
-                                          <a:latin typeface="Cambria Math" panose="02040503050406030204" pitchFamily="18" charset="0"/>
-                                        </a:rPr>
-                                        <m:t>𝑛</m:t>
-                                      </m:r>
-                                    </m:den>
-                                  </m:f>
-                                </m:e>
-                              </m:d>
-                            </m:den>
-                          </m:f>
-                        </m:e>
-                      </m:nary>
-                    </m:oMath>
-                  </m:oMathPara>
-                </a14:m>
-                <a:endParaRPr lang="nl-NL" sz="1200" dirty="0">
-                  <a:solidFill>
-                    <a:prstClr val="black"/>
-                  </a:solidFill>
-                  <a:latin typeface="Calibri Light" panose="020F0302020204030204"/>
-                </a:endParaRPr>
-              </a:p>
-            </p:txBody>
-          </p:sp>
-        </mc:Choice>
-        <mc:Fallback xmlns="">
-          <p:sp>
-            <p:nvSpPr>
-              <p:cNvPr id="617" name="TextBox 616">
-                <a:extLst>
-                  <a:ext uri="{FF2B5EF4-FFF2-40B4-BE49-F238E27FC236}">
-                    <a16:creationId xmlns:a16="http://schemas.microsoft.com/office/drawing/2014/main" id="{E7AAD1A9-6163-4F97-BBC3-272063C3F6A0}"/>
-                  </a:ext>
-                </a:extLst>
-              </p:cNvPr>
-              <p:cNvSpPr txBox="1">
-                <a:spLocks noRot="1" noChangeAspect="1" noMove="1" noResize="1" noEditPoints="1" noAdjustHandles="1" noChangeArrowheads="1" noChangeShapeType="1" noTextEdit="1"/>
-              </p:cNvSpPr>
-              <p:nvPr/>
-            </p:nvSpPr>
-            <p:spPr>
-              <a:xfrm>
-                <a:off x="664264" y="9584511"/>
-                <a:ext cx="4274061" cy="579389"/>
-              </a:xfrm>
-              <a:prstGeom prst="rect">
-                <a:avLst/>
-              </a:prstGeom>
-              <a:blipFill>
-                <a:blip r:embed="rId3"/>
-                <a:stretch>
-                  <a:fillRect/>
-                </a:stretch>
-              </a:blipFill>
-            </p:spPr>
-            <p:txBody>
-              <a:bodyPr/>
-              <a:lstStyle/>
-              <a:p>
-                <a:r>
-                  <a:rPr lang="en-NL">
-                    <a:noFill/>
-                  </a:rPr>
-                  <a:t> </a:t>
-                </a:r>
-              </a:p>
-            </p:txBody>
-          </p:sp>
-        </mc:Fallback>
-      </mc:AlternateContent>
       <mc:AlternateContent xmlns:mc="http://schemas.openxmlformats.org/markup-compatibility/2006" xmlns:a14="http://schemas.microsoft.com/office/drawing/2010/main">
         <mc:Choice Requires="a14">
           <p:sp>
@@ -5541,8 +5094,8 @@
         </p:nvSpPr>
         <p:spPr>
           <a:xfrm>
-            <a:off x="10434929" y="1434328"/>
-            <a:ext cx="885543" cy="3057833"/>
+            <a:off x="8832567" y="1434330"/>
+            <a:ext cx="885543" cy="3025262"/>
           </a:xfrm>
           <a:prstGeom prst="roundRect">
             <a:avLst>
@@ -5612,270 +5165,6 @@
           </a:p>
         </p:txBody>
       </p:sp>
-      <mc:AlternateContent xmlns:mc="http://schemas.openxmlformats.org/markup-compatibility/2006" xmlns:a14="http://schemas.microsoft.com/office/drawing/2010/main">
-        <mc:Choice Requires="a14">
-          <p:sp>
-            <p:nvSpPr>
-              <p:cNvPr id="629" name="TextBox 628">
-                <a:extLst>
-                  <a:ext uri="{FF2B5EF4-FFF2-40B4-BE49-F238E27FC236}">
-                    <a16:creationId xmlns:a16="http://schemas.microsoft.com/office/drawing/2014/main" id="{E9E09729-BB39-4768-A213-7476C22C0CAB}"/>
-                  </a:ext>
-                </a:extLst>
-              </p:cNvPr>
-              <p:cNvSpPr txBox="1"/>
-              <p:nvPr/>
-            </p:nvSpPr>
-            <p:spPr>
-              <a:xfrm>
-                <a:off x="9979212" y="6164633"/>
-                <a:ext cx="1603178" cy="371833"/>
-              </a:xfrm>
-              <a:prstGeom prst="rect">
-                <a:avLst/>
-              </a:prstGeom>
-              <a:noFill/>
-            </p:spPr>
-            <p:txBody>
-              <a:bodyPr wrap="square" lIns="0" tIns="0" rIns="0" bIns="0" rtlCol="0">
-                <a:spAutoFit/>
-              </a:bodyPr>
-              <a:lstStyle/>
-              <a:p>
-                <a:pPr/>
-                <a14:m>
-                  <m:oMathPara xmlns:m="http://schemas.openxmlformats.org/officeDocument/2006/math">
-                    <m:oMathParaPr>
-                      <m:jc m:val="centerGroup"/>
-                    </m:oMathParaPr>
-                    <m:oMath xmlns:m="http://schemas.openxmlformats.org/officeDocument/2006/math">
-                      <m:d>
-                        <m:dPr>
-                          <m:ctrlPr>
-                            <a:rPr lang="pt-BR" sz="1200" i="1" smtClean="0">
-                              <a:solidFill>
-                                <a:prstClr val="black"/>
-                              </a:solidFill>
-                              <a:latin typeface="Cambria Math" panose="02040503050406030204" pitchFamily="18" charset="0"/>
-                            </a:rPr>
-                          </m:ctrlPr>
-                        </m:dPr>
-                        <m:e>
-                          <m:f>
-                            <m:fPr>
-                              <m:type m:val="noBar"/>
-                              <m:ctrlPr>
-                                <a:rPr lang="pt-BR" sz="1200" i="1">
-                                  <a:solidFill>
-                                    <a:prstClr val="black"/>
-                                  </a:solidFill>
-                                  <a:latin typeface="Cambria Math" panose="02040503050406030204" pitchFamily="18" charset="0"/>
-                                </a:rPr>
-                              </m:ctrlPr>
-                            </m:fPr>
-                            <m:num>
-                              <m:r>
-                                <a:rPr lang="en-GB" sz="1200" b="0" i="1" smtClean="0">
-                                  <a:solidFill>
-                                    <a:prstClr val="black"/>
-                                  </a:solidFill>
-                                  <a:latin typeface="Cambria Math" panose="02040503050406030204" pitchFamily="18" charset="0"/>
-                                </a:rPr>
-                                <m:t>𝑛</m:t>
-                              </m:r>
-                            </m:num>
-                            <m:den>
-                              <m:r>
-                                <a:rPr lang="en-GB" sz="1200" b="0" i="1" smtClean="0">
-                                  <a:solidFill>
-                                    <a:prstClr val="black"/>
-                                  </a:solidFill>
-                                  <a:latin typeface="Cambria Math" panose="02040503050406030204" pitchFamily="18" charset="0"/>
-                                </a:rPr>
-                                <m:t>𝑘</m:t>
-                              </m:r>
-                            </m:den>
-                          </m:f>
-                        </m:e>
-                      </m:d>
-                      <m:r>
-                        <a:rPr lang="en-US" sz="1200" i="1">
-                          <a:solidFill>
-                            <a:prstClr val="black"/>
-                          </a:solidFill>
-                          <a:latin typeface="Cambria Math" panose="02040503050406030204" pitchFamily="18" charset="0"/>
-                        </a:rPr>
-                        <m:t> </m:t>
-                      </m:r>
-                      <m:r>
-                        <a:rPr lang="pt-BR" sz="1200" i="1" smtClean="0">
-                          <a:solidFill>
-                            <a:prstClr val="black"/>
-                          </a:solidFill>
-                          <a:latin typeface="Cambria Math" panose="02040503050406030204" pitchFamily="18" charset="0"/>
-                        </a:rPr>
-                        <m:t>=</m:t>
-                      </m:r>
-                      <m:f>
-                        <m:fPr>
-                          <m:ctrlPr>
-                            <a:rPr lang="en-US" sz="1200" i="1" smtClean="0">
-                              <a:solidFill>
-                                <a:prstClr val="black"/>
-                              </a:solidFill>
-                              <a:latin typeface="Cambria Math" panose="02040503050406030204" pitchFamily="18" charset="0"/>
-                            </a:rPr>
-                          </m:ctrlPr>
-                        </m:fPr>
-                        <m:num>
-                          <m:r>
-                            <a:rPr lang="en-GB" sz="1200" b="0" i="1" smtClean="0">
-                              <a:solidFill>
-                                <a:prstClr val="black"/>
-                              </a:solidFill>
-                              <a:latin typeface="Cambria Math" panose="02040503050406030204" pitchFamily="18" charset="0"/>
-                            </a:rPr>
-                            <m:t>𝑛</m:t>
-                          </m:r>
-                          <m:r>
-                            <a:rPr lang="en-GB" sz="1200" b="0" i="1" smtClean="0">
-                              <a:solidFill>
-                                <a:prstClr val="black"/>
-                              </a:solidFill>
-                              <a:latin typeface="Cambria Math" panose="02040503050406030204" pitchFamily="18" charset="0"/>
-                            </a:rPr>
-                            <m:t>!</m:t>
-                          </m:r>
-                        </m:num>
-                        <m:den>
-                          <m:r>
-                            <a:rPr lang="en-GB" sz="1200" b="0" i="1" smtClean="0">
-                              <a:solidFill>
-                                <a:prstClr val="black"/>
-                              </a:solidFill>
-                              <a:latin typeface="Cambria Math" panose="02040503050406030204" pitchFamily="18" charset="0"/>
-                            </a:rPr>
-                            <m:t>𝑘</m:t>
-                          </m:r>
-                          <m:r>
-                            <a:rPr lang="en-GB" sz="1200" b="0" i="1" smtClean="0">
-                              <a:solidFill>
-                                <a:prstClr val="black"/>
-                              </a:solidFill>
-                              <a:latin typeface="Cambria Math" panose="02040503050406030204" pitchFamily="18" charset="0"/>
-                            </a:rPr>
-                            <m:t>!</m:t>
-                          </m:r>
-                          <m:d>
-                            <m:dPr>
-                              <m:ctrlPr>
-                                <a:rPr lang="en-GB" sz="1200" b="0" i="1" smtClean="0">
-                                  <a:solidFill>
-                                    <a:prstClr val="black"/>
-                                  </a:solidFill>
-                                  <a:latin typeface="Cambria Math" panose="02040503050406030204" pitchFamily="18" charset="0"/>
-                                </a:rPr>
-                              </m:ctrlPr>
-                            </m:dPr>
-                            <m:e>
-                              <m:r>
-                                <a:rPr lang="en-GB" sz="1200" b="0" i="1" smtClean="0">
-                                  <a:solidFill>
-                                    <a:prstClr val="black"/>
-                                  </a:solidFill>
-                                  <a:latin typeface="Cambria Math" panose="02040503050406030204" pitchFamily="18" charset="0"/>
-                                </a:rPr>
-                                <m:t>𝑛</m:t>
-                              </m:r>
-                              <m:r>
-                                <a:rPr lang="en-GB" sz="1200" b="0" i="1" smtClean="0">
-                                  <a:solidFill>
-                                    <a:prstClr val="black"/>
-                                  </a:solidFill>
-                                  <a:latin typeface="Cambria Math" panose="02040503050406030204" pitchFamily="18" charset="0"/>
-                                </a:rPr>
-                                <m:t>−</m:t>
-                              </m:r>
-                              <m:r>
-                                <a:rPr lang="en-GB" sz="1200" b="0" i="1" smtClean="0">
-                                  <a:solidFill>
-                                    <a:prstClr val="black"/>
-                                  </a:solidFill>
-                                  <a:latin typeface="Cambria Math" panose="02040503050406030204" pitchFamily="18" charset="0"/>
-                                </a:rPr>
-                                <m:t>𝑘</m:t>
-                              </m:r>
-                            </m:e>
-                          </m:d>
-                          <m:r>
-                            <a:rPr lang="en-GB" sz="1200" b="0" i="1" smtClean="0">
-                              <a:solidFill>
-                                <a:prstClr val="black"/>
-                              </a:solidFill>
-                              <a:latin typeface="Cambria Math" panose="02040503050406030204" pitchFamily="18" charset="0"/>
-                            </a:rPr>
-                            <m:t>!</m:t>
-                          </m:r>
-                        </m:den>
-                      </m:f>
-                    </m:oMath>
-                  </m:oMathPara>
-                </a14:m>
-                <a:endParaRPr lang="nl-NL" sz="1200" i="1" dirty="0">
-                  <a:solidFill>
-                    <a:prstClr val="black"/>
-                  </a:solidFill>
-                  <a:latin typeface="Calibri Light" panose="020F0302020204030204"/>
-                </a:endParaRPr>
-              </a:p>
-            </p:txBody>
-          </p:sp>
-        </mc:Choice>
-        <mc:Fallback xmlns="">
-          <p:sp>
-            <p:nvSpPr>
-              <p:cNvPr id="629" name="TextBox 628">
-                <a:extLst>
-                  <a:ext uri="{FF2B5EF4-FFF2-40B4-BE49-F238E27FC236}">
-                    <a16:creationId xmlns:a16="http://schemas.microsoft.com/office/drawing/2014/main" id="{E9E09729-BB39-4768-A213-7476C22C0CAB}"/>
-                  </a:ext>
-                </a:extLst>
-              </p:cNvPr>
-              <p:cNvSpPr txBox="1">
-                <a:spLocks noRot="1" noChangeAspect="1" noMove="1" noResize="1" noEditPoints="1" noAdjustHandles="1" noChangeArrowheads="1" noChangeShapeType="1" noTextEdit="1"/>
-              </p:cNvSpPr>
-              <p:nvPr/>
-            </p:nvSpPr>
-            <p:spPr>
-              <a:xfrm>
-                <a:off x="9979212" y="6164633"/>
-                <a:ext cx="1603178" cy="371833"/>
-              </a:xfrm>
-              <a:prstGeom prst="rect">
-                <a:avLst/>
-              </a:prstGeom>
-              <a:blipFill>
-                <a:blip r:embed="rId5"/>
-                <a:stretch>
-                  <a:fillRect t="-1639" b="-8197"/>
-                </a:stretch>
-              </a:blipFill>
-            </p:spPr>
-            <p:txBody>
-              <a:bodyPr/>
-              <a:lstStyle/>
-              <a:p>
-                <a:r>
-                  <a:rPr lang="en-NL">
-                    <a:noFill/>
-                  </a:rPr>
-                  <a:t> </a:t>
-                </a:r>
-              </a:p>
-            </p:txBody>
-          </p:sp>
-        </mc:Fallback>
-      </mc:AlternateContent>
       <p:sp>
         <p:nvSpPr>
           <p:cNvPr id="630" name="Rectangle: Rounded Corners 629">
@@ -5890,8 +5179,8 @@
         </p:nvSpPr>
         <p:spPr>
           <a:xfrm>
-            <a:off x="8905130" y="1434327"/>
-            <a:ext cx="1457731" cy="3057833"/>
+            <a:off x="9831424" y="1442597"/>
+            <a:ext cx="1457731" cy="3038301"/>
           </a:xfrm>
           <a:prstGeom prst="roundRect">
             <a:avLst>
@@ -6056,7 +5345,7 @@
             <p:nvPr/>
           </p:nvPicPr>
           <p:blipFill rotWithShape="1">
-            <a:blip r:embed="rId6">
+            <a:blip r:embed="rId5">
               <a:clrChange>
                 <a:clrFrom>
                   <a:srgbClr val="FAFAFA"/>
@@ -6242,339 +5531,6 @@
           </a:p>
         </p:txBody>
       </p:sp>
-      <mc:AlternateContent xmlns:mc="http://schemas.openxmlformats.org/markup-compatibility/2006" xmlns:a14="http://schemas.microsoft.com/office/drawing/2010/main">
-        <mc:Choice Requires="a14">
-          <p:sp>
-            <p:nvSpPr>
-              <p:cNvPr id="638" name="TextBox 637">
-                <a:extLst>
-                  <a:ext uri="{FF2B5EF4-FFF2-40B4-BE49-F238E27FC236}">
-                    <a16:creationId xmlns:a16="http://schemas.microsoft.com/office/drawing/2014/main" id="{0E49642D-DADD-48CB-9BAE-7B677F649B7B}"/>
-                  </a:ext>
-                </a:extLst>
-              </p:cNvPr>
-              <p:cNvSpPr txBox="1"/>
-              <p:nvPr/>
-            </p:nvSpPr>
-            <p:spPr>
-              <a:xfrm>
-                <a:off x="9697534" y="4954516"/>
-                <a:ext cx="2331144" cy="672107"/>
-              </a:xfrm>
-              <a:prstGeom prst="rect">
-                <a:avLst/>
-              </a:prstGeom>
-              <a:noFill/>
-            </p:spPr>
-            <p:txBody>
-              <a:bodyPr wrap="square" lIns="0" tIns="0" rIns="0" bIns="0" rtlCol="0">
-                <a:spAutoFit/>
-              </a:bodyPr>
-              <a:lstStyle/>
-              <a:p>
-                <a:pPr/>
-                <a14:m>
-                  <m:oMathPara xmlns:m="http://schemas.openxmlformats.org/officeDocument/2006/math">
-                    <m:oMathParaPr>
-                      <m:jc m:val="centerGroup"/>
-                    </m:oMathParaPr>
-                    <m:oMath xmlns:m="http://schemas.openxmlformats.org/officeDocument/2006/math">
-                      <m:sSub>
-                        <m:sSubPr>
-                          <m:ctrlPr>
-                            <a:rPr lang="en-NL" i="1">
-                              <a:latin typeface="Cambria Math" panose="02040503050406030204" pitchFamily="18" charset="0"/>
-                            </a:rPr>
-                          </m:ctrlPr>
-                        </m:sSubPr>
-                        <m:e>
-                          <m:r>
-                            <a:rPr lang="en-GB" i="1">
-                              <a:latin typeface="Cambria Math" panose="02040503050406030204" pitchFamily="18" charset="0"/>
-                            </a:rPr>
-                            <m:t>𝑋</m:t>
-                          </m:r>
-                        </m:e>
-                        <m:sub>
-                          <m:r>
-                            <a:rPr lang="en-GB" i="1">
-                              <a:latin typeface="Cambria Math" panose="02040503050406030204" pitchFamily="18" charset="0"/>
-                            </a:rPr>
-                            <m:t>𝑐</m:t>
-                          </m:r>
-                        </m:sub>
-                      </m:sSub>
-                      <m:r>
-                        <a:rPr lang="pt-BR" sz="1200" i="1" smtClean="0">
-                          <a:solidFill>
-                            <a:prstClr val="black"/>
-                          </a:solidFill>
-                          <a:latin typeface="Cambria Math" panose="02040503050406030204" pitchFamily="18" charset="0"/>
-                        </a:rPr>
-                        <m:t>=</m:t>
-                      </m:r>
-                      <m:nary>
-                        <m:naryPr>
-                          <m:chr m:val="∏"/>
-                          <m:ctrlPr>
-                            <a:rPr lang="pt-BR" sz="1200" i="1" smtClean="0">
-                              <a:solidFill>
-                                <a:prstClr val="black"/>
-                              </a:solidFill>
-                              <a:latin typeface="Cambria Math" panose="02040503050406030204" pitchFamily="18" charset="0"/>
-                            </a:rPr>
-                          </m:ctrlPr>
-                        </m:naryPr>
-                        <m:sub>
-                          <m:r>
-                            <a:rPr lang="en-GB" sz="1200" b="0" i="1" smtClean="0">
-                              <a:solidFill>
-                                <a:prstClr val="black"/>
-                              </a:solidFill>
-                              <a:latin typeface="Cambria Math" panose="02040503050406030204" pitchFamily="18" charset="0"/>
-                            </a:rPr>
-                            <m:t>𝑘</m:t>
-                          </m:r>
-                          <m:r>
-                            <a:rPr lang="en-GB" sz="1200" b="0" i="1" smtClean="0">
-                              <a:solidFill>
-                                <a:prstClr val="black"/>
-                              </a:solidFill>
-                              <a:latin typeface="Cambria Math" panose="02040503050406030204" pitchFamily="18" charset="0"/>
-                            </a:rPr>
-                            <m:t>=1..</m:t>
-                          </m:r>
-                          <m:r>
-                            <a:rPr lang="en-GB" sz="1200" b="0" i="1" smtClean="0">
-                              <a:solidFill>
-                                <a:prstClr val="black"/>
-                              </a:solidFill>
-                              <a:latin typeface="Cambria Math" panose="02040503050406030204" pitchFamily="18" charset="0"/>
-                            </a:rPr>
-                            <m:t>𝑛</m:t>
-                          </m:r>
-                        </m:sub>
-                        <m:sup>
-                          <m:d>
-                            <m:dPr>
-                              <m:ctrlPr>
-                                <a:rPr lang="pt-BR" sz="1200" i="1" smtClean="0">
-                                  <a:solidFill>
-                                    <a:prstClr val="black"/>
-                                  </a:solidFill>
-                                  <a:latin typeface="Cambria Math" panose="02040503050406030204" pitchFamily="18" charset="0"/>
-                                </a:rPr>
-                              </m:ctrlPr>
-                            </m:dPr>
-                            <m:e>
-                              <m:f>
-                                <m:fPr>
-                                  <m:type m:val="noBar"/>
-                                  <m:ctrlPr>
-                                    <a:rPr lang="pt-BR" sz="1200" i="1" smtClean="0">
-                                      <a:solidFill>
-                                        <a:prstClr val="black"/>
-                                      </a:solidFill>
-                                      <a:latin typeface="Cambria Math" panose="02040503050406030204" pitchFamily="18" charset="0"/>
-                                    </a:rPr>
-                                  </m:ctrlPr>
-                                </m:fPr>
-                                <m:num>
-                                  <m:r>
-                                    <a:rPr lang="en-GB" sz="1200" b="0" i="1" smtClean="0">
-                                      <a:solidFill>
-                                        <a:prstClr val="black"/>
-                                      </a:solidFill>
-                                      <a:latin typeface="Cambria Math" panose="02040503050406030204" pitchFamily="18" charset="0"/>
-                                    </a:rPr>
-                                    <m:t>𝑛</m:t>
-                                  </m:r>
-                                </m:num>
-                                <m:den>
-                                  <m:r>
-                                    <a:rPr lang="en-GB" sz="1200" b="0" i="1" smtClean="0">
-                                      <a:solidFill>
-                                        <a:prstClr val="black"/>
-                                      </a:solidFill>
-                                      <a:latin typeface="Cambria Math" panose="02040503050406030204" pitchFamily="18" charset="0"/>
-                                    </a:rPr>
-                                    <m:t>𝑘</m:t>
-                                  </m:r>
-                                </m:den>
-                              </m:f>
-                            </m:e>
-                          </m:d>
-                        </m:sup>
-                        <m:e>
-                          <m:d>
-                            <m:dPr>
-                              <m:ctrlPr>
-                                <a:rPr lang="en-GB" sz="1200" b="0" i="1" smtClean="0">
-                                  <a:solidFill>
-                                    <a:prstClr val="black"/>
-                                  </a:solidFill>
-                                  <a:latin typeface="Cambria Math" panose="02040503050406030204" pitchFamily="18" charset="0"/>
-                                </a:rPr>
-                              </m:ctrlPr>
-                            </m:dPr>
-                            <m:e>
-                              <m:sSup>
-                                <m:sSupPr>
-                                  <m:ctrlPr>
-                                    <a:rPr lang="en-GB" sz="1200" b="0" i="1" smtClean="0">
-                                      <a:solidFill>
-                                        <a:prstClr val="black"/>
-                                      </a:solidFill>
-                                      <a:latin typeface="Cambria Math" panose="02040503050406030204" pitchFamily="18" charset="0"/>
-                                    </a:rPr>
-                                  </m:ctrlPr>
-                                </m:sSupPr>
-                                <m:e>
-                                  <m:r>
-                                    <a:rPr lang="en-GB" sz="1200" b="0" i="1" smtClean="0">
-                                      <a:solidFill>
-                                        <a:prstClr val="black"/>
-                                      </a:solidFill>
-                                      <a:latin typeface="Cambria Math" panose="02040503050406030204" pitchFamily="18" charset="0"/>
-                                    </a:rPr>
-                                    <m:t>𝑋</m:t>
-                                  </m:r>
-                                </m:e>
-                                <m:sup>
-                                  <m:r>
-                                    <a:rPr lang="en-GB" sz="1200" b="0" i="1" smtClean="0">
-                                      <a:solidFill>
-                                        <a:prstClr val="black"/>
-                                      </a:solidFill>
-                                      <a:latin typeface="Cambria Math" panose="02040503050406030204" pitchFamily="18" charset="0"/>
-                                    </a:rPr>
-                                    <m:t>𝑖</m:t>
-                                  </m:r>
-                                </m:sup>
-                              </m:sSup>
-                              <m:r>
-                                <a:rPr lang="en-GB" sz="1200" b="0" i="1" smtClean="0">
-                                  <a:solidFill>
-                                    <a:prstClr val="black"/>
-                                  </a:solidFill>
-                                  <a:latin typeface="Cambria Math" panose="02040503050406030204" pitchFamily="18" charset="0"/>
-                                </a:rPr>
-                                <m:t>,..,</m:t>
-                              </m:r>
-                              <m:sSup>
-                                <m:sSupPr>
-                                  <m:ctrlPr>
-                                    <a:rPr lang="en-GB" sz="1200" i="1">
-                                      <a:solidFill>
-                                        <a:prstClr val="black"/>
-                                      </a:solidFill>
-                                      <a:latin typeface="Cambria Math" panose="02040503050406030204" pitchFamily="18" charset="0"/>
-                                    </a:rPr>
-                                  </m:ctrlPr>
-                                </m:sSupPr>
-                                <m:e>
-                                  <m:r>
-                                    <a:rPr lang="en-GB" sz="1200" i="1">
-                                      <a:solidFill>
-                                        <a:prstClr val="black"/>
-                                      </a:solidFill>
-                                      <a:latin typeface="Cambria Math" panose="02040503050406030204" pitchFamily="18" charset="0"/>
-                                    </a:rPr>
-                                    <m:t>𝑋</m:t>
-                                  </m:r>
-                                </m:e>
-                                <m:sup>
-                                  <m:r>
-                                    <a:rPr lang="en-GB" sz="1200" b="0" i="1" smtClean="0">
-                                      <a:solidFill>
-                                        <a:prstClr val="black"/>
-                                      </a:solidFill>
-                                      <a:latin typeface="Cambria Math" panose="02040503050406030204" pitchFamily="18" charset="0"/>
-                                    </a:rPr>
-                                    <m:t>𝑗</m:t>
-                                  </m:r>
-                                </m:sup>
-                              </m:sSup>
-                            </m:e>
-                          </m:d>
-                          <m:r>
-                            <a:rPr lang="en-GB" sz="1200" b="0" i="1" smtClean="0">
-                              <a:solidFill>
-                                <a:prstClr val="black"/>
-                              </a:solidFill>
-                              <a:latin typeface="Cambria Math" panose="02040503050406030204" pitchFamily="18" charset="0"/>
-                            </a:rPr>
-                            <m:t>, </m:t>
-                          </m:r>
-                          <m:r>
-                            <a:rPr lang="en-GB" sz="1200" b="0" i="1" smtClean="0">
-                              <a:solidFill>
-                                <a:prstClr val="black"/>
-                              </a:solidFill>
-                              <a:latin typeface="Cambria Math" panose="02040503050406030204" pitchFamily="18" charset="0"/>
-                            </a:rPr>
-                            <m:t>𝑤h𝑒𝑟𝑒</m:t>
-                          </m:r>
-                        </m:e>
-                      </m:nary>
-                    </m:oMath>
-                  </m:oMathPara>
-                </a14:m>
-                <a:endParaRPr lang="nl-NL" sz="1200" dirty="0">
-                  <a:solidFill>
-                    <a:prstClr val="black"/>
-                  </a:solidFill>
-                  <a:latin typeface="Calibri Light" panose="020F0302020204030204"/>
-                </a:endParaRPr>
-              </a:p>
-            </p:txBody>
-          </p:sp>
-        </mc:Choice>
-        <mc:Fallback xmlns="">
-          <p:sp>
-            <p:nvSpPr>
-              <p:cNvPr id="638" name="TextBox 637">
-                <a:extLst>
-                  <a:ext uri="{FF2B5EF4-FFF2-40B4-BE49-F238E27FC236}">
-                    <a16:creationId xmlns:a16="http://schemas.microsoft.com/office/drawing/2014/main" id="{0E49642D-DADD-48CB-9BAE-7B677F649B7B}"/>
-                  </a:ext>
-                </a:extLst>
-              </p:cNvPr>
-              <p:cNvSpPr txBox="1">
-                <a:spLocks noRot="1" noChangeAspect="1" noMove="1" noResize="1" noEditPoints="1" noAdjustHandles="1" noChangeArrowheads="1" noChangeShapeType="1" noTextEdit="1"/>
-              </p:cNvSpPr>
-              <p:nvPr/>
-            </p:nvSpPr>
-            <p:spPr>
-              <a:xfrm>
-                <a:off x="9697534" y="4954516"/>
-                <a:ext cx="2331144" cy="672107"/>
-              </a:xfrm>
-              <a:prstGeom prst="rect">
-                <a:avLst/>
-              </a:prstGeom>
-              <a:blipFill>
-                <a:blip r:embed="rId7"/>
-                <a:stretch>
-                  <a:fillRect/>
-                </a:stretch>
-              </a:blipFill>
-            </p:spPr>
-            <p:txBody>
-              <a:bodyPr/>
-              <a:lstStyle/>
-              <a:p>
-                <a:r>
-                  <a:rPr lang="en-NL">
-                    <a:noFill/>
-                  </a:rPr>
-                  <a:t> </a:t>
-                </a:r>
-              </a:p>
-            </p:txBody>
-          </p:sp>
-        </mc:Fallback>
-      </mc:AlternateContent>
       <p:grpSp>
         <p:nvGrpSpPr>
           <p:cNvPr id="639" name="Group 638">
@@ -6589,7 +5545,7 @@
         </p:nvGrpSpPr>
         <p:grpSpPr>
           <a:xfrm>
-            <a:off x="8712353" y="5080527"/>
+            <a:off x="10174521" y="5107495"/>
             <a:ext cx="973815" cy="1591267"/>
             <a:chOff x="8984560" y="5018601"/>
             <a:chExt cx="775025" cy="1591267"/>
@@ -7720,215 +6676,6 @@
           </mc:AlternateContent>
         </p:grpSp>
       </p:grpSp>
-      <p:sp>
-        <p:nvSpPr>
-          <p:cNvPr id="654" name="Freeform: Shape 653">
-            <a:extLst>
-              <a:ext uri="{FF2B5EF4-FFF2-40B4-BE49-F238E27FC236}">
-                <a16:creationId xmlns:a16="http://schemas.microsoft.com/office/drawing/2014/main" id="{D7743933-AAFD-4E8C-BD2C-C0D2BF937FFE}"/>
-              </a:ext>
-            </a:extLst>
-          </p:cNvPr>
-          <p:cNvSpPr/>
-          <p:nvPr/>
-        </p:nvSpPr>
-        <p:spPr>
-          <a:xfrm>
-            <a:off x="8839082" y="4514760"/>
-            <a:ext cx="404140" cy="689471"/>
-          </a:xfrm>
-          <a:custGeom>
-            <a:avLst/>
-            <a:gdLst>
-              <a:gd name="connsiteX0" fmla="*/ 760306 w 818511"/>
-              <a:gd name="connsiteY0" fmla="*/ 0 h 699714"/>
-              <a:gd name="connsiteX1" fmla="*/ 752355 w 818511"/>
-              <a:gd name="connsiteY1" fmla="*/ 238539 h 699714"/>
-              <a:gd name="connsiteX2" fmla="*/ 92396 w 818511"/>
-              <a:gd name="connsiteY2" fmla="*/ 341906 h 699714"/>
-              <a:gd name="connsiteX3" fmla="*/ 20835 w 818511"/>
-              <a:gd name="connsiteY3" fmla="*/ 699714 h 699714"/>
-            </a:gdLst>
-            <a:ahLst/>
-            <a:cxnLst>
-              <a:cxn ang="0">
-                <a:pos x="connsiteX0" y="connsiteY0"/>
-              </a:cxn>
-              <a:cxn ang="0">
-                <a:pos x="connsiteX1" y="connsiteY1"/>
-              </a:cxn>
-              <a:cxn ang="0">
-                <a:pos x="connsiteX2" y="connsiteY2"/>
-              </a:cxn>
-              <a:cxn ang="0">
-                <a:pos x="connsiteX3" y="connsiteY3"/>
-              </a:cxn>
-            </a:cxnLst>
-            <a:rect l="l" t="t" r="r" b="b"/>
-            <a:pathLst>
-              <a:path w="818511" h="699714">
-                <a:moveTo>
-                  <a:pt x="760306" y="0"/>
-                </a:moveTo>
-                <a:cubicBezTo>
-                  <a:pt x="811989" y="90777"/>
-                  <a:pt x="863673" y="181555"/>
-                  <a:pt x="752355" y="238539"/>
-                </a:cubicBezTo>
-                <a:cubicBezTo>
-                  <a:pt x="641037" y="295523"/>
-                  <a:pt x="214316" y="265044"/>
-                  <a:pt x="92396" y="341906"/>
-                </a:cubicBezTo>
-                <a:cubicBezTo>
-                  <a:pt x="-29524" y="418769"/>
-                  <a:pt x="-4345" y="559241"/>
-                  <a:pt x="20835" y="699714"/>
-                </a:cubicBezTo>
-              </a:path>
-            </a:pathLst>
-          </a:custGeom>
-          <a:noFill/>
-          <a:ln w="6350">
-            <a:solidFill>
-              <a:schemeClr val="tx1"/>
-            </a:solidFill>
-            <a:prstDash val="dash"/>
-            <a:tailEnd type="triangle"/>
-          </a:ln>
-        </p:spPr>
-        <p:style>
-          <a:lnRef idx="2">
-            <a:schemeClr val="accent1">
-              <a:shade val="50000"/>
-            </a:schemeClr>
-          </a:lnRef>
-          <a:fillRef idx="1">
-            <a:schemeClr val="accent1"/>
-          </a:fillRef>
-          <a:effectRef idx="0">
-            <a:schemeClr val="accent1"/>
-          </a:effectRef>
-          <a:fontRef idx="minor">
-            <a:schemeClr val="lt1"/>
-          </a:fontRef>
-        </p:style>
-        <p:txBody>
-          <a:bodyPr rot="0" spcFirstLastPara="0" vertOverflow="overflow" horzOverflow="overflow" vert="horz" wrap="square" lIns="91440" tIns="45720" rIns="91440" bIns="45720" numCol="1" spcCol="0" rtlCol="0" fromWordArt="0" anchor="ctr" anchorCtr="0" forceAA="0" compatLnSpc="1">
-            <a:prstTxWarp prst="textNoShape">
-              <a:avLst/>
-            </a:prstTxWarp>
-            <a:noAutofit/>
-          </a:bodyPr>
-          <a:lstStyle/>
-          <a:p>
-            <a:pPr algn="ctr"/>
-            <a:endParaRPr lang="en-NL"/>
-          </a:p>
-        </p:txBody>
-      </p:sp>
-      <p:sp>
-        <p:nvSpPr>
-          <p:cNvPr id="655" name="Freeform: Shape 654">
-            <a:extLst>
-              <a:ext uri="{FF2B5EF4-FFF2-40B4-BE49-F238E27FC236}">
-                <a16:creationId xmlns:a16="http://schemas.microsoft.com/office/drawing/2014/main" id="{264A3CD7-8D97-4F78-AE05-70845BE5FCBB}"/>
-              </a:ext>
-            </a:extLst>
-          </p:cNvPr>
-          <p:cNvSpPr/>
-          <p:nvPr/>
-        </p:nvSpPr>
-        <p:spPr>
-          <a:xfrm>
-            <a:off x="9347407" y="4490908"/>
-            <a:ext cx="431266" cy="735942"/>
-          </a:xfrm>
-          <a:custGeom>
-            <a:avLst/>
-            <a:gdLst>
-              <a:gd name="connsiteX0" fmla="*/ 939242 w 958374"/>
-              <a:gd name="connsiteY0" fmla="*/ 0 h 691763"/>
-              <a:gd name="connsiteX1" fmla="*/ 851777 w 958374"/>
-              <a:gd name="connsiteY1" fmla="*/ 365760 h 691763"/>
-              <a:gd name="connsiteX2" fmla="*/ 120257 w 958374"/>
-              <a:gd name="connsiteY2" fmla="*/ 429370 h 691763"/>
-              <a:gd name="connsiteX3" fmla="*/ 8939 w 958374"/>
-              <a:gd name="connsiteY3" fmla="*/ 691763 h 691763"/>
-            </a:gdLst>
-            <a:ahLst/>
-            <a:cxnLst>
-              <a:cxn ang="0">
-                <a:pos x="connsiteX0" y="connsiteY0"/>
-              </a:cxn>
-              <a:cxn ang="0">
-                <a:pos x="connsiteX1" y="connsiteY1"/>
-              </a:cxn>
-              <a:cxn ang="0">
-                <a:pos x="connsiteX2" y="connsiteY2"/>
-              </a:cxn>
-              <a:cxn ang="0">
-                <a:pos x="connsiteX3" y="connsiteY3"/>
-              </a:cxn>
-            </a:cxnLst>
-            <a:rect l="l" t="t" r="r" b="b"/>
-            <a:pathLst>
-              <a:path w="958374" h="691763">
-                <a:moveTo>
-                  <a:pt x="939242" y="0"/>
-                </a:moveTo>
-                <a:cubicBezTo>
-                  <a:pt x="963758" y="147099"/>
-                  <a:pt x="988274" y="294198"/>
-                  <a:pt x="851777" y="365760"/>
-                </a:cubicBezTo>
-                <a:cubicBezTo>
-                  <a:pt x="715280" y="437322"/>
-                  <a:pt x="260730" y="375036"/>
-                  <a:pt x="120257" y="429370"/>
-                </a:cubicBezTo>
-                <a:cubicBezTo>
-                  <a:pt x="-20216" y="483704"/>
-                  <a:pt x="-5639" y="587733"/>
-                  <a:pt x="8939" y="691763"/>
-                </a:cubicBezTo>
-              </a:path>
-            </a:pathLst>
-          </a:custGeom>
-          <a:noFill/>
-          <a:ln w="6350">
-            <a:solidFill>
-              <a:schemeClr val="tx1"/>
-            </a:solidFill>
-            <a:prstDash val="dash"/>
-            <a:tailEnd type="triangle"/>
-          </a:ln>
-        </p:spPr>
-        <p:style>
-          <a:lnRef idx="2">
-            <a:schemeClr val="accent1">
-              <a:shade val="50000"/>
-            </a:schemeClr>
-          </a:lnRef>
-          <a:fillRef idx="1">
-            <a:schemeClr val="accent1"/>
-          </a:fillRef>
-          <a:effectRef idx="0">
-            <a:schemeClr val="accent1"/>
-          </a:effectRef>
-          <a:fontRef idx="minor">
-            <a:schemeClr val="lt1"/>
-          </a:fontRef>
-        </p:style>
-        <p:txBody>
-          <a:bodyPr rtlCol="0" anchor="ctr"/>
-          <a:lstStyle/>
-          <a:p>
-            <a:pPr algn="ctr"/>
-            <a:endParaRPr lang="en-NL"/>
-          </a:p>
-        </p:txBody>
-      </p:sp>
       <p:grpSp>
         <p:nvGrpSpPr>
           <p:cNvPr id="656" name="Group 655">
@@ -8031,7 +6778,7 @@
             <p:nvPr/>
           </p:nvPicPr>
           <p:blipFill rotWithShape="1">
-            <a:blip r:embed="rId6">
+            <a:blip r:embed="rId5">
               <a:clrChange>
                 <a:clrFrom>
                   <a:srgbClr val="FAFAFA"/>
@@ -8057,49 +6804,6 @@
           </p:spPr>
         </p:pic>
       </p:grpSp>
-      <p:cxnSp>
-        <p:nvCxnSpPr>
-          <p:cNvPr id="659" name="Straight Arrow Connector 658">
-            <a:extLst>
-              <a:ext uri="{FF2B5EF4-FFF2-40B4-BE49-F238E27FC236}">
-                <a16:creationId xmlns:a16="http://schemas.microsoft.com/office/drawing/2014/main" id="{6C9B88C3-527C-4D0A-8C8F-3E9B52A1812A}"/>
-              </a:ext>
-            </a:extLst>
-          </p:cNvPr>
-          <p:cNvCxnSpPr/>
-          <p:nvPr/>
-        </p:nvCxnSpPr>
-        <p:spPr>
-          <a:xfrm flipV="1">
-            <a:off x="11735960" y="5872030"/>
-            <a:ext cx="216000" cy="0"/>
-          </a:xfrm>
-          <a:prstGeom prst="straightConnector1">
-            <a:avLst/>
-          </a:prstGeom>
-          <a:ln>
-            <a:solidFill>
-              <a:schemeClr val="tx1"/>
-            </a:solidFill>
-            <a:prstDash val="dash"/>
-            <a:tailEnd type="triangle" w="lg" len="med"/>
-          </a:ln>
-        </p:spPr>
-        <p:style>
-          <a:lnRef idx="1">
-            <a:schemeClr val="accent1"/>
-          </a:lnRef>
-          <a:fillRef idx="0">
-            <a:schemeClr val="accent1"/>
-          </a:fillRef>
-          <a:effectRef idx="0">
-            <a:schemeClr val="accent1"/>
-          </a:effectRef>
-          <a:fontRef idx="minor">
-            <a:schemeClr val="tx1"/>
-          </a:fontRef>
-        </p:style>
-      </p:cxnSp>
       <p:sp>
         <p:nvSpPr>
           <p:cNvPr id="660" name="TextBox 659">
@@ -8114,8 +6818,8 @@
         </p:nvSpPr>
         <p:spPr>
           <a:xfrm>
-            <a:off x="9103744" y="4179405"/>
-            <a:ext cx="314510" cy="307777"/>
+            <a:off x="10030038" y="4118527"/>
+            <a:ext cx="452111" cy="369332"/>
           </a:xfrm>
           <a:prstGeom prst="rect">
             <a:avLst/>
@@ -8129,12 +6833,18 @@
           <a:lstStyle/>
           <a:p>
             <a:r>
-              <a:rPr lang="en-GB" sz="1400" i="1" dirty="0">
+              <a:rPr lang="en-GB" i="1" dirty="0">
                 <a:latin typeface="+mj-lt"/>
               </a:rPr>
-              <a:t>Xi</a:t>
+              <a:t>X</a:t>
             </a:r>
-            <a:endParaRPr lang="en-NL" sz="1400" i="1" dirty="0">
+            <a:r>
+              <a:rPr lang="en-GB" i="1" baseline="-25000" dirty="0">
+                <a:latin typeface="+mj-lt"/>
+              </a:rPr>
+              <a:t>d1</a:t>
+            </a:r>
+            <a:endParaRPr lang="en-NL" i="1" baseline="-25000" dirty="0">
               <a:latin typeface="+mj-lt"/>
             </a:endParaRPr>
           </a:p>
@@ -8154,8 +6864,8 @@
         </p:nvSpPr>
         <p:spPr>
           <a:xfrm>
-            <a:off x="9606786" y="4175680"/>
-            <a:ext cx="316112" cy="307777"/>
+            <a:off x="10533080" y="4114802"/>
+            <a:ext cx="471347" cy="369332"/>
           </a:xfrm>
           <a:prstGeom prst="rect">
             <a:avLst/>
@@ -8169,12 +6879,18 @@
           <a:lstStyle/>
           <a:p>
             <a:r>
-              <a:rPr lang="en-GB" sz="1400" i="1" dirty="0" err="1">
+              <a:rPr lang="en-GB" i="1" dirty="0" err="1">
                 <a:latin typeface="+mj-lt"/>
               </a:rPr>
-              <a:t>Xj</a:t>
+              <a:t>X</a:t>
             </a:r>
-            <a:endParaRPr lang="en-NL" sz="1400" i="1" dirty="0">
+            <a:r>
+              <a:rPr lang="en-GB" i="1" baseline="-25000" dirty="0" err="1">
+                <a:latin typeface="+mj-lt"/>
+              </a:rPr>
+              <a:t>dN</a:t>
+            </a:r>
+            <a:endParaRPr lang="en-NL" i="1" baseline="-25000" dirty="0">
               <a:latin typeface="+mj-lt"/>
             </a:endParaRPr>
           </a:p>
@@ -8194,8 +6910,8 @@
         </p:nvSpPr>
         <p:spPr>
           <a:xfrm>
-            <a:off x="8709293" y="5172362"/>
-            <a:ext cx="295274" cy="276999"/>
+            <a:off x="10171461" y="5199330"/>
+            <a:ext cx="360804" cy="276999"/>
           </a:xfrm>
           <a:prstGeom prst="rect">
             <a:avLst/>
@@ -8212,9 +6928,15 @@
               <a:rPr lang="en-GB" sz="1200" i="1" dirty="0">
                 <a:latin typeface="+mj-lt"/>
               </a:rPr>
-              <a:t>Xi</a:t>
+              <a:t>X</a:t>
             </a:r>
-            <a:endParaRPr lang="en-NL" sz="1200" i="1" dirty="0">
+            <a:r>
+              <a:rPr lang="en-GB" sz="1200" i="1" baseline="-25000" dirty="0">
+                <a:latin typeface="+mj-lt"/>
+              </a:rPr>
+              <a:t>d1</a:t>
+            </a:r>
+            <a:endParaRPr lang="en-NL" sz="1200" i="1" baseline="-25000" dirty="0">
               <a:latin typeface="+mj-lt"/>
             </a:endParaRPr>
           </a:p>
@@ -8234,8 +6956,8 @@
         </p:nvSpPr>
         <p:spPr>
           <a:xfrm>
-            <a:off x="9169331" y="5172362"/>
-            <a:ext cx="296876" cy="276999"/>
+            <a:off x="10555299" y="5206950"/>
+            <a:ext cx="375231" cy="276999"/>
           </a:xfrm>
           <a:prstGeom prst="rect">
             <a:avLst/>
@@ -8252,9 +6974,15 @@
               <a:rPr lang="en-GB" sz="1200" i="1" dirty="0" err="1">
                 <a:latin typeface="+mj-lt"/>
               </a:rPr>
-              <a:t>Xj</a:t>
+              <a:t>X</a:t>
             </a:r>
-            <a:endParaRPr lang="en-NL" sz="1200" i="1" dirty="0">
+            <a:r>
+              <a:rPr lang="en-GB" sz="1200" i="1" baseline="-25000" dirty="0" err="1">
+                <a:latin typeface="+mj-lt"/>
+              </a:rPr>
+              <a:t>dN</a:t>
+            </a:r>
+            <a:endParaRPr lang="en-NL" sz="1200" i="1" baseline="-25000" dirty="0">
               <a:latin typeface="+mj-lt"/>
             </a:endParaRPr>
           </a:p>
@@ -8320,8 +7048,8 @@
         </p:nvSpPr>
         <p:spPr>
           <a:xfrm>
-            <a:off x="11394480" y="1425624"/>
-            <a:ext cx="1254642" cy="3057833"/>
+            <a:off x="11394480" y="1438018"/>
+            <a:ext cx="1254642" cy="3054143"/>
           </a:xfrm>
           <a:prstGeom prst="roundRect">
             <a:avLst>
@@ -8407,9 +7135,9 @@
           <p:nvPr/>
         </p:nvSpPr>
         <p:spPr>
-          <a:xfrm flipH="1">
-            <a:off x="11606485" y="4484994"/>
-            <a:ext cx="542250" cy="770172"/>
+          <a:xfrm rot="21250247" flipH="1">
+            <a:off x="11674707" y="4481521"/>
+            <a:ext cx="471047" cy="770172"/>
           </a:xfrm>
           <a:custGeom>
             <a:avLst/>
@@ -8608,8 +7336,8 @@
           </a:p>
         </p:txBody>
       </p:sp>
-      <mc:AlternateContent xmlns:mc="http://schemas.openxmlformats.org/markup-compatibility/2006" xmlns:a14="http://schemas.microsoft.com/office/drawing/2010/main">
-        <mc:Choice Requires="a14">
+      <mc:AlternateContent xmlns:mc="http://schemas.openxmlformats.org/markup-compatibility/2006">
+        <mc:Choice xmlns:a14="http://schemas.microsoft.com/office/drawing/2010/main" Requires="a14">
           <p:sp>
             <p:nvSpPr>
               <p:cNvPr id="668" name="TextBox 667">
@@ -8624,7 +7352,7 @@
             </p:nvSpPr>
             <p:spPr>
               <a:xfrm>
-                <a:off x="9292255" y="5412643"/>
+                <a:off x="10754423" y="5439611"/>
                 <a:ext cx="465877" cy="569771"/>
               </a:xfrm>
               <a:prstGeom prst="rect">
@@ -8724,7 +7452,7 @@
             </p:txBody>
           </p:sp>
         </mc:Choice>
-        <mc:Fallback xmlns="">
+        <mc:Fallback>
           <p:sp>
             <p:nvSpPr>
               <p:cNvPr id="668" name="TextBox 667">
@@ -8741,7 +7469,7 @@
             </p:nvSpPr>
             <p:spPr>
               <a:xfrm>
-                <a:off x="9292255" y="5412643"/>
+                <a:off x="10754423" y="5439611"/>
                 <a:ext cx="465877" cy="569771"/>
               </a:xfrm>
               <a:prstGeom prst="rect">
@@ -8750,7 +7478,7 @@
               <a:blipFill>
                 <a:blip r:embed="rId12"/>
                 <a:stretch>
-                  <a:fillRect b="-1075"/>
+                  <a:fillRect/>
                 </a:stretch>
               </a:blipFill>
             </p:spPr>
@@ -8759,7 +7487,7 @@
               <a:lstStyle/>
               <a:p>
                 <a:r>
-                  <a:rPr lang="en-NL">
+                  <a:rPr lang="en-US">
                     <a:noFill/>
                   </a:rPr>
                   <a:t> </a:t>
@@ -8769,8 +7497,8 @@
           </p:sp>
         </mc:Fallback>
       </mc:AlternateContent>
-      <mc:AlternateContent xmlns:mc="http://schemas.openxmlformats.org/markup-compatibility/2006" xmlns:a14="http://schemas.microsoft.com/office/drawing/2010/main">
-        <mc:Choice Requires="a14">
+      <mc:AlternateContent xmlns:mc="http://schemas.openxmlformats.org/markup-compatibility/2006">
+        <mc:Choice xmlns:a14="http://schemas.microsoft.com/office/drawing/2010/main" Requires="a14">
           <p:sp>
             <p:nvSpPr>
               <p:cNvPr id="669" name="TextBox 668">
@@ -8785,7 +7513,7 @@
             </p:nvSpPr>
             <p:spPr>
               <a:xfrm>
-                <a:off x="9292255" y="6054828"/>
+                <a:off x="10754423" y="6081796"/>
                 <a:ext cx="465877" cy="569771"/>
               </a:xfrm>
               <a:prstGeom prst="rect">
@@ -8885,7 +7613,7 @@
             </p:txBody>
           </p:sp>
         </mc:Choice>
-        <mc:Fallback xmlns="">
+        <mc:Fallback>
           <p:sp>
             <p:nvSpPr>
               <p:cNvPr id="669" name="TextBox 668">
@@ -8902,7 +7630,7 @@
             </p:nvSpPr>
             <p:spPr>
               <a:xfrm>
-                <a:off x="9292255" y="6054828"/>
+                <a:off x="10754423" y="6081796"/>
                 <a:ext cx="465877" cy="569771"/>
               </a:xfrm>
               <a:prstGeom prst="rect">
@@ -8920,7 +7648,7 @@
               <a:lstStyle/>
               <a:p>
                 <a:r>
-                  <a:rPr lang="en-NL">
+                  <a:rPr lang="en-US">
                     <a:noFill/>
                   </a:rPr>
                   <a:t> </a:t>
@@ -8944,7 +7672,7 @@
         </p:nvSpPr>
         <p:spPr>
           <a:xfrm>
-            <a:off x="8966675" y="5176380"/>
+            <a:off x="10428843" y="5203348"/>
             <a:ext cx="295274" cy="276999"/>
           </a:xfrm>
           <a:prstGeom prst="rect">
@@ -8984,7 +7712,7 @@
         </p:nvGrpSpPr>
         <p:grpSpPr>
           <a:xfrm>
-            <a:off x="986011" y="7728211"/>
+            <a:off x="981370" y="8045448"/>
             <a:ext cx="1164298" cy="1642769"/>
             <a:chOff x="14754020" y="2078806"/>
             <a:chExt cx="1164298" cy="1642769"/>
@@ -9440,7 +8168,7 @@
             <p:spPr>
               <a:xfrm>
                 <a:off x="14302797" y="3794240"/>
-                <a:ext cx="285656" cy="261610"/>
+                <a:ext cx="351378" cy="261610"/>
               </a:xfrm>
               <a:prstGeom prst="rect">
                 <a:avLst/>
@@ -9457,9 +8185,15 @@
                   <a:rPr lang="en-GB" sz="1100" i="1" dirty="0">
                     <a:latin typeface="+mj-lt"/>
                   </a:rPr>
-                  <a:t>Xi</a:t>
+                  <a:t>X</a:t>
                 </a:r>
-                <a:endParaRPr lang="en-NL" sz="1100" i="1" dirty="0">
+                <a:r>
+                  <a:rPr lang="en-GB" sz="1100" i="1" baseline="-25000" dirty="0">
+                    <a:latin typeface="+mj-lt"/>
+                  </a:rPr>
+                  <a:t>d1</a:t>
+                </a:r>
+                <a:endParaRPr lang="en-NL" sz="1100" i="1" baseline="-25000" dirty="0">
                   <a:latin typeface="+mj-lt"/>
                 </a:endParaRPr>
               </a:p>
@@ -9480,7 +8214,7 @@
             <p:spPr>
               <a:xfrm>
                 <a:off x="14797557" y="3794240"/>
-                <a:ext cx="287258" cy="261610"/>
+                <a:ext cx="362600" cy="261610"/>
               </a:xfrm>
               <a:prstGeom prst="rect">
                 <a:avLst/>
@@ -9497,9 +8231,15 @@
                   <a:rPr lang="en-GB" sz="1100" i="1" dirty="0" err="1">
                     <a:latin typeface="+mj-lt"/>
                   </a:rPr>
-                  <a:t>Xj</a:t>
+                  <a:t>X</a:t>
                 </a:r>
-                <a:endParaRPr lang="en-NL" sz="1100" i="1" dirty="0">
+                <a:r>
+                  <a:rPr lang="en-GB" sz="1100" i="1" baseline="-25000" dirty="0" err="1">
+                    <a:latin typeface="+mj-lt"/>
+                  </a:rPr>
+                  <a:t>dN</a:t>
+                </a:r>
+                <a:endParaRPr lang="en-NL" sz="1100" i="1" baseline="-25000" dirty="0">
                   <a:latin typeface="+mj-lt"/>
                 </a:endParaRPr>
               </a:p>
@@ -9935,7 +8675,7 @@
         </p:nvCxnSpPr>
         <p:spPr>
           <a:xfrm>
-            <a:off x="1999172" y="8554647"/>
+            <a:off x="1994531" y="8871884"/>
             <a:ext cx="269012" cy="0"/>
           </a:xfrm>
           <a:prstGeom prst="straightConnector1">
@@ -9977,7 +8717,7 @@
         </p:nvGrpSpPr>
         <p:grpSpPr>
           <a:xfrm>
-            <a:off x="4127810" y="7729217"/>
+            <a:off x="4123169" y="8046454"/>
             <a:ext cx="1153228" cy="1641763"/>
             <a:chOff x="17895819" y="2079812"/>
             <a:chExt cx="1153228" cy="1641763"/>
@@ -10433,7 +9173,7 @@
             <p:spPr>
               <a:xfrm>
                 <a:off x="14273862" y="3794240"/>
-                <a:ext cx="344966" cy="261610"/>
+                <a:ext cx="343364" cy="261610"/>
               </a:xfrm>
               <a:prstGeom prst="rect">
                 <a:avLst/>
@@ -10447,12 +9187,18 @@
               <a:lstStyle/>
               <a:p>
                 <a:r>
-                  <a:rPr lang="en-GB" sz="1100" i="1" dirty="0" err="1">
+                  <a:rPr lang="en-GB" sz="1100" i="1" dirty="0">
                     <a:latin typeface="+mj-lt"/>
                   </a:rPr>
-                  <a:t>Xci</a:t>
+                  <a:t>X</a:t>
                 </a:r>
-                <a:endParaRPr lang="en-NL" sz="1100" i="1" dirty="0">
+                <a:r>
+                  <a:rPr lang="en-GB" sz="1100" i="1" baseline="-25000" dirty="0">
+                    <a:latin typeface="+mj-lt"/>
+                  </a:rPr>
+                  <a:t>c1</a:t>
+                </a:r>
+                <a:endParaRPr lang="en-NL" sz="1100" i="1" baseline="-25000" dirty="0">
                   <a:latin typeface="+mj-lt"/>
                 </a:endParaRPr>
               </a:p>
@@ -10473,7 +9219,7 @@
             <p:spPr>
               <a:xfrm>
                 <a:off x="14803636" y="3794240"/>
-                <a:ext cx="346570" cy="261610"/>
+                <a:ext cx="354584" cy="261610"/>
               </a:xfrm>
               <a:prstGeom prst="rect">
                 <a:avLst/>
@@ -10490,9 +9236,15 @@
                   <a:rPr lang="en-GB" sz="1100" i="1" dirty="0" err="1">
                     <a:latin typeface="+mj-lt"/>
                   </a:rPr>
-                  <a:t>Xcj</a:t>
+                  <a:t>X</a:t>
                 </a:r>
-                <a:endParaRPr lang="en-NL" sz="1100" i="1" dirty="0">
+                <a:r>
+                  <a:rPr lang="en-GB" sz="1100" i="1" baseline="-25000" dirty="0" err="1">
+                    <a:latin typeface="+mj-lt"/>
+                  </a:rPr>
+                  <a:t>cN</a:t>
+                </a:r>
+                <a:endParaRPr lang="en-NL" sz="1100" i="1" baseline="-25000" dirty="0">
                   <a:latin typeface="+mj-lt"/>
                 </a:endParaRPr>
               </a:p>
@@ -10928,7 +9680,7 @@
         </p:nvGrpSpPr>
         <p:grpSpPr>
           <a:xfrm>
-            <a:off x="7960800" y="7741007"/>
+            <a:off x="7956159" y="8058244"/>
             <a:ext cx="1262680" cy="1642769"/>
             <a:chOff x="14617106" y="5578662"/>
             <a:chExt cx="1262680" cy="1642769"/>
@@ -11384,7 +10136,7 @@
             <p:spPr>
               <a:xfrm>
                 <a:off x="14325945" y="3794240"/>
-                <a:ext cx="357790" cy="261610"/>
+                <a:ext cx="351378" cy="261610"/>
               </a:xfrm>
               <a:prstGeom prst="rect">
                 <a:avLst/>
@@ -11398,12 +10150,18 @@
               <a:lstStyle/>
               <a:p>
                 <a:r>
-                  <a:rPr lang="en-GB" sz="1100" i="1" dirty="0" err="1">
+                  <a:rPr lang="en-GB" sz="1100" i="1" dirty="0">
                     <a:latin typeface="+mj-lt"/>
                   </a:rPr>
-                  <a:t>Xni</a:t>
+                  <a:t>X</a:t>
                 </a:r>
-                <a:endParaRPr lang="en-NL" sz="1100" i="1" dirty="0">
+                <a:r>
+                  <a:rPr lang="en-GB" sz="1100" i="1" baseline="-25000" dirty="0">
+                    <a:latin typeface="+mj-lt"/>
+                  </a:rPr>
+                  <a:t>n1</a:t>
+                </a:r>
+                <a:endParaRPr lang="en-NL" sz="1100" i="1" baseline="-25000" dirty="0">
                   <a:latin typeface="+mj-lt"/>
                 </a:endParaRPr>
               </a:p>
@@ -11424,7 +10182,7 @@
             <p:spPr>
               <a:xfrm>
                 <a:off x="14959597" y="3794240"/>
-                <a:ext cx="359394" cy="261610"/>
+                <a:ext cx="362600" cy="261610"/>
               </a:xfrm>
               <a:prstGeom prst="rect">
                 <a:avLst/>
@@ -11441,9 +10199,15 @@
                   <a:rPr lang="en-GB" sz="1100" i="1" dirty="0" err="1">
                     <a:latin typeface="+mj-lt"/>
                   </a:rPr>
-                  <a:t>Xnj</a:t>
+                  <a:t>X</a:t>
                 </a:r>
-                <a:endParaRPr lang="en-NL" sz="1100" i="1" dirty="0">
+                <a:r>
+                  <a:rPr lang="en-GB" sz="1100" i="1" baseline="-25000" dirty="0" err="1">
+                    <a:latin typeface="+mj-lt"/>
+                  </a:rPr>
+                  <a:t>nN</a:t>
+                </a:r>
+                <a:endParaRPr lang="en-NL" sz="1100" i="1" baseline="-25000" dirty="0">
                   <a:latin typeface="+mj-lt"/>
                 </a:endParaRPr>
               </a:p>
@@ -11879,7 +10643,7 @@
         </p:nvSpPr>
         <p:spPr>
           <a:xfrm>
-            <a:off x="2464621" y="7756891"/>
+            <a:off x="2459980" y="8074128"/>
             <a:ext cx="1198815" cy="1614089"/>
           </a:xfrm>
           <a:prstGeom prst="roundRect">
@@ -11938,7 +10702,7 @@
         </p:nvSpPr>
         <p:spPr>
           <a:xfrm>
-            <a:off x="2736707" y="8868715"/>
+            <a:off x="2732066" y="9185952"/>
             <a:ext cx="728488" cy="381235"/>
           </a:xfrm>
           <a:prstGeom prst="roundRect">
@@ -11996,7 +10760,7 @@
         </p:nvSpPr>
         <p:spPr>
           <a:xfrm>
-            <a:off x="2650483" y="8920811"/>
+            <a:off x="2645842" y="9238048"/>
             <a:ext cx="728488" cy="381235"/>
           </a:xfrm>
           <a:prstGeom prst="roundRect">
@@ -12055,7 +10819,7 @@
         </p:nvSpPr>
         <p:spPr>
           <a:xfrm>
-            <a:off x="2904012" y="8953662"/>
+            <a:off x="2899371" y="9270899"/>
             <a:ext cx="356570" cy="326639"/>
           </a:xfrm>
           <a:prstGeom prst="ellipse">
@@ -12115,7 +10879,7 @@
         </p:nvGrpSpPr>
         <p:grpSpPr>
           <a:xfrm>
-            <a:off x="2656313" y="8354387"/>
+            <a:off x="2651672" y="8671624"/>
             <a:ext cx="814711" cy="433330"/>
             <a:chOff x="17998440" y="3716044"/>
             <a:chExt cx="1891861" cy="1098452"/>
@@ -12371,7 +11135,7 @@
         </p:nvSpPr>
         <p:spPr>
           <a:xfrm>
-            <a:off x="2756383" y="7853124"/>
+            <a:off x="2751742" y="8170361"/>
             <a:ext cx="728488" cy="381235"/>
           </a:xfrm>
           <a:prstGeom prst="roundRect">
@@ -12429,7 +11193,7 @@
         </p:nvSpPr>
         <p:spPr>
           <a:xfrm>
-            <a:off x="2670160" y="7905219"/>
+            <a:off x="2665519" y="8222456"/>
             <a:ext cx="728488" cy="381235"/>
           </a:xfrm>
           <a:prstGeom prst="roundRect">
@@ -12476,126 +11240,6 @@
       </p:sp>
       <p:sp>
         <p:nvSpPr>
-          <p:cNvPr id="716" name="TextBox 715">
-            <a:extLst>
-              <a:ext uri="{FF2B5EF4-FFF2-40B4-BE49-F238E27FC236}">
-                <a16:creationId xmlns:a16="http://schemas.microsoft.com/office/drawing/2014/main" id="{7051DC1D-684C-490A-9EDC-DE9082E950A2}"/>
-              </a:ext>
-            </a:extLst>
-          </p:cNvPr>
-          <p:cNvSpPr txBox="1"/>
-          <p:nvPr/>
-        </p:nvSpPr>
-        <p:spPr>
-          <a:xfrm>
-            <a:off x="2915048" y="9022275"/>
-            <a:ext cx="346916" cy="215444"/>
-          </a:xfrm>
-          <a:prstGeom prst="rect">
-            <a:avLst/>
-          </a:prstGeom>
-          <a:noFill/>
-        </p:spPr>
-        <p:txBody>
-          <a:bodyPr wrap="square" rtlCol="0">
-            <a:spAutoFit/>
-          </a:bodyPr>
-          <a:lstStyle/>
-          <a:p>
-            <a:pPr algn="ctr"/>
-            <a:r>
-              <a:rPr lang="en-US" sz="800" i="1" dirty="0" err="1">
-                <a:latin typeface="+mj-lt"/>
-              </a:rPr>
-              <a:t>Xj</a:t>
-            </a:r>
-            <a:endParaRPr lang="nl-NL" sz="800" i="1" dirty="0">
-              <a:latin typeface="+mj-lt"/>
-            </a:endParaRPr>
-          </a:p>
-        </p:txBody>
-      </p:sp>
-      <p:sp>
-        <p:nvSpPr>
-          <p:cNvPr id="717" name="TextBox 716">
-            <a:extLst>
-              <a:ext uri="{FF2B5EF4-FFF2-40B4-BE49-F238E27FC236}">
-                <a16:creationId xmlns:a16="http://schemas.microsoft.com/office/drawing/2014/main" id="{AF970322-B471-4000-97A3-D58DA4CF7E99}"/>
-              </a:ext>
-            </a:extLst>
-          </p:cNvPr>
-          <p:cNvSpPr txBox="1"/>
-          <p:nvPr/>
-        </p:nvSpPr>
-        <p:spPr>
-          <a:xfrm>
-            <a:off x="3097190" y="8404614"/>
-            <a:ext cx="346916" cy="215444"/>
-          </a:xfrm>
-          <a:prstGeom prst="rect">
-            <a:avLst/>
-          </a:prstGeom>
-          <a:noFill/>
-        </p:spPr>
-        <p:txBody>
-          <a:bodyPr wrap="square" rtlCol="0">
-            <a:spAutoFit/>
-          </a:bodyPr>
-          <a:lstStyle/>
-          <a:p>
-            <a:pPr algn="ctr"/>
-            <a:r>
-              <a:rPr lang="en-US" sz="800" i="1" dirty="0" err="1">
-                <a:latin typeface="+mj-lt"/>
-              </a:rPr>
-              <a:t>Xj</a:t>
-            </a:r>
-            <a:endParaRPr lang="nl-NL" sz="800" i="1" dirty="0">
-              <a:latin typeface="+mj-lt"/>
-            </a:endParaRPr>
-          </a:p>
-        </p:txBody>
-      </p:sp>
-      <p:sp>
-        <p:nvSpPr>
-          <p:cNvPr id="718" name="TextBox 717">
-            <a:extLst>
-              <a:ext uri="{FF2B5EF4-FFF2-40B4-BE49-F238E27FC236}">
-                <a16:creationId xmlns:a16="http://schemas.microsoft.com/office/drawing/2014/main" id="{2BF60703-99B9-45EC-B6D7-7DD5564870E8}"/>
-              </a:ext>
-            </a:extLst>
-          </p:cNvPr>
-          <p:cNvSpPr txBox="1"/>
-          <p:nvPr/>
-        </p:nvSpPr>
-        <p:spPr>
-          <a:xfrm>
-            <a:off x="2629342" y="8528643"/>
-            <a:ext cx="341342" cy="215444"/>
-          </a:xfrm>
-          <a:prstGeom prst="rect">
-            <a:avLst/>
-          </a:prstGeom>
-          <a:noFill/>
-        </p:spPr>
-        <p:txBody>
-          <a:bodyPr wrap="square" rtlCol="0">
-            <a:spAutoFit/>
-          </a:bodyPr>
-          <a:lstStyle/>
-          <a:p>
-            <a:pPr algn="ctr"/>
-            <a:r>
-              <a:rPr lang="en-US" sz="800" i="1" dirty="0">
-                <a:latin typeface="+mj-lt"/>
-              </a:rPr>
-              <a:t>Xi</a:t>
-            </a:r>
-          </a:p>
-        </p:txBody>
-      </p:sp>
-      <p:sp>
-        <p:nvSpPr>
           <p:cNvPr id="719" name="Oval 718">
             <a:extLst>
               <a:ext uri="{FF2B5EF4-FFF2-40B4-BE49-F238E27FC236}">
@@ -12608,7 +11252,7 @@
         </p:nvSpPr>
         <p:spPr>
           <a:xfrm>
-            <a:off x="2688447" y="8990558"/>
+            <a:off x="2683806" y="9307795"/>
             <a:ext cx="278450" cy="255077"/>
           </a:xfrm>
           <a:prstGeom prst="ellipse">
@@ -12655,47 +11299,6 @@
       </p:sp>
       <p:sp>
         <p:nvSpPr>
-          <p:cNvPr id="720" name="TextBox 719">
-            <a:extLst>
-              <a:ext uri="{FF2B5EF4-FFF2-40B4-BE49-F238E27FC236}">
-                <a16:creationId xmlns:a16="http://schemas.microsoft.com/office/drawing/2014/main" id="{C66B11A7-A06A-4ABF-9D93-580FE0E995BF}"/>
-              </a:ext>
-            </a:extLst>
-          </p:cNvPr>
-          <p:cNvSpPr txBox="1"/>
-          <p:nvPr/>
-        </p:nvSpPr>
-        <p:spPr>
-          <a:xfrm>
-            <a:off x="2625987" y="9016033"/>
-            <a:ext cx="341342" cy="215444"/>
-          </a:xfrm>
-          <a:prstGeom prst="rect">
-            <a:avLst/>
-          </a:prstGeom>
-          <a:noFill/>
-        </p:spPr>
-        <p:txBody>
-          <a:bodyPr wrap="square" rtlCol="0">
-            <a:spAutoFit/>
-          </a:bodyPr>
-          <a:lstStyle/>
-          <a:p>
-            <a:pPr algn="ctr"/>
-            <a:r>
-              <a:rPr lang="en-US" sz="800" i="1" dirty="0">
-                <a:latin typeface="+mj-lt"/>
-              </a:rPr>
-              <a:t>Xi</a:t>
-            </a:r>
-            <a:endParaRPr lang="nl-NL" sz="800" i="1" baseline="30000" dirty="0">
-              <a:latin typeface="+mj-lt"/>
-            </a:endParaRPr>
-          </a:p>
-        </p:txBody>
-      </p:sp>
-      <p:sp>
-        <p:nvSpPr>
           <p:cNvPr id="721" name="TextBox 720">
             <a:extLst>
               <a:ext uri="{FF2B5EF4-FFF2-40B4-BE49-F238E27FC236}">
@@ -12708,7 +11311,7 @@
         </p:nvSpPr>
         <p:spPr>
           <a:xfrm>
-            <a:off x="5345031" y="8198856"/>
+            <a:off x="5340390" y="8516093"/>
             <a:ext cx="441311" cy="215444"/>
           </a:xfrm>
           <a:prstGeom prst="rect">
@@ -12749,7 +11352,7 @@
         </p:nvSpPr>
         <p:spPr>
           <a:xfrm>
-            <a:off x="5351532" y="9051617"/>
+            <a:off x="5346891" y="9368854"/>
             <a:ext cx="441311" cy="215444"/>
           </a:xfrm>
           <a:prstGeom prst="rect">
@@ -12790,10 +11393,10 @@
         </p:nvGrpSpPr>
         <p:grpSpPr>
           <a:xfrm>
-            <a:off x="5432709" y="7765158"/>
-            <a:ext cx="2220351" cy="1616243"/>
+            <a:off x="5428068" y="8082395"/>
+            <a:ext cx="2387702" cy="1616243"/>
             <a:chOff x="5794639" y="8408280"/>
-            <a:chExt cx="2220351" cy="1616243"/>
+            <a:chExt cx="2387702" cy="1616243"/>
           </a:xfrm>
         </p:grpSpPr>
         <p:sp>
@@ -13810,12 +12413,18 @@
             <a:p>
               <a:pPr algn="ctr"/>
               <a:r>
-                <a:rPr lang="en-US" sz="1000" i="1" dirty="0" err="1">
+                <a:rPr lang="en-US" sz="1000" i="1" dirty="0">
                   <a:latin typeface="+mj-lt"/>
                 </a:rPr>
-                <a:t>Xci</a:t>
+                <a:t>X</a:t>
               </a:r>
-              <a:endParaRPr lang="nl-NL" sz="1000" i="1" baseline="30000" dirty="0">
+              <a:r>
+                <a:rPr lang="en-US" sz="1000" i="1" baseline="-25000" dirty="0">
+                  <a:latin typeface="+mj-lt"/>
+                </a:rPr>
+                <a:t>c1</a:t>
+              </a:r>
+              <a:endParaRPr lang="nl-NL" sz="1000" i="1" baseline="-25000" dirty="0">
                 <a:latin typeface="+mj-lt"/>
               </a:endParaRPr>
             </a:p>
@@ -13855,12 +12464,18 @@
                 <a:t>~</a:t>
               </a:r>
               <a:r>
-                <a:rPr lang="en-US" sz="1000" i="1" dirty="0" err="1">
+                <a:rPr lang="en-US" sz="1000" i="1" dirty="0">
                   <a:latin typeface="+mj-lt"/>
                 </a:rPr>
-                <a:t>Xci</a:t>
+                <a:t>X</a:t>
               </a:r>
-              <a:endParaRPr lang="nl-NL" sz="1000" i="1" baseline="30000" dirty="0">
+              <a:r>
+                <a:rPr lang="en-US" sz="1000" i="1" baseline="-25000" dirty="0">
+                  <a:latin typeface="+mj-lt"/>
+                </a:rPr>
+                <a:t>c1</a:t>
+              </a:r>
+              <a:endParaRPr lang="nl-NL" sz="1000" i="1" baseline="-25000" dirty="0">
                 <a:latin typeface="+mj-lt"/>
               </a:endParaRPr>
             </a:p>
@@ -13880,7 +12495,7 @@
           </p:nvSpPr>
           <p:spPr>
             <a:xfrm>
-              <a:off x="6231534" y="9536475"/>
+              <a:off x="5937698" y="9504900"/>
               <a:ext cx="441311" cy="246221"/>
             </a:xfrm>
             <a:prstGeom prst="rect">
@@ -13899,9 +12514,15 @@
                 <a:rPr lang="en-US" sz="1000" i="1" dirty="0" err="1">
                   <a:latin typeface="+mj-lt"/>
                 </a:rPr>
-                <a:t>Xcj</a:t>
+                <a:t>X</a:t>
               </a:r>
-              <a:endParaRPr lang="nl-NL" sz="1000" i="1" baseline="30000" dirty="0">
+              <a:r>
+                <a:rPr lang="en-US" sz="1000" i="1" baseline="-25000" dirty="0" err="1">
+                  <a:latin typeface="+mj-lt"/>
+                </a:rPr>
+                <a:t>cN</a:t>
+              </a:r>
+              <a:endParaRPr lang="nl-NL" sz="1000" i="1" baseline="-25000" dirty="0">
                 <a:latin typeface="+mj-lt"/>
               </a:endParaRPr>
             </a:p>
@@ -13921,8 +12542,8 @@
           </p:nvSpPr>
           <p:spPr>
             <a:xfrm>
-              <a:off x="6548468" y="9595254"/>
-              <a:ext cx="441311" cy="246221"/>
+              <a:off x="6717200" y="9560019"/>
+              <a:ext cx="652679" cy="246221"/>
             </a:xfrm>
             <a:prstGeom prst="rect">
               <a:avLst/>
@@ -13944,270 +12565,119 @@
                 <a:rPr lang="en-US" sz="1000" i="1" dirty="0" err="1">
                   <a:latin typeface="+mj-lt"/>
                 </a:rPr>
-                <a:t>Xcj</a:t>
+                <a:t>X</a:t>
               </a:r>
-              <a:endParaRPr lang="nl-NL" sz="1000" i="1" baseline="30000" dirty="0">
+              <a:r>
+                <a:rPr lang="en-US" sz="1000" i="1" baseline="-25000" dirty="0" err="1">
+                  <a:latin typeface="+mj-lt"/>
+                </a:rPr>
+                <a:t>cN</a:t>
+              </a:r>
+              <a:endParaRPr lang="nl-NL" sz="1000" i="1" baseline="-25000" dirty="0">
+                <a:latin typeface="+mj-lt"/>
+              </a:endParaRPr>
+            </a:p>
+          </p:txBody>
+        </p:sp>
+        <p:sp>
+          <p:nvSpPr>
+            <p:cNvPr id="229" name="TextBox 738">
+              <a:extLst>
+                <a:ext uri="{FF2B5EF4-FFF2-40B4-BE49-F238E27FC236}">
+                  <a16:creationId xmlns:a16="http://schemas.microsoft.com/office/drawing/2014/main" id="{5158CCC7-B7BC-4880-AAD1-40C6BED62579}"/>
+                </a:ext>
+              </a:extLst>
+            </p:cNvPr>
+            <p:cNvSpPr txBox="1"/>
+            <p:nvPr/>
+          </p:nvSpPr>
+          <p:spPr>
+            <a:xfrm>
+              <a:off x="7529662" y="9112177"/>
+              <a:ext cx="652679" cy="246221"/>
+            </a:xfrm>
+            <a:prstGeom prst="rect">
+              <a:avLst/>
+            </a:prstGeom>
+            <a:noFill/>
+          </p:spPr>
+          <p:txBody>
+            <a:bodyPr wrap="square" rtlCol="0">
+              <a:spAutoFit/>
+            </a:bodyPr>
+            <a:lstStyle/>
+            <a:p>
+              <a:pPr algn="ctr"/>
+              <a:r>
+                <a:rPr lang="en-US" sz="1000" i="1" dirty="0"/>
+                <a:t>~</a:t>
+              </a:r>
+              <a:r>
+                <a:rPr lang="en-US" sz="1000" i="1" dirty="0">
+                  <a:latin typeface="+mj-lt"/>
+                </a:rPr>
+                <a:t>X</a:t>
+              </a:r>
+              <a:r>
+                <a:rPr lang="en-US" sz="1000" i="1" baseline="-25000" dirty="0">
+                  <a:latin typeface="+mj-lt"/>
+                </a:rPr>
+                <a:t>c2</a:t>
+              </a:r>
+              <a:endParaRPr lang="nl-NL" sz="1000" i="1" baseline="-25000" dirty="0">
+                <a:latin typeface="+mj-lt"/>
+              </a:endParaRPr>
+            </a:p>
+          </p:txBody>
+        </p:sp>
+        <p:sp>
+          <p:nvSpPr>
+            <p:cNvPr id="230" name="TextBox 735">
+              <a:extLst>
+                <a:ext uri="{FF2B5EF4-FFF2-40B4-BE49-F238E27FC236}">
+                  <a16:creationId xmlns:a16="http://schemas.microsoft.com/office/drawing/2014/main" id="{B1E969F0-8FD3-4BB7-86F5-1508384CC14A}"/>
+                </a:ext>
+              </a:extLst>
+            </p:cNvPr>
+            <p:cNvSpPr txBox="1"/>
+            <p:nvPr/>
+          </p:nvSpPr>
+          <p:spPr>
+            <a:xfrm>
+              <a:off x="6778166" y="9131104"/>
+              <a:ext cx="441311" cy="246221"/>
+            </a:xfrm>
+            <a:prstGeom prst="rect">
+              <a:avLst/>
+            </a:prstGeom>
+            <a:noFill/>
+          </p:spPr>
+          <p:txBody>
+            <a:bodyPr wrap="square" rtlCol="0">
+              <a:spAutoFit/>
+            </a:bodyPr>
+            <a:lstStyle/>
+            <a:p>
+              <a:pPr algn="ctr"/>
+              <a:r>
+                <a:rPr lang="en-US" sz="1000" i="1" dirty="0">
+                  <a:latin typeface="+mj-lt"/>
+                </a:rPr>
+                <a:t>X</a:t>
+              </a:r>
+              <a:r>
+                <a:rPr lang="en-US" sz="1000" i="1" baseline="-25000" dirty="0">
+                  <a:latin typeface="+mj-lt"/>
+                </a:rPr>
+                <a:t>c2</a:t>
+              </a:r>
+              <a:endParaRPr lang="nl-NL" sz="1000" i="1" baseline="-25000" dirty="0">
                 <a:latin typeface="+mj-lt"/>
               </a:endParaRPr>
             </a:p>
           </p:txBody>
         </p:sp>
       </p:grpSp>
-      <mc:AlternateContent xmlns:mc="http://schemas.openxmlformats.org/markup-compatibility/2006" xmlns:a14="http://schemas.microsoft.com/office/drawing/2010/main">
-        <mc:Choice Requires="a14">
-          <p:sp>
-            <p:nvSpPr>
-              <p:cNvPr id="740" name="TextBox 739">
-                <a:extLst>
-                  <a:ext uri="{FF2B5EF4-FFF2-40B4-BE49-F238E27FC236}">
-                    <a16:creationId xmlns:a16="http://schemas.microsoft.com/office/drawing/2014/main" id="{0C580A5D-2BF9-48F1-AA51-8F6402C8C9FD}"/>
-                  </a:ext>
-                </a:extLst>
-              </p:cNvPr>
-              <p:cNvSpPr txBox="1"/>
-              <p:nvPr/>
-            </p:nvSpPr>
-            <p:spPr>
-              <a:xfrm>
-                <a:off x="5244821" y="9740710"/>
-                <a:ext cx="4038782" cy="184666"/>
-              </a:xfrm>
-              <a:prstGeom prst="rect">
-                <a:avLst/>
-              </a:prstGeom>
-              <a:noFill/>
-            </p:spPr>
-            <p:txBody>
-              <a:bodyPr wrap="square" lIns="0" tIns="0" rIns="0" bIns="0" rtlCol="0">
-                <a:spAutoFit/>
-              </a:bodyPr>
-              <a:lstStyle/>
-              <a:p>
-                <a:pPr defTabSz="457200" eaLnBrk="1" fontAlgn="auto" hangingPunct="1">
-                  <a:spcBef>
-                    <a:spcPts val="0"/>
-                  </a:spcBef>
-                  <a:spcAft>
-                    <a:spcPts val="0"/>
-                  </a:spcAft>
-                </a:pPr>
-                <a14:m>
-                  <m:oMathPara xmlns:m="http://schemas.openxmlformats.org/officeDocument/2006/math">
-                    <m:oMathParaPr>
-                      <m:jc m:val="centerGroup"/>
-                    </m:oMathParaPr>
-                    <m:oMath xmlns:m="http://schemas.openxmlformats.org/officeDocument/2006/math">
-                      <m:r>
-                        <a:rPr lang="en-GB" sz="1200" b="0" i="1" smtClean="0">
-                          <a:solidFill>
-                            <a:prstClr val="black"/>
-                          </a:solidFill>
-                          <a:latin typeface="Cambria Math" panose="02040503050406030204" pitchFamily="18" charset="0"/>
-                        </a:rPr>
-                        <m:t>𝑃</m:t>
-                      </m:r>
-                      <m:r>
-                        <a:rPr lang="en-GB" sz="1200" b="0" i="1" baseline="-25000" smtClean="0">
-                          <a:solidFill>
-                            <a:prstClr val="black"/>
-                          </a:solidFill>
-                          <a:latin typeface="Cambria Math" panose="02040503050406030204" pitchFamily="18" charset="0"/>
-                        </a:rPr>
-                        <m:t>𝑛</m:t>
-                      </m:r>
-                      <m:r>
-                        <a:rPr lang="en-GB" sz="1200" b="0" i="1" smtClean="0">
-                          <a:solidFill>
-                            <a:prstClr val="black"/>
-                          </a:solidFill>
-                          <a:latin typeface="Cambria Math" panose="02040503050406030204" pitchFamily="18" charset="0"/>
-                        </a:rPr>
-                        <m:t>(</m:t>
-                      </m:r>
-                      <m:r>
-                        <a:rPr lang="en-GB" sz="1200" b="0" i="1" smtClean="0">
-                          <a:solidFill>
-                            <a:prstClr val="black"/>
-                          </a:solidFill>
-                          <a:latin typeface="Cambria Math" panose="02040503050406030204" pitchFamily="18" charset="0"/>
-                        </a:rPr>
-                        <m:t>𝑖</m:t>
-                      </m:r>
-                      <m:r>
-                        <a:rPr lang="en-GB" sz="1200" b="0" i="1" smtClean="0">
-                          <a:solidFill>
-                            <a:prstClr val="black"/>
-                          </a:solidFill>
-                          <a:latin typeface="Cambria Math" panose="02040503050406030204" pitchFamily="18" charset="0"/>
-                        </a:rPr>
-                        <m:t>,</m:t>
-                      </m:r>
-                      <m:r>
-                        <a:rPr lang="en-GB" sz="1200" b="0" i="1" smtClean="0">
-                          <a:solidFill>
-                            <a:prstClr val="black"/>
-                          </a:solidFill>
-                          <a:latin typeface="Cambria Math" panose="02040503050406030204" pitchFamily="18" charset="0"/>
-                        </a:rPr>
-                        <m:t>𝑗</m:t>
-                      </m:r>
-                      <m:r>
-                        <a:rPr lang="en-GB" sz="1200" b="0" i="1" smtClean="0">
-                          <a:solidFill>
-                            <a:prstClr val="black"/>
-                          </a:solidFill>
-                          <a:latin typeface="Cambria Math" panose="02040503050406030204" pitchFamily="18" charset="0"/>
-                        </a:rPr>
-                        <m:t>)=</m:t>
-                      </m:r>
-                      <m:r>
-                        <a:rPr lang="en-GB" sz="1200" b="0" i="1" smtClean="0">
-                          <a:solidFill>
-                            <a:prstClr val="black"/>
-                          </a:solidFill>
-                          <a:latin typeface="Cambria Math" panose="02040503050406030204" pitchFamily="18" charset="0"/>
-                        </a:rPr>
-                        <m:t>𝑊𝑖𝑙𝑐𝑜𝑥𝑜𝑛</m:t>
-                      </m:r>
-                      <m:r>
-                        <a:rPr lang="en-GB" sz="1200" b="0" i="1" smtClean="0">
-                          <a:solidFill>
-                            <a:prstClr val="black"/>
-                          </a:solidFill>
-                          <a:latin typeface="Cambria Math" panose="02040503050406030204" pitchFamily="18" charset="0"/>
-                        </a:rPr>
-                        <m:t> </m:t>
-                      </m:r>
-                      <m:r>
-                        <a:rPr lang="en-GB" sz="1200" b="0" i="1" smtClean="0">
-                          <a:solidFill>
-                            <a:prstClr val="black"/>
-                          </a:solidFill>
-                          <a:latin typeface="Cambria Math" panose="02040503050406030204" pitchFamily="18" charset="0"/>
-                        </a:rPr>
-                        <m:t>𝑅𝑎𝑛𝑘𝑠𝑢𝑚</m:t>
-                      </m:r>
-                      <m:r>
-                        <a:rPr lang="en-GB" sz="1200" b="0" i="1" smtClean="0">
-                          <a:solidFill>
-                            <a:prstClr val="black"/>
-                          </a:solidFill>
-                          <a:latin typeface="Cambria Math" panose="02040503050406030204" pitchFamily="18" charset="0"/>
-                        </a:rPr>
-                        <m:t>(</m:t>
-                      </m:r>
-                      <m:r>
-                        <a:rPr lang="en-GB" sz="1200" b="0" i="1" smtClean="0">
-                          <a:solidFill>
-                            <a:prstClr val="black"/>
-                          </a:solidFill>
-                          <a:latin typeface="Cambria Math" panose="02040503050406030204" pitchFamily="18" charset="0"/>
-                        </a:rPr>
-                        <m:t>𝑋𝑛𝑖</m:t>
-                      </m:r>
-                      <m:r>
-                        <a:rPr lang="en-GB" sz="1200" b="0" i="1" smtClean="0">
-                          <a:solidFill>
-                            <a:prstClr val="black"/>
-                          </a:solidFill>
-                          <a:latin typeface="Cambria Math" panose="02040503050406030204" pitchFamily="18" charset="0"/>
-                        </a:rPr>
-                        <m:t>, </m:t>
-                      </m:r>
-                      <m:r>
-                        <a:rPr lang="en-GB" sz="1200" b="0" i="1" smtClean="0">
-                          <a:solidFill>
-                            <a:prstClr val="black"/>
-                          </a:solidFill>
-                          <a:latin typeface="Cambria Math" panose="02040503050406030204" pitchFamily="18" charset="0"/>
-                        </a:rPr>
-                        <m:t>𝑋𝑖</m:t>
-                      </m:r>
-                      <m:r>
-                        <a:rPr lang="en-GB" sz="1200" b="0" i="1" smtClean="0">
-                          <a:solidFill>
-                            <a:prstClr val="black"/>
-                          </a:solidFill>
-                          <a:latin typeface="Cambria Math" panose="02040503050406030204" pitchFamily="18" charset="0"/>
-                        </a:rPr>
-                        <m:t>, ~</m:t>
-                      </m:r>
-                      <m:r>
-                        <a:rPr lang="en-GB" sz="1200" b="0" i="1" smtClean="0">
-                          <a:solidFill>
-                            <a:prstClr val="black"/>
-                          </a:solidFill>
-                          <a:latin typeface="Cambria Math" panose="02040503050406030204" pitchFamily="18" charset="0"/>
-                        </a:rPr>
-                        <m:t>𝑋𝑖</m:t>
-                      </m:r>
-                      <m:r>
-                        <a:rPr lang="en-GB" sz="1200" b="0" i="1" smtClean="0">
-                          <a:solidFill>
-                            <a:prstClr val="black"/>
-                          </a:solidFill>
-                          <a:latin typeface="Cambria Math" panose="02040503050406030204" pitchFamily="18" charset="0"/>
-                        </a:rPr>
-                        <m:t>)</m:t>
-                      </m:r>
-                    </m:oMath>
-                  </m:oMathPara>
-                </a14:m>
-                <a:endParaRPr lang="nl-NL" sz="1200" dirty="0">
-                  <a:solidFill>
-                    <a:prstClr val="black"/>
-                  </a:solidFill>
-                  <a:latin typeface="Calibri Light" panose="020F0302020204030204"/>
-                </a:endParaRPr>
-              </a:p>
-            </p:txBody>
-          </p:sp>
-        </mc:Choice>
-        <mc:Fallback xmlns="">
-          <p:sp>
-            <p:nvSpPr>
-              <p:cNvPr id="740" name="TextBox 739">
-                <a:extLst>
-                  <a:ext uri="{FF2B5EF4-FFF2-40B4-BE49-F238E27FC236}">
-                    <a16:creationId xmlns:a16="http://schemas.microsoft.com/office/drawing/2014/main" id="{0C580A5D-2BF9-48F1-AA51-8F6402C8C9FD}"/>
-                  </a:ext>
-                </a:extLst>
-              </p:cNvPr>
-              <p:cNvSpPr txBox="1">
-                <a:spLocks noRot="1" noChangeAspect="1" noMove="1" noResize="1" noEditPoints="1" noAdjustHandles="1" noChangeArrowheads="1" noChangeShapeType="1" noTextEdit="1"/>
-              </p:cNvSpPr>
-              <p:nvPr/>
-            </p:nvSpPr>
-            <p:spPr>
-              <a:xfrm>
-                <a:off x="5244821" y="9740710"/>
-                <a:ext cx="4038782" cy="184666"/>
-              </a:xfrm>
-              <a:prstGeom prst="rect">
-                <a:avLst/>
-              </a:prstGeom>
-              <a:blipFill>
-                <a:blip r:embed="rId23"/>
-                <a:stretch>
-                  <a:fillRect t="-6667" b="-36667"/>
-                </a:stretch>
-              </a:blipFill>
-            </p:spPr>
-            <p:txBody>
-              <a:bodyPr/>
-              <a:lstStyle/>
-              <a:p>
-                <a:r>
-                  <a:rPr lang="en-NL">
-                    <a:noFill/>
-                  </a:rPr>
-                  <a:t> </a:t>
-                </a:r>
-              </a:p>
-            </p:txBody>
-          </p:sp>
-        </mc:Fallback>
-      </mc:AlternateContent>
       <p:cxnSp>
         <p:nvCxnSpPr>
           <p:cNvPr id="741" name="Straight Arrow Connector 740">
@@ -14224,7 +12694,7 @@
         </p:nvCxnSpPr>
         <p:spPr>
           <a:xfrm flipH="1" flipV="1">
-            <a:off x="7699625" y="8554647"/>
+            <a:off x="7694984" y="8871884"/>
             <a:ext cx="226784" cy="0"/>
           </a:xfrm>
           <a:prstGeom prst="straightConnector1">
@@ -14266,7 +12736,7 @@
         </p:nvCxnSpPr>
         <p:spPr>
           <a:xfrm>
-            <a:off x="5141214" y="8554647"/>
+            <a:off x="5136573" y="8871884"/>
             <a:ext cx="269012" cy="0"/>
           </a:xfrm>
           <a:prstGeom prst="straightConnector1">
@@ -14310,7 +12780,7 @@
         </p:nvCxnSpPr>
         <p:spPr>
           <a:xfrm flipH="1" flipV="1">
-            <a:off x="3764180" y="8554647"/>
+            <a:off x="3759539" y="8871884"/>
             <a:ext cx="226784" cy="0"/>
           </a:xfrm>
           <a:prstGeom prst="straightConnector1">
@@ -14338,8 +12808,8 @@
           </a:fontRef>
         </p:style>
       </p:cxnSp>
-      <mc:AlternateContent xmlns:mc="http://schemas.openxmlformats.org/markup-compatibility/2006" xmlns:a14="http://schemas.microsoft.com/office/drawing/2010/main">
-        <mc:Choice Requires="a14">
+      <mc:AlternateContent xmlns:mc="http://schemas.openxmlformats.org/markup-compatibility/2006">
+        <mc:Choice xmlns:a14="http://schemas.microsoft.com/office/drawing/2010/main" Requires="a14">
           <p:sp>
             <p:nvSpPr>
               <p:cNvPr id="744" name="TextBox 743">
@@ -14354,8 +12824,8 @@
             </p:nvSpPr>
             <p:spPr>
               <a:xfrm>
-                <a:off x="2497564" y="7468357"/>
-                <a:ext cx="1151790" cy="215444"/>
+                <a:off x="2451105" y="7774251"/>
+                <a:ext cx="1198816" cy="215444"/>
               </a:xfrm>
               <a:prstGeom prst="rect">
                 <a:avLst/>
@@ -14368,14 +12838,6 @@
               </a:bodyPr>
               <a:lstStyle/>
               <a:p>
-                <a:pPr defTabSz="457200" eaLnBrk="1" fontAlgn="auto" hangingPunct="1">
-                  <a:spcBef>
-                    <a:spcPts val="0"/>
-                  </a:spcBef>
-                  <a:spcAft>
-                    <a:spcPts val="0"/>
-                  </a:spcAft>
-                </a:pPr>
                 <a14:m>
                   <m:oMathPara xmlns:m="http://schemas.openxmlformats.org/officeDocument/2006/math">
                     <m:oMathParaPr>
@@ -14392,13 +12854,13 @@
                         <m:t>𝑃</m:t>
                       </m:r>
                       <m:r>
-                        <a:rPr lang="en-GB" sz="1400" b="0" i="1" baseline="-25000" smtClean="0">
+                        <a:rPr lang="en-US" sz="1400" b="0" i="1" baseline="-25000" smtClean="0">
                           <a:solidFill>
                             <a:prstClr val="black"/>
                           </a:solidFill>
                           <a:latin typeface="Cambria Math" panose="02040503050406030204" pitchFamily="18" charset="0"/>
                         </a:rPr>
-                        <m:t>𝑐</m:t>
+                        <m:t>𝑑𝑐</m:t>
                       </m:r>
                       <m:r>
                         <a:rPr lang="en-GB" sz="1400" b="0" i="1" smtClean="0">
@@ -14410,16 +12872,25 @@
                         <m:t>(</m:t>
                       </m:r>
                       <m:r>
-                        <a:rPr lang="en-GB" sz="1400" b="0" i="1" smtClean="0">
+                        <a:rPr lang="en-US" sz="1400" i="1" smtClean="0">
                           <a:solidFill>
                             <a:prstClr val="black"/>
                           </a:solidFill>
                           <a:latin typeface="Cambria Math" panose="02040503050406030204" pitchFamily="18" charset="0"/>
                         </a:rPr>
-                        <m:t>𝑖</m:t>
+                        <m:t>𝑋</m:t>
                       </m:r>
                       <m:r>
-                        <a:rPr lang="en-GB" sz="1400" b="0" i="1" smtClean="0">
+                        <a:rPr lang="en-US" sz="1400" i="1" baseline="-25000">
+                          <a:solidFill>
+                            <a:prstClr val="black"/>
+                          </a:solidFill>
+                          <a:latin typeface="Cambria Math" panose="02040503050406030204" pitchFamily="18" charset="0"/>
+                        </a:rPr>
+                        <m:t>𝑑</m:t>
+                      </m:r>
+                      <m:r>
+                        <a:rPr lang="en-US" sz="1400" i="1" baseline="-10000">
                           <a:solidFill>
                             <a:prstClr val="black"/>
                           </a:solidFill>
@@ -14428,13 +12899,22 @@
                         <m:t>,</m:t>
                       </m:r>
                       <m:r>
-                        <a:rPr lang="en-GB" sz="1400" b="0" i="1" smtClean="0">
+                        <a:rPr lang="en-US" sz="1400" i="1" smtClean="0">
                           <a:solidFill>
                             <a:prstClr val="black"/>
                           </a:solidFill>
                           <a:latin typeface="Cambria Math" panose="02040503050406030204" pitchFamily="18" charset="0"/>
                         </a:rPr>
-                        <m:t>𝑗</m:t>
+                        <m:t>𝑋</m:t>
+                      </m:r>
+                      <m:r>
+                        <a:rPr lang="en-US" sz="1400" b="0" i="1" baseline="-25000" smtClean="0">
+                          <a:solidFill>
+                            <a:prstClr val="black"/>
+                          </a:solidFill>
+                          <a:latin typeface="Cambria Math" panose="02040503050406030204" pitchFamily="18" charset="0"/>
+                        </a:rPr>
+                        <m:t>𝑐</m:t>
                       </m:r>
                       <m:r>
                         <a:rPr lang="en-GB" sz="1400" b="0" i="1" smtClean="0">
@@ -14458,7 +12938,7 @@
             </p:txBody>
           </p:sp>
         </mc:Choice>
-        <mc:Fallback xmlns="">
+        <mc:Fallback>
           <p:sp>
             <p:nvSpPr>
               <p:cNvPr id="744" name="TextBox 743">
@@ -14475,16 +12955,16 @@
             </p:nvSpPr>
             <p:spPr>
               <a:xfrm>
-                <a:off x="2497564" y="7468357"/>
-                <a:ext cx="1151790" cy="215444"/>
+                <a:off x="2451105" y="7774251"/>
+                <a:ext cx="1198816" cy="215444"/>
               </a:xfrm>
               <a:prstGeom prst="rect">
                 <a:avLst/>
               </a:prstGeom>
               <a:blipFill>
-                <a:blip r:embed="rId24"/>
+                <a:blip r:embed="rId23"/>
                 <a:stretch>
-                  <a:fillRect b="-34286"/>
+                  <a:fillRect b="-30556"/>
                 </a:stretch>
               </a:blipFill>
             </p:spPr>
@@ -14493,7 +12973,7 @@
               <a:lstStyle/>
               <a:p>
                 <a:r>
-                  <a:rPr lang="en-NL">
+                  <a:rPr lang="en-US">
                     <a:noFill/>
                   </a:rPr>
                   <a:t> </a:t>
@@ -14503,8 +12983,8 @@
           </p:sp>
         </mc:Fallback>
       </mc:AlternateContent>
-      <mc:AlternateContent xmlns:mc="http://schemas.openxmlformats.org/markup-compatibility/2006" xmlns:a14="http://schemas.microsoft.com/office/drawing/2010/main">
-        <mc:Choice Requires="a14">
+      <mc:AlternateContent xmlns:mc="http://schemas.openxmlformats.org/markup-compatibility/2006">
+        <mc:Choice xmlns:a14="http://schemas.microsoft.com/office/drawing/2010/main" Requires="a14">
           <p:sp>
             <p:nvSpPr>
               <p:cNvPr id="745" name="TextBox 744">
@@ -14519,7 +12999,7 @@
             </p:nvSpPr>
             <p:spPr>
               <a:xfrm>
-                <a:off x="6175024" y="7468357"/>
+                <a:off x="6170383" y="7785594"/>
                 <a:ext cx="835110" cy="215444"/>
               </a:xfrm>
               <a:prstGeom prst="rect">
@@ -14575,13 +13055,22 @@
                         <m:t>(</m:t>
                       </m:r>
                       <m:r>
-                        <a:rPr lang="en-GB" sz="1400" b="0" i="1" smtClean="0">
+                        <a:rPr lang="en-US" sz="1400" b="0" i="1" smtClean="0">
                           <a:solidFill>
                             <a:prstClr val="black"/>
                           </a:solidFill>
                           <a:latin typeface="Cambria Math" panose="02040503050406030204" pitchFamily="18" charset="0"/>
                         </a:rPr>
-                        <m:t>𝑖</m:t>
+                        <m:t>𝑋</m:t>
+                      </m:r>
+                      <m:r>
+                        <a:rPr lang="en-US" sz="1400" b="0" i="1" baseline="-25000" smtClean="0">
+                          <a:solidFill>
+                            <a:prstClr val="black"/>
+                          </a:solidFill>
+                          <a:latin typeface="Cambria Math" panose="02040503050406030204" pitchFamily="18" charset="0"/>
+                        </a:rPr>
+                        <m:t>𝑐𝑁</m:t>
                       </m:r>
                       <m:r>
                         <a:rPr lang="en-GB" sz="1400" b="0" i="1" smtClean="0">
@@ -14590,7 +13079,7 @@
                           </a:solidFill>
                           <a:latin typeface="Cambria Math" panose="02040503050406030204" pitchFamily="18" charset="0"/>
                         </a:rPr>
-                        <m:t>, ~</m:t>
+                        <m:t>, </m:t>
                       </m:r>
                       <m:r>
                         <a:rPr lang="en-GB" sz="1400" b="0" i="1" smtClean="0">
@@ -14599,7 +13088,25 @@
                           </a:solidFill>
                           <a:latin typeface="Cambria Math" panose="02040503050406030204" pitchFamily="18" charset="0"/>
                         </a:rPr>
-                        <m:t>𝑖</m:t>
+                        <m:t>~</m:t>
+                      </m:r>
+                      <m:r>
+                        <a:rPr lang="en-US" sz="1400" b="0" i="1" smtClean="0">
+                          <a:solidFill>
+                            <a:prstClr val="black"/>
+                          </a:solidFill>
+                          <a:latin typeface="Cambria Math" panose="02040503050406030204" pitchFamily="18" charset="0"/>
+                        </a:rPr>
+                        <m:t>𝑋</m:t>
+                      </m:r>
+                      <m:r>
+                        <a:rPr lang="en-US" sz="1400" b="0" i="1" baseline="-25000" smtClean="0">
+                          <a:solidFill>
+                            <a:prstClr val="black"/>
+                          </a:solidFill>
+                          <a:latin typeface="Cambria Math" panose="02040503050406030204" pitchFamily="18" charset="0"/>
+                        </a:rPr>
+                        <m:t>𝑐𝑁</m:t>
                       </m:r>
                       <m:r>
                         <a:rPr lang="en-GB" sz="1400" b="0" i="1" smtClean="0">
@@ -14623,7 +13130,7 @@
             </p:txBody>
           </p:sp>
         </mc:Choice>
-        <mc:Fallback xmlns="">
+        <mc:Fallback>
           <p:sp>
             <p:nvSpPr>
               <p:cNvPr id="745" name="TextBox 744">
@@ -14640,16 +13147,16 @@
             </p:nvSpPr>
             <p:spPr>
               <a:xfrm>
-                <a:off x="6175024" y="7468357"/>
+                <a:off x="6170383" y="7785594"/>
                 <a:ext cx="835110" cy="215444"/>
               </a:xfrm>
               <a:prstGeom prst="rect">
                 <a:avLst/>
               </a:prstGeom>
               <a:blipFill>
-                <a:blip r:embed="rId25"/>
+                <a:blip r:embed="rId24"/>
                 <a:stretch>
-                  <a:fillRect b="-34286"/>
+                  <a:fillRect l="-7299" r="-35036" b="-30556"/>
                 </a:stretch>
               </a:blipFill>
             </p:spPr>
@@ -14658,7 +13165,7 @@
               <a:lstStyle/>
               <a:p>
                 <a:r>
-                  <a:rPr lang="en-NL">
+                  <a:rPr lang="en-US">
                     <a:noFill/>
                   </a:rPr>
                   <a:t> </a:t>
@@ -14851,8 +13358,8 @@
           </p:sp>
         </mc:Fallback>
       </mc:AlternateContent>
-      <mc:AlternateContent xmlns:mc="http://schemas.openxmlformats.org/markup-compatibility/2006" xmlns:a14="http://schemas.microsoft.com/office/drawing/2010/main">
-        <mc:Choice Requires="a14">
+      <mc:AlternateContent xmlns:mc="http://schemas.openxmlformats.org/markup-compatibility/2006">
+        <mc:Choice xmlns:a14="http://schemas.microsoft.com/office/drawing/2010/main" Requires="a14">
           <p:sp>
             <p:nvSpPr>
               <p:cNvPr id="748" name="TextBox 747">
@@ -14967,26 +13474,6 @@
                         </m:sup>
                       </m:sSubSup>
                       <m:r>
-                        <a:rPr lang="en-US" sz="1200" i="1" smtClean="0">
-                          <a:solidFill>
-                            <a:prstClr val="black"/>
-                          </a:solidFill>
-                          <a:latin typeface="Cambria Math" panose="02040503050406030204" pitchFamily="18" charset="0"/>
-                          <a:ea typeface="Cambria Math" panose="02040503050406030204" pitchFamily="18" charset="0"/>
-                        </a:rPr>
-                        <m:t>≤</m:t>
-                      </m:r>
-                      <m:r>
-                        <a:rPr lang="en-GB" sz="1200" b="0" i="1" smtClean="0">
-                          <a:solidFill>
-                            <a:prstClr val="black"/>
-                          </a:solidFill>
-                          <a:latin typeface="Cambria Math" panose="02040503050406030204" pitchFamily="18" charset="0"/>
-                          <a:ea typeface="Cambria Math" panose="02040503050406030204" pitchFamily="18" charset="0"/>
-                        </a:rPr>
-                        <m:t>𝑎𝑙𝑝h𝑎</m:t>
-                      </m:r>
-                      <m:r>
                         <a:rPr lang="en-GB" sz="1200" b="0" i="1" smtClean="0">
                           <a:solidFill>
                             <a:prstClr val="black"/>
@@ -15008,7 +13495,7 @@
             </p:txBody>
           </p:sp>
         </mc:Choice>
-        <mc:Fallback xmlns="">
+        <mc:Fallback>
           <p:sp>
             <p:nvSpPr>
               <p:cNvPr id="748" name="TextBox 747">
@@ -15043,7 +13530,7 @@
               <a:lstStyle/>
               <a:p>
                 <a:r>
-                  <a:rPr lang="en-NL">
+                  <a:rPr lang="en-US">
                     <a:noFill/>
                   </a:rPr>
                   <a:t> </a:t>
@@ -16006,8 +14493,8 @@
         </p:nvCxnSpPr>
         <p:spPr>
           <a:xfrm flipV="1">
-            <a:off x="9748900" y="5812456"/>
-            <a:ext cx="216000" cy="0"/>
+            <a:off x="10975142" y="6003929"/>
+            <a:ext cx="1005840" cy="0"/>
           </a:xfrm>
           <a:prstGeom prst="straightConnector1">
             <a:avLst/>
@@ -16280,7 +14767,7 @@
         <p:spPr>
           <a:xfrm>
             <a:off x="10945802" y="7317689"/>
-            <a:ext cx="224742" cy="307777"/>
+            <a:ext cx="328936" cy="307777"/>
           </a:xfrm>
           <a:prstGeom prst="rect">
             <a:avLst/>
@@ -16294,10 +14781,10 @@
           <a:lstStyle/>
           <a:p>
             <a:r>
-              <a:rPr lang="en-GB" sz="1400" i="1" dirty="0" err="1">
+              <a:rPr lang="en-GB" sz="1400" i="1" dirty="0">
                 <a:latin typeface="+mj-lt"/>
               </a:rPr>
-              <a:t>i</a:t>
+              <a:t>f1</a:t>
             </a:r>
             <a:endParaRPr lang="en-NL" sz="1400" i="1" dirty="0">
               <a:latin typeface="+mj-lt"/>
@@ -16320,7 +14807,7 @@
         <p:spPr>
           <a:xfrm>
             <a:off x="11562050" y="7317689"/>
-            <a:ext cx="266420" cy="307777"/>
+            <a:ext cx="314510" cy="307777"/>
           </a:xfrm>
           <a:prstGeom prst="rect">
             <a:avLst/>
@@ -16334,12 +14821,18 @@
           <a:lstStyle/>
           <a:p>
             <a:r>
-              <a:rPr lang="en-GB" sz="1400" i="1" dirty="0">
+              <a:rPr lang="en-GB" sz="1400" i="1" dirty="0" err="1">
                 <a:latin typeface="+mj-lt"/>
               </a:rPr>
-              <a:t> j</a:t>
+              <a:t>f</a:t>
             </a:r>
-            <a:endParaRPr lang="en-NL" sz="1400" i="1" dirty="0">
+            <a:r>
+              <a:rPr lang="en-GB" sz="1400" i="1" baseline="-25000" dirty="0" err="1">
+                <a:latin typeface="+mj-lt"/>
+              </a:rPr>
+              <a:t>N</a:t>
+            </a:r>
+            <a:endParaRPr lang="en-NL" sz="1400" i="1" baseline="-25000" dirty="0">
               <a:latin typeface="+mj-lt"/>
             </a:endParaRPr>
           </a:p>
@@ -16400,7 +14893,7 @@
         <p:spPr>
           <a:xfrm>
             <a:off x="10628396" y="7540482"/>
-            <a:ext cx="224742" cy="307777"/>
+            <a:ext cx="328936" cy="307777"/>
           </a:xfrm>
           <a:prstGeom prst="rect">
             <a:avLst/>
@@ -16414,10 +14907,10 @@
           <a:lstStyle/>
           <a:p>
             <a:r>
-              <a:rPr lang="en-GB" sz="1400" i="1" dirty="0" err="1">
+              <a:rPr lang="en-GB" sz="1400" i="1" dirty="0">
                 <a:latin typeface="+mj-lt"/>
               </a:rPr>
-              <a:t>i</a:t>
+              <a:t>f1</a:t>
             </a:r>
             <a:endParaRPr lang="en-NL" sz="1400" i="1" dirty="0">
               <a:latin typeface="+mj-lt"/>
@@ -16440,7 +14933,7 @@
         <p:spPr>
           <a:xfrm>
             <a:off x="10625429" y="8078527"/>
-            <a:ext cx="226344" cy="307777"/>
+            <a:ext cx="314510" cy="307777"/>
           </a:xfrm>
           <a:prstGeom prst="rect">
             <a:avLst/>
@@ -16454,12 +14947,18 @@
           <a:lstStyle/>
           <a:p>
             <a:r>
-              <a:rPr lang="en-GB" sz="1400" i="1" dirty="0">
+              <a:rPr lang="en-GB" sz="1400" i="1" dirty="0" err="1">
                 <a:latin typeface="+mj-lt"/>
               </a:rPr>
-              <a:t>j</a:t>
+              <a:t>f</a:t>
             </a:r>
-            <a:endParaRPr lang="en-NL" sz="1400" i="1" dirty="0">
+            <a:r>
+              <a:rPr lang="en-GB" sz="1400" i="1" baseline="-25000" dirty="0" err="1">
+                <a:latin typeface="+mj-lt"/>
+              </a:rPr>
+              <a:t>N</a:t>
+            </a:r>
+            <a:endParaRPr lang="en-NL" sz="1400" i="1" baseline="-25000" dirty="0">
               <a:latin typeface="+mj-lt"/>
             </a:endParaRPr>
           </a:p>
@@ -16705,7 +15204,7 @@
         </p:nvSpPr>
         <p:spPr>
           <a:xfrm>
-            <a:off x="2991389" y="7914598"/>
+            <a:off x="2986748" y="8231835"/>
             <a:ext cx="389831" cy="357108"/>
           </a:xfrm>
           <a:prstGeom prst="ellipse">
@@ -16763,7 +15262,7 @@
         </p:nvSpPr>
         <p:spPr>
           <a:xfrm>
-            <a:off x="2680805" y="7964945"/>
+            <a:off x="2676164" y="8282182"/>
             <a:ext cx="279055" cy="255631"/>
           </a:xfrm>
           <a:prstGeom prst="ellipse">
@@ -16825,7 +15324,7 @@
         </p:nvSpPr>
         <p:spPr>
           <a:xfrm>
-            <a:off x="2640401" y="7991551"/>
+            <a:off x="2635760" y="8308788"/>
             <a:ext cx="346916" cy="215444"/>
           </a:xfrm>
           <a:prstGeom prst="rect">
@@ -16844,9 +15343,15 @@
               <a:rPr lang="en-US" sz="800" i="1" dirty="0">
                 <a:latin typeface="+mj-lt"/>
               </a:rPr>
-              <a:t>Xi</a:t>
+              <a:t>X</a:t>
             </a:r>
-            <a:endParaRPr lang="nl-NL" sz="800" i="1" dirty="0">
+            <a:r>
+              <a:rPr lang="en-US" sz="800" i="1" baseline="-25000" dirty="0">
+                <a:latin typeface="+mj-lt"/>
+              </a:rPr>
+              <a:t>d1</a:t>
+            </a:r>
+            <a:endParaRPr lang="nl-NL" sz="800" i="1" baseline="-25000" dirty="0">
               <a:latin typeface="+mj-lt"/>
             </a:endParaRPr>
           </a:p>
@@ -16866,7 +15371,7 @@
         </p:nvSpPr>
         <p:spPr>
           <a:xfrm>
-            <a:off x="3010468" y="7994954"/>
+            <a:off x="3005827" y="8312191"/>
             <a:ext cx="346916" cy="215444"/>
           </a:xfrm>
           <a:prstGeom prst="rect">
@@ -16885,197 +15390,20 @@
               <a:rPr lang="en-US" sz="800" i="1" dirty="0" err="1">
                 <a:latin typeface="+mj-lt"/>
               </a:rPr>
-              <a:t>Xj</a:t>
+              <a:t>X</a:t>
             </a:r>
-            <a:endParaRPr lang="nl-NL" sz="800" i="1" dirty="0">
+            <a:r>
+              <a:rPr lang="en-US" sz="800" i="1" baseline="-25000" dirty="0" err="1">
+                <a:latin typeface="+mj-lt"/>
+              </a:rPr>
+              <a:t>cN</a:t>
+            </a:r>
+            <a:endParaRPr lang="nl-NL" sz="800" i="1" baseline="-25000" dirty="0">
               <a:latin typeface="+mj-lt"/>
             </a:endParaRPr>
           </a:p>
         </p:txBody>
       </p:sp>
-      <mc:AlternateContent xmlns:mc="http://schemas.openxmlformats.org/markup-compatibility/2006" xmlns:a14="http://schemas.microsoft.com/office/drawing/2010/main">
-        <mc:Choice Requires="a14">
-          <p:sp>
-            <p:nvSpPr>
-              <p:cNvPr id="785" name="TextBox 784">
-                <a:extLst>
-                  <a:ext uri="{FF2B5EF4-FFF2-40B4-BE49-F238E27FC236}">
-                    <a16:creationId xmlns:a16="http://schemas.microsoft.com/office/drawing/2014/main" id="{D45ED372-F2C9-4C90-A348-A032F862CCAD}"/>
-                  </a:ext>
-                </a:extLst>
-              </p:cNvPr>
-              <p:cNvSpPr txBox="1"/>
-              <p:nvPr/>
-            </p:nvSpPr>
-            <p:spPr>
-              <a:xfrm>
-                <a:off x="9899820" y="5649847"/>
-                <a:ext cx="1852246" cy="447238"/>
-              </a:xfrm>
-              <a:prstGeom prst="rect">
-                <a:avLst/>
-              </a:prstGeom>
-              <a:noFill/>
-            </p:spPr>
-            <p:txBody>
-              <a:bodyPr wrap="square" lIns="0" tIns="0" rIns="0" bIns="0" rtlCol="0">
-                <a:spAutoFit/>
-              </a:bodyPr>
-              <a:lstStyle/>
-              <a:p>
-                <a:pPr/>
-                <a14:m>
-                  <m:oMathPara xmlns:m="http://schemas.openxmlformats.org/officeDocument/2006/math">
-                    <m:oMathParaPr>
-                      <m:jc m:val="centerGroup"/>
-                    </m:oMathParaPr>
-                    <m:oMath xmlns:m="http://schemas.openxmlformats.org/officeDocument/2006/math">
-                      <m:nary>
-                        <m:naryPr>
-                          <m:chr m:val="∑"/>
-                          <m:subHide m:val="on"/>
-                          <m:supHide m:val="on"/>
-                          <m:ctrlPr>
-                            <a:rPr lang="pt-BR" sz="1200" i="1">
-                              <a:solidFill>
-                                <a:prstClr val="black"/>
-                              </a:solidFill>
-                              <a:latin typeface="Cambria Math" panose="02040503050406030204" pitchFamily="18" charset="0"/>
-                            </a:rPr>
-                          </m:ctrlPr>
-                        </m:naryPr>
-                        <m:sub/>
-                        <m:sup/>
-                        <m:e>
-                          <m:sSub>
-                            <m:sSubPr>
-                              <m:ctrlPr>
-                                <a:rPr lang="en-NL" sz="1200" i="1">
-                                  <a:latin typeface="Cambria Math" panose="02040503050406030204" pitchFamily="18" charset="0"/>
-                                </a:rPr>
-                              </m:ctrlPr>
-                            </m:sSubPr>
-                            <m:e>
-                              <m:r>
-                                <a:rPr lang="en-GB" sz="1200" i="1">
-                                  <a:latin typeface="Cambria Math" panose="02040503050406030204" pitchFamily="18" charset="0"/>
-                                </a:rPr>
-                                <m:t>𝑋</m:t>
-                              </m:r>
-                            </m:e>
-                            <m:sub>
-                              <m:r>
-                                <a:rPr lang="en-GB" sz="1200" i="1">
-                                  <a:latin typeface="Cambria Math" panose="02040503050406030204" pitchFamily="18" charset="0"/>
-                                </a:rPr>
-                                <m:t>𝑐</m:t>
-                              </m:r>
-                            </m:sub>
-                          </m:sSub>
-                        </m:e>
-                      </m:nary>
-                      <m:r>
-                        <a:rPr lang="en-GB" sz="1200" i="1">
-                          <a:solidFill>
-                            <a:prstClr val="black"/>
-                          </a:solidFill>
-                          <a:latin typeface="Cambria Math" panose="02040503050406030204" pitchFamily="18" charset="0"/>
-                          <a:ea typeface="Cambria Math" panose="02040503050406030204" pitchFamily="18" charset="0"/>
-                        </a:rPr>
-                        <m:t>≥</m:t>
-                      </m:r>
-                      <m:sSup>
-                        <m:sSupPr>
-                          <m:ctrlPr>
-                            <a:rPr lang="en-GB" sz="1200" i="1">
-                              <a:solidFill>
-                                <a:prstClr val="black"/>
-                              </a:solidFill>
-                              <a:latin typeface="Cambria Math" panose="02040503050406030204" pitchFamily="18" charset="0"/>
-                            </a:rPr>
-                          </m:ctrlPr>
-                        </m:sSupPr>
-                        <m:e>
-                          <m:r>
-                            <a:rPr lang="en-GB" sz="1200" i="1">
-                              <a:solidFill>
-                                <a:prstClr val="black"/>
-                              </a:solidFill>
-                              <a:latin typeface="Cambria Math" panose="02040503050406030204" pitchFamily="18" charset="0"/>
-                            </a:rPr>
-                            <m:t>𝑦</m:t>
-                          </m:r>
-                        </m:e>
-                        <m:sup>
-                          <m:r>
-                            <a:rPr lang="en-GB" sz="1200" i="1">
-                              <a:solidFill>
-                                <a:prstClr val="black"/>
-                              </a:solidFill>
-                              <a:latin typeface="Cambria Math" panose="02040503050406030204" pitchFamily="18" charset="0"/>
-                            </a:rPr>
-                            <m:t>𝑚𝑖𝑛</m:t>
-                          </m:r>
-                        </m:sup>
-                      </m:sSup>
-                    </m:oMath>
-                  </m:oMathPara>
-                </a14:m>
-                <a:endParaRPr lang="nl-NL" sz="1200" dirty="0">
-                  <a:solidFill>
-                    <a:prstClr val="black"/>
-                  </a:solidFill>
-                  <a:latin typeface="Calibri Light" panose="020F0302020204030204"/>
-                </a:endParaRPr>
-              </a:p>
-            </p:txBody>
-          </p:sp>
-        </mc:Choice>
-        <mc:Fallback xmlns="">
-          <p:sp>
-            <p:nvSpPr>
-              <p:cNvPr id="785" name="TextBox 784">
-                <a:extLst>
-                  <a:ext uri="{FF2B5EF4-FFF2-40B4-BE49-F238E27FC236}">
-                    <a16:creationId xmlns:a16="http://schemas.microsoft.com/office/drawing/2014/main" id="{D45ED372-F2C9-4C90-A348-A032F862CCAD}"/>
-                  </a:ext>
-                </a:extLst>
-              </p:cNvPr>
-              <p:cNvSpPr txBox="1">
-                <a:spLocks noRot="1" noChangeAspect="1" noMove="1" noResize="1" noEditPoints="1" noAdjustHandles="1" noChangeArrowheads="1" noChangeShapeType="1" noTextEdit="1"/>
-              </p:cNvSpPr>
-              <p:nvPr/>
-            </p:nvSpPr>
-            <p:spPr>
-              <a:xfrm>
-                <a:off x="9899820" y="5649847"/>
-                <a:ext cx="1852246" cy="447238"/>
-              </a:xfrm>
-              <a:prstGeom prst="rect">
-                <a:avLst/>
-              </a:prstGeom>
-              <a:blipFill>
-                <a:blip r:embed="rId29"/>
-                <a:stretch>
-                  <a:fillRect l="-6250" t="-152055" b="-209589"/>
-                </a:stretch>
-              </a:blipFill>
-            </p:spPr>
-            <p:txBody>
-              <a:bodyPr/>
-              <a:lstStyle/>
-              <a:p>
-                <a:r>
-                  <a:rPr lang="en-NL">
-                    <a:noFill/>
-                  </a:rPr>
-                  <a:t> </a:t>
-                </a:r>
-              </a:p>
-            </p:txBody>
-          </p:sp>
-        </mc:Fallback>
-      </mc:AlternateContent>
       <p:sp>
         <p:nvSpPr>
           <p:cNvPr id="786" name="Rectangle 785">
@@ -17090,7 +15418,7 @@
         </p:nvSpPr>
         <p:spPr>
           <a:xfrm>
-            <a:off x="7948065" y="7338948"/>
+            <a:off x="7943424" y="7656185"/>
             <a:ext cx="1168400" cy="369332"/>
           </a:xfrm>
           <a:prstGeom prst="rect">
@@ -17105,14 +15433,14 @@
           <a:p>
             <a:pPr algn="ctr"/>
             <a:r>
-              <a:rPr lang="en-GB" dirty="0" err="1"/>
+              <a:rPr lang="en-GB" b="1" i="1" dirty="0" err="1"/>
               <a:t>X</a:t>
             </a:r>
             <a:r>
-              <a:rPr lang="en-GB" baseline="-25000" dirty="0" err="1"/>
+              <a:rPr lang="en-GB" i="1" baseline="-25000" dirty="0" err="1"/>
               <a:t>numeric</a:t>
             </a:r>
-            <a:endParaRPr lang="en-NL" baseline="-25000" dirty="0"/>
+            <a:endParaRPr lang="en-NL" i="1" baseline="-25000" dirty="0"/>
           </a:p>
         </p:txBody>
       </p:sp>
@@ -17130,8 +15458,8 @@
         </p:nvSpPr>
         <p:spPr>
           <a:xfrm>
-            <a:off x="1065641" y="7338948"/>
-            <a:ext cx="795539" cy="369332"/>
+            <a:off x="1055838" y="7656185"/>
+            <a:ext cx="805863" cy="369332"/>
           </a:xfrm>
           <a:prstGeom prst="rect">
             <a:avLst/>
@@ -17145,14 +15473,14 @@
           <a:p>
             <a:pPr algn="ctr"/>
             <a:r>
-              <a:rPr lang="en-GB" dirty="0" err="1"/>
+              <a:rPr lang="en-GB" b="1" i="1" dirty="0" err="1"/>
               <a:t>X</a:t>
             </a:r>
             <a:r>
-              <a:rPr lang="en-GB" baseline="-25000" dirty="0" err="1"/>
+              <a:rPr lang="en-GB" i="1" baseline="-25000" dirty="0" err="1"/>
               <a:t>discrete</a:t>
             </a:r>
-            <a:endParaRPr lang="en-NL" baseline="-25000" dirty="0"/>
+            <a:endParaRPr lang="en-NL" i="1" baseline="-25000" dirty="0"/>
           </a:p>
         </p:txBody>
       </p:sp>
@@ -17170,7 +15498,7 @@
         </p:nvSpPr>
         <p:spPr>
           <a:xfrm>
-            <a:off x="4011200" y="7338948"/>
+            <a:off x="4006559" y="7656185"/>
             <a:ext cx="1096582" cy="369332"/>
           </a:xfrm>
           <a:prstGeom prst="rect">
@@ -17185,14 +15513,14 @@
           <a:p>
             <a:pPr algn="ctr"/>
             <a:r>
-              <a:rPr lang="en-GB" dirty="0" err="1"/>
+              <a:rPr lang="en-GB" b="1" i="1" dirty="0" err="1"/>
               <a:t>X</a:t>
             </a:r>
             <a:r>
-              <a:rPr lang="en-GB" baseline="-25000" dirty="0" err="1"/>
+              <a:rPr lang="en-GB" i="1" baseline="-25000" dirty="0" err="1"/>
               <a:t>combinatory</a:t>
             </a:r>
-            <a:endParaRPr lang="en-NL" baseline="-25000" dirty="0"/>
+            <a:endParaRPr lang="en-NL" i="1" baseline="-25000" dirty="0"/>
           </a:p>
         </p:txBody>
       </p:sp>
@@ -17210,8 +15538,8 @@
         </p:nvSpPr>
         <p:spPr>
           <a:xfrm>
-            <a:off x="11473507" y="4183230"/>
-            <a:ext cx="355610" cy="276999"/>
+            <a:off x="11473507" y="4133614"/>
+            <a:ext cx="408894" cy="338554"/>
           </a:xfrm>
           <a:prstGeom prst="rect">
             <a:avLst/>
@@ -17225,12 +15553,18 @@
           <a:lstStyle/>
           <a:p>
             <a:r>
-              <a:rPr lang="en-GB" sz="1200" i="1" dirty="0" err="1">
+              <a:rPr lang="en-GB" sz="1600" i="1" dirty="0">
                 <a:latin typeface="+mj-lt"/>
               </a:rPr>
-              <a:t>Xci</a:t>
+              <a:t>X</a:t>
             </a:r>
-            <a:endParaRPr lang="en-NL" sz="1200" i="1" dirty="0">
+            <a:r>
+              <a:rPr lang="en-GB" sz="1600" i="1" baseline="-25000" dirty="0">
+                <a:latin typeface="+mj-lt"/>
+              </a:rPr>
+              <a:t>c1</a:t>
+            </a:r>
+            <a:endParaRPr lang="en-NL" sz="1600" i="1" baseline="-25000" dirty="0">
               <a:latin typeface="+mj-lt"/>
             </a:endParaRPr>
           </a:p>
@@ -17250,8 +15584,8 @@
         </p:nvSpPr>
         <p:spPr>
           <a:xfrm>
-            <a:off x="12215573" y="4183052"/>
-            <a:ext cx="355610" cy="276999"/>
+            <a:off x="12215573" y="4133436"/>
+            <a:ext cx="426527" cy="338554"/>
           </a:xfrm>
           <a:prstGeom prst="rect">
             <a:avLst/>
@@ -17265,12 +15599,18 @@
           <a:lstStyle/>
           <a:p>
             <a:r>
-              <a:rPr lang="en-GB" sz="1200" i="1" dirty="0" err="1">
+              <a:rPr lang="en-GB" sz="1600" i="1" dirty="0" err="1">
                 <a:latin typeface="+mj-lt"/>
               </a:rPr>
-              <a:t>Xcj</a:t>
+              <a:t>X</a:t>
             </a:r>
-            <a:endParaRPr lang="en-NL" sz="1200" i="1" dirty="0">
+            <a:r>
+              <a:rPr lang="en-GB" sz="1600" i="1" baseline="-25000" dirty="0" err="1">
+                <a:latin typeface="+mj-lt"/>
+              </a:rPr>
+              <a:t>cN</a:t>
+            </a:r>
+            <a:endParaRPr lang="en-NL" sz="1600" i="1" baseline="-25000" dirty="0">
               <a:latin typeface="+mj-lt"/>
             </a:endParaRPr>
           </a:p>
@@ -17290,8 +15630,8 @@
         </p:nvSpPr>
         <p:spPr>
           <a:xfrm>
-            <a:off x="11927488" y="4192794"/>
-            <a:ext cx="295274" cy="276999"/>
+            <a:off x="11927488" y="4143178"/>
+            <a:ext cx="324128" cy="338554"/>
           </a:xfrm>
           <a:prstGeom prst="rect">
             <a:avLst/>
@@ -17305,116 +15645,14 @@
           <a:lstStyle/>
           <a:p>
             <a:r>
-              <a:rPr lang="en-GB" sz="1200" i="1" dirty="0">
+              <a:rPr lang="en-GB" sz="1600" i="1" dirty="0">
                 <a:latin typeface="+mj-lt"/>
               </a:rPr>
               <a:t>…</a:t>
             </a:r>
-            <a:endParaRPr lang="en-NL" sz="1200" i="1" dirty="0">
+            <a:endParaRPr lang="en-NL" sz="1600" i="1" dirty="0">
               <a:latin typeface="+mj-lt"/>
             </a:endParaRPr>
-          </a:p>
-        </p:txBody>
-      </p:sp>
-      <p:sp>
-        <p:nvSpPr>
-          <p:cNvPr id="792" name="Freeform: Shape 791">
-            <a:extLst>
-              <a:ext uri="{FF2B5EF4-FFF2-40B4-BE49-F238E27FC236}">
-                <a16:creationId xmlns:a16="http://schemas.microsoft.com/office/drawing/2014/main" id="{C9ECC923-4EF0-4512-9D7A-1A71D4906ECE}"/>
-              </a:ext>
-            </a:extLst>
-          </p:cNvPr>
-          <p:cNvSpPr/>
-          <p:nvPr/>
-        </p:nvSpPr>
-        <p:spPr>
-          <a:xfrm>
-            <a:off x="9092891" y="4517541"/>
-            <a:ext cx="408301" cy="735942"/>
-          </a:xfrm>
-          <a:custGeom>
-            <a:avLst/>
-            <a:gdLst>
-              <a:gd name="connsiteX0" fmla="*/ 939242 w 958374"/>
-              <a:gd name="connsiteY0" fmla="*/ 0 h 691763"/>
-              <a:gd name="connsiteX1" fmla="*/ 851777 w 958374"/>
-              <a:gd name="connsiteY1" fmla="*/ 365760 h 691763"/>
-              <a:gd name="connsiteX2" fmla="*/ 120257 w 958374"/>
-              <a:gd name="connsiteY2" fmla="*/ 429370 h 691763"/>
-              <a:gd name="connsiteX3" fmla="*/ 8939 w 958374"/>
-              <a:gd name="connsiteY3" fmla="*/ 691763 h 691763"/>
-            </a:gdLst>
-            <a:ahLst/>
-            <a:cxnLst>
-              <a:cxn ang="0">
-                <a:pos x="connsiteX0" y="connsiteY0"/>
-              </a:cxn>
-              <a:cxn ang="0">
-                <a:pos x="connsiteX1" y="connsiteY1"/>
-              </a:cxn>
-              <a:cxn ang="0">
-                <a:pos x="connsiteX2" y="connsiteY2"/>
-              </a:cxn>
-              <a:cxn ang="0">
-                <a:pos x="connsiteX3" y="connsiteY3"/>
-              </a:cxn>
-            </a:cxnLst>
-            <a:rect l="l" t="t" r="r" b="b"/>
-            <a:pathLst>
-              <a:path w="958374" h="691763">
-                <a:moveTo>
-                  <a:pt x="939242" y="0"/>
-                </a:moveTo>
-                <a:cubicBezTo>
-                  <a:pt x="963758" y="147099"/>
-                  <a:pt x="988274" y="294198"/>
-                  <a:pt x="851777" y="365760"/>
-                </a:cubicBezTo>
-                <a:cubicBezTo>
-                  <a:pt x="715280" y="437322"/>
-                  <a:pt x="260730" y="375036"/>
-                  <a:pt x="120257" y="429370"/>
-                </a:cubicBezTo>
-                <a:cubicBezTo>
-                  <a:pt x="-20216" y="483704"/>
-                  <a:pt x="-5639" y="587733"/>
-                  <a:pt x="8939" y="691763"/>
-                </a:cubicBezTo>
-              </a:path>
-            </a:pathLst>
-          </a:custGeom>
-          <a:noFill/>
-          <a:ln w="6350">
-            <a:solidFill>
-              <a:schemeClr val="tx1"/>
-            </a:solidFill>
-            <a:prstDash val="dash"/>
-            <a:tailEnd type="triangle"/>
-          </a:ln>
-        </p:spPr>
-        <p:style>
-          <a:lnRef idx="2">
-            <a:schemeClr val="accent1">
-              <a:shade val="50000"/>
-            </a:schemeClr>
-          </a:lnRef>
-          <a:fillRef idx="1">
-            <a:schemeClr val="accent1"/>
-          </a:fillRef>
-          <a:effectRef idx="0">
-            <a:schemeClr val="accent1"/>
-          </a:effectRef>
-          <a:fontRef idx="minor">
-            <a:schemeClr val="lt1"/>
-          </a:fontRef>
-        </p:style>
-        <p:txBody>
-          <a:bodyPr rtlCol="0" anchor="ctr"/>
-          <a:lstStyle/>
-          <a:p>
-            <a:pPr algn="ctr"/>
-            <a:endParaRPr lang="en-NL"/>
           </a:p>
         </p:txBody>
       </p:sp>
@@ -17432,8 +15670,8 @@
         </p:nvSpPr>
         <p:spPr>
           <a:xfrm>
-            <a:off x="9369126" y="4201061"/>
-            <a:ext cx="314510" cy="307777"/>
+            <a:off x="10295420" y="4140183"/>
+            <a:ext cx="341760" cy="369332"/>
           </a:xfrm>
           <a:prstGeom prst="rect">
             <a:avLst/>
@@ -17447,12 +15685,428 @@
           <a:lstStyle/>
           <a:p>
             <a:r>
-              <a:rPr lang="en-GB" sz="1400" i="1" dirty="0">
+              <a:rPr lang="en-GB" i="1" dirty="0">
                 <a:latin typeface="+mj-lt"/>
               </a:rPr>
               <a:t>…</a:t>
             </a:r>
-            <a:endParaRPr lang="en-NL" sz="1400" i="1" dirty="0">
+            <a:endParaRPr lang="en-NL" i="1" dirty="0">
+              <a:latin typeface="+mj-lt"/>
+            </a:endParaRPr>
+          </a:p>
+        </p:txBody>
+      </p:sp>
+      <p:sp>
+        <p:nvSpPr>
+          <p:cNvPr id="203" name="TextBox 782">
+            <a:extLst>
+              <a:ext uri="{FF2B5EF4-FFF2-40B4-BE49-F238E27FC236}">
+                <a16:creationId xmlns:a16="http://schemas.microsoft.com/office/drawing/2014/main" id="{9F07BE12-C77B-4FBF-9D1F-6DA941EEAF38}"/>
+              </a:ext>
+            </a:extLst>
+          </p:cNvPr>
+          <p:cNvSpPr txBox="1"/>
+          <p:nvPr/>
+        </p:nvSpPr>
+        <p:spPr>
+          <a:xfrm>
+            <a:off x="2885210" y="8801681"/>
+            <a:ext cx="346916" cy="215444"/>
+          </a:xfrm>
+          <a:prstGeom prst="rect">
+            <a:avLst/>
+          </a:prstGeom>
+          <a:noFill/>
+        </p:spPr>
+        <p:txBody>
+          <a:bodyPr wrap="square" rtlCol="0">
+            <a:spAutoFit/>
+          </a:bodyPr>
+          <a:lstStyle/>
+          <a:p>
+            <a:pPr algn="ctr"/>
+            <a:r>
+              <a:rPr lang="en-US" sz="800" i="1" dirty="0">
+                <a:latin typeface="+mj-lt"/>
+              </a:rPr>
+              <a:t>X</a:t>
+            </a:r>
+            <a:r>
+              <a:rPr lang="en-US" sz="800" i="1" baseline="-25000" dirty="0">
+                <a:latin typeface="+mj-lt"/>
+              </a:rPr>
+              <a:t>d2</a:t>
+            </a:r>
+            <a:endParaRPr lang="nl-NL" sz="800" i="1" baseline="-25000" dirty="0">
+              <a:latin typeface="+mj-lt"/>
+            </a:endParaRPr>
+          </a:p>
+        </p:txBody>
+      </p:sp>
+      <p:sp>
+        <p:nvSpPr>
+          <p:cNvPr id="204" name="TextBox 783">
+            <a:extLst>
+              <a:ext uri="{FF2B5EF4-FFF2-40B4-BE49-F238E27FC236}">
+                <a16:creationId xmlns:a16="http://schemas.microsoft.com/office/drawing/2014/main" id="{69CE9737-8F58-4586-AE69-7247927CAA6F}"/>
+              </a:ext>
+            </a:extLst>
+          </p:cNvPr>
+          <p:cNvSpPr txBox="1"/>
+          <p:nvPr/>
+        </p:nvSpPr>
+        <p:spPr>
+          <a:xfrm>
+            <a:off x="3098110" y="8825954"/>
+            <a:ext cx="346916" cy="215444"/>
+          </a:xfrm>
+          <a:prstGeom prst="rect">
+            <a:avLst/>
+          </a:prstGeom>
+          <a:noFill/>
+        </p:spPr>
+        <p:txBody>
+          <a:bodyPr wrap="square" rtlCol="0">
+            <a:spAutoFit/>
+          </a:bodyPr>
+          <a:lstStyle/>
+          <a:p>
+            <a:pPr algn="ctr"/>
+            <a:r>
+              <a:rPr lang="en-US" sz="800" i="1" dirty="0" err="1">
+                <a:latin typeface="+mj-lt"/>
+              </a:rPr>
+              <a:t>X</a:t>
+            </a:r>
+            <a:r>
+              <a:rPr lang="en-US" sz="800" i="1" baseline="-25000" dirty="0" err="1">
+                <a:latin typeface="+mj-lt"/>
+              </a:rPr>
+              <a:t>cN</a:t>
+            </a:r>
+            <a:endParaRPr lang="nl-NL" sz="800" i="1" baseline="-25000" dirty="0">
+              <a:latin typeface="+mj-lt"/>
+            </a:endParaRPr>
+          </a:p>
+        </p:txBody>
+      </p:sp>
+      <p:sp>
+        <p:nvSpPr>
+          <p:cNvPr id="212" name="TextBox 782">
+            <a:extLst>
+              <a:ext uri="{FF2B5EF4-FFF2-40B4-BE49-F238E27FC236}">
+                <a16:creationId xmlns:a16="http://schemas.microsoft.com/office/drawing/2014/main" id="{C8C99C0C-2876-4703-ADBE-9F428E57822E}"/>
+              </a:ext>
+            </a:extLst>
+          </p:cNvPr>
+          <p:cNvSpPr txBox="1"/>
+          <p:nvPr/>
+        </p:nvSpPr>
+        <p:spPr>
+          <a:xfrm>
+            <a:off x="2666571" y="9317507"/>
+            <a:ext cx="346916" cy="215444"/>
+          </a:xfrm>
+          <a:prstGeom prst="rect">
+            <a:avLst/>
+          </a:prstGeom>
+          <a:noFill/>
+        </p:spPr>
+        <p:txBody>
+          <a:bodyPr wrap="square" rtlCol="0">
+            <a:spAutoFit/>
+          </a:bodyPr>
+          <a:lstStyle/>
+          <a:p>
+            <a:pPr algn="ctr"/>
+            <a:r>
+              <a:rPr lang="en-US" sz="800" i="1" dirty="0">
+                <a:latin typeface="+mj-lt"/>
+              </a:rPr>
+              <a:t>X</a:t>
+            </a:r>
+            <a:r>
+              <a:rPr lang="en-US" sz="800" i="1" baseline="-25000" dirty="0">
+                <a:latin typeface="+mj-lt"/>
+              </a:rPr>
+              <a:t>d3</a:t>
+            </a:r>
+            <a:endParaRPr lang="nl-NL" sz="800" i="1" baseline="-25000" dirty="0">
+              <a:latin typeface="+mj-lt"/>
+            </a:endParaRPr>
+          </a:p>
+        </p:txBody>
+      </p:sp>
+      <p:sp>
+        <p:nvSpPr>
+          <p:cNvPr id="213" name="TextBox 783">
+            <a:extLst>
+              <a:ext uri="{FF2B5EF4-FFF2-40B4-BE49-F238E27FC236}">
+                <a16:creationId xmlns:a16="http://schemas.microsoft.com/office/drawing/2014/main" id="{585E13D7-4C5C-48B4-8335-1BDE58B9EAA2}"/>
+              </a:ext>
+            </a:extLst>
+          </p:cNvPr>
+          <p:cNvSpPr txBox="1"/>
+          <p:nvPr/>
+        </p:nvSpPr>
+        <p:spPr>
+          <a:xfrm>
+            <a:off x="2961256" y="9324993"/>
+            <a:ext cx="346916" cy="215444"/>
+          </a:xfrm>
+          <a:prstGeom prst="rect">
+            <a:avLst/>
+          </a:prstGeom>
+          <a:noFill/>
+        </p:spPr>
+        <p:txBody>
+          <a:bodyPr wrap="square" rtlCol="0">
+            <a:spAutoFit/>
+          </a:bodyPr>
+          <a:lstStyle/>
+          <a:p>
+            <a:pPr algn="ctr"/>
+            <a:r>
+              <a:rPr lang="en-US" sz="800" i="1" dirty="0" err="1">
+                <a:latin typeface="+mj-lt"/>
+              </a:rPr>
+              <a:t>X</a:t>
+            </a:r>
+            <a:r>
+              <a:rPr lang="en-US" sz="800" i="1" baseline="-25000" dirty="0" err="1">
+                <a:latin typeface="+mj-lt"/>
+              </a:rPr>
+              <a:t>cN</a:t>
+            </a:r>
+            <a:endParaRPr lang="nl-NL" sz="800" i="1" baseline="-25000" dirty="0">
+              <a:latin typeface="+mj-lt"/>
+            </a:endParaRPr>
+          </a:p>
+        </p:txBody>
+      </p:sp>
+      <p:cxnSp>
+        <p:nvCxnSpPr>
+          <p:cNvPr id="6" name="Rechte verbindingslijn met pijl 5">
+            <a:extLst>
+              <a:ext uri="{FF2B5EF4-FFF2-40B4-BE49-F238E27FC236}">
+                <a16:creationId xmlns:a16="http://schemas.microsoft.com/office/drawing/2014/main" id="{F836673B-73F4-47BA-B2E2-B704BF139323}"/>
+              </a:ext>
+            </a:extLst>
+          </p:cNvPr>
+          <p:cNvCxnSpPr>
+            <a:endCxn id="662" idx="0"/>
+          </p:cNvCxnSpPr>
+          <p:nvPr/>
+        </p:nvCxnSpPr>
+        <p:spPr>
+          <a:xfrm>
+            <a:off x="10212473" y="4497576"/>
+            <a:ext cx="65846" cy="699457"/>
+          </a:xfrm>
+          <a:prstGeom prst="straightConnector1">
+            <a:avLst/>
+          </a:prstGeom>
+          <a:ln>
+            <a:prstDash val="dash"/>
+            <a:tailEnd type="triangle"/>
+          </a:ln>
+        </p:spPr>
+        <p:style>
+          <a:lnRef idx="1">
+            <a:schemeClr val="dk1"/>
+          </a:lnRef>
+          <a:fillRef idx="0">
+            <a:schemeClr val="dk1"/>
+          </a:fillRef>
+          <a:effectRef idx="0">
+            <a:schemeClr val="dk1"/>
+          </a:effectRef>
+          <a:fontRef idx="minor">
+            <a:schemeClr val="tx1"/>
+          </a:fontRef>
+        </p:style>
+      </p:cxnSp>
+      <p:cxnSp>
+        <p:nvCxnSpPr>
+          <p:cNvPr id="216" name="Rechte verbindingslijn met pijl 215">
+            <a:extLst>
+              <a:ext uri="{FF2B5EF4-FFF2-40B4-BE49-F238E27FC236}">
+                <a16:creationId xmlns:a16="http://schemas.microsoft.com/office/drawing/2014/main" id="{4AF5A4C2-BDF0-4245-A127-93F5102ED277}"/>
+              </a:ext>
+            </a:extLst>
+          </p:cNvPr>
+          <p:cNvCxnSpPr>
+            <a:cxnSpLocks/>
+            <a:stCxn id="793" idx="2"/>
+          </p:cNvCxnSpPr>
+          <p:nvPr/>
+        </p:nvCxnSpPr>
+        <p:spPr>
+          <a:xfrm>
+            <a:off x="10466300" y="4509515"/>
+            <a:ext cx="43513" cy="672626"/>
+          </a:xfrm>
+          <a:prstGeom prst="straightConnector1">
+            <a:avLst/>
+          </a:prstGeom>
+          <a:ln>
+            <a:prstDash val="dash"/>
+            <a:tailEnd type="triangle"/>
+          </a:ln>
+        </p:spPr>
+        <p:style>
+          <a:lnRef idx="1">
+            <a:schemeClr val="dk1"/>
+          </a:lnRef>
+          <a:fillRef idx="0">
+            <a:schemeClr val="dk1"/>
+          </a:fillRef>
+          <a:effectRef idx="0">
+            <a:schemeClr val="dk1"/>
+          </a:effectRef>
+          <a:fontRef idx="minor">
+            <a:schemeClr val="tx1"/>
+          </a:fontRef>
+        </p:style>
+      </p:cxnSp>
+      <p:cxnSp>
+        <p:nvCxnSpPr>
+          <p:cNvPr id="219" name="Rechte verbindingslijn met pijl 218">
+            <a:extLst>
+              <a:ext uri="{FF2B5EF4-FFF2-40B4-BE49-F238E27FC236}">
+                <a16:creationId xmlns:a16="http://schemas.microsoft.com/office/drawing/2014/main" id="{7DC36E5E-7860-4716-805C-24E2291FD3E0}"/>
+              </a:ext>
+            </a:extLst>
+          </p:cNvPr>
+          <p:cNvCxnSpPr>
+            <a:cxnSpLocks/>
+          </p:cNvCxnSpPr>
+          <p:nvPr/>
+        </p:nvCxnSpPr>
+        <p:spPr>
+          <a:xfrm flipH="1">
+            <a:off x="10747094" y="4531489"/>
+            <a:ext cx="2" cy="677119"/>
+          </a:xfrm>
+          <a:prstGeom prst="straightConnector1">
+            <a:avLst/>
+          </a:prstGeom>
+          <a:ln>
+            <a:prstDash val="dash"/>
+            <a:tailEnd type="triangle"/>
+          </a:ln>
+        </p:spPr>
+        <p:style>
+          <a:lnRef idx="1">
+            <a:schemeClr val="dk1"/>
+          </a:lnRef>
+          <a:fillRef idx="0">
+            <a:schemeClr val="dk1"/>
+          </a:fillRef>
+          <a:effectRef idx="0">
+            <a:schemeClr val="dk1"/>
+          </a:effectRef>
+          <a:fontRef idx="minor">
+            <a:schemeClr val="tx1"/>
+          </a:fontRef>
+        </p:style>
+      </p:cxnSp>
+      <p:cxnSp>
+        <p:nvCxnSpPr>
+          <p:cNvPr id="223" name="Rechte verbindingslijn met pijl 222">
+            <a:extLst>
+              <a:ext uri="{FF2B5EF4-FFF2-40B4-BE49-F238E27FC236}">
+                <a16:creationId xmlns:a16="http://schemas.microsoft.com/office/drawing/2014/main" id="{FE16EB95-428C-44BB-B0CB-9BF0A9C17A1B}"/>
+              </a:ext>
+            </a:extLst>
+          </p:cNvPr>
+          <p:cNvCxnSpPr>
+            <a:cxnSpLocks/>
+          </p:cNvCxnSpPr>
+          <p:nvPr/>
+        </p:nvCxnSpPr>
+        <p:spPr>
+          <a:xfrm>
+            <a:off x="9296213" y="4503891"/>
+            <a:ext cx="0" cy="564224"/>
+          </a:xfrm>
+          <a:prstGeom prst="straightConnector1">
+            <a:avLst/>
+          </a:prstGeom>
+          <a:ln>
+            <a:prstDash val="dash"/>
+            <a:tailEnd type="triangle"/>
+          </a:ln>
+        </p:spPr>
+        <p:style>
+          <a:lnRef idx="1">
+            <a:schemeClr val="dk1"/>
+          </a:lnRef>
+          <a:fillRef idx="0">
+            <a:schemeClr val="dk1"/>
+          </a:fillRef>
+          <a:effectRef idx="0">
+            <a:schemeClr val="dk1"/>
+          </a:effectRef>
+          <a:fontRef idx="minor">
+            <a:schemeClr val="tx1"/>
+          </a:fontRef>
+        </p:style>
+      </p:cxnSp>
+      <p:sp>
+        <p:nvSpPr>
+          <p:cNvPr id="225" name="TextBox 623">
+            <a:extLst>
+              <a:ext uri="{FF2B5EF4-FFF2-40B4-BE49-F238E27FC236}">
+                <a16:creationId xmlns:a16="http://schemas.microsoft.com/office/drawing/2014/main" id="{25CC975E-6DD5-4A5F-9252-ED0FECFB0D4B}"/>
+              </a:ext>
+            </a:extLst>
+          </p:cNvPr>
+          <p:cNvSpPr txBox="1"/>
+          <p:nvPr/>
+        </p:nvSpPr>
+        <p:spPr>
+          <a:xfrm>
+            <a:off x="8492354" y="5110539"/>
+            <a:ext cx="966482" cy="646331"/>
+          </a:xfrm>
+          <a:prstGeom prst="rect">
+            <a:avLst/>
+          </a:prstGeom>
+          <a:noFill/>
+        </p:spPr>
+        <p:txBody>
+          <a:bodyPr wrap="none" rtlCol="0">
+            <a:spAutoFit/>
+          </a:bodyPr>
+          <a:lstStyle/>
+          <a:p>
+            <a:pPr algn="r"/>
+            <a:r>
+              <a:rPr lang="en-GB" sz="1200" dirty="0">
+                <a:latin typeface="+mj-lt"/>
+              </a:rPr>
+              <a:t>Not used in</a:t>
+            </a:r>
+          </a:p>
+          <a:p>
+            <a:pPr algn="r"/>
+            <a:r>
+              <a:rPr lang="en-GB" sz="1200" dirty="0">
+                <a:latin typeface="+mj-lt"/>
+              </a:rPr>
+              <a:t>combinatory</a:t>
+            </a:r>
+          </a:p>
+          <a:p>
+            <a:pPr algn="r"/>
+            <a:r>
+              <a:rPr lang="en-GB" sz="1200" dirty="0">
+                <a:latin typeface="+mj-lt"/>
+              </a:rPr>
+              <a:t>features</a:t>
+            </a:r>
+            <a:endParaRPr lang="en-NL" sz="1200" dirty="0">
               <a:latin typeface="+mj-lt"/>
             </a:endParaRPr>
           </a:p>

</xml_diff>